<commit_message>
Analysis model is re-constructed.
</commit_message>
<xml_diff>
--- a/design/2016/models/2_analysis_model.pptx
+++ b/design/2016/models/2_analysis_model.pptx
@@ -4439,9 +4439,824 @@
                 <a:ea typeface="メイリオ" panose="020B0604030504040204" pitchFamily="50" charset="-128"/>
                 <a:cs typeface="メイリオ" panose="020B0604030504040204" pitchFamily="50" charset="-128"/>
               </a:rPr>
-              <a:t>ここに一文を入力</a:t>
+              <a:t>抽象化したゲームエリア上での走行体の振る舞いと実際の操作を分離</a:t>
             </a:r>
             <a:endParaRPr lang="ja-JP" altLang="en-US" sz="2716" dirty="0">
+              <a:latin typeface="メイリオ" panose="020B0604030504040204" pitchFamily="50" charset="-128"/>
+              <a:ea typeface="メイリオ" panose="020B0604030504040204" pitchFamily="50" charset="-128"/>
+              <a:cs typeface="メイリオ" panose="020B0604030504040204" pitchFamily="50" charset="-128"/>
+            </a:endParaRPr>
+          </a:p>
+        </p:txBody>
+      </p:sp>
+      <p:sp>
+        <p:nvSpPr>
+          <p:cNvPr id="2" name="正方形/長方形 1"/>
+          <p:cNvSpPr/>
+          <p:nvPr/>
+        </p:nvSpPr>
+        <p:spPr>
+          <a:xfrm>
+            <a:off x="361022" y="1777928"/>
+            <a:ext cx="8208266" cy="1846416"/>
+          </a:xfrm>
+          <a:prstGeom prst="rect">
+            <a:avLst/>
+          </a:prstGeom>
+          <a:noFill/>
+          <a:ln w="25400">
+            <a:solidFill>
+              <a:srgbClr val="D24726"/>
+            </a:solidFill>
+          </a:ln>
+        </p:spPr>
+        <p:style>
+          <a:lnRef idx="2">
+            <a:schemeClr val="accent1">
+              <a:shade val="50000"/>
+            </a:schemeClr>
+          </a:lnRef>
+          <a:fillRef idx="1">
+            <a:schemeClr val="accent1"/>
+          </a:fillRef>
+          <a:effectRef idx="0">
+            <a:schemeClr val="accent1"/>
+          </a:effectRef>
+          <a:fontRef idx="minor">
+            <a:schemeClr val="lt1"/>
+          </a:fontRef>
+        </p:style>
+        <p:txBody>
+          <a:bodyPr rtlCol="0" anchor="ctr"/>
+          <a:lstStyle/>
+          <a:p>
+            <a:pPr algn="ctr"/>
+            <a:endParaRPr kumimoji="1" lang="ja-JP" altLang="en-US"/>
+          </a:p>
+        </p:txBody>
+      </p:sp>
+      <p:sp>
+        <p:nvSpPr>
+          <p:cNvPr id="3" name="テキスト ボックス 2"/>
+          <p:cNvSpPr txBox="1"/>
+          <p:nvPr/>
+        </p:nvSpPr>
+        <p:spPr>
+          <a:xfrm>
+            <a:off x="8569289" y="1777830"/>
+            <a:ext cx="2881964" cy="369332"/>
+          </a:xfrm>
+          <a:prstGeom prst="rect">
+            <a:avLst/>
+          </a:prstGeom>
+          <a:solidFill>
+            <a:srgbClr val="D24726"/>
+          </a:solidFill>
+        </p:spPr>
+        <p:txBody>
+          <a:bodyPr wrap="square" rtlCol="0">
+            <a:spAutoFit/>
+          </a:bodyPr>
+          <a:lstStyle/>
+          <a:p>
+            <a:r>
+              <a:rPr kumimoji="1" lang="en-US" altLang="ja-JP" sz="1800" b="1" dirty="0" smtClean="0">
+                <a:solidFill>
+                  <a:schemeClr val="bg1"/>
+                </a:solidFill>
+                <a:latin typeface="メイリオ" panose="020B0604030504040204" pitchFamily="50" charset="-128"/>
+                <a:ea typeface="メイリオ" panose="020B0604030504040204" pitchFamily="50" charset="-128"/>
+                <a:cs typeface="メイリオ" panose="020B0604030504040204" pitchFamily="50" charset="-128"/>
+              </a:rPr>
+              <a:t>2-2.</a:t>
+            </a:r>
+            <a:r>
+              <a:rPr kumimoji="1" lang="ja-JP" altLang="en-US" sz="1800" b="1" dirty="0" smtClean="0">
+                <a:solidFill>
+                  <a:schemeClr val="bg1"/>
+                </a:solidFill>
+                <a:latin typeface="メイリオ" panose="020B0604030504040204" pitchFamily="50" charset="-128"/>
+                <a:ea typeface="メイリオ" panose="020B0604030504040204" pitchFamily="50" charset="-128"/>
+                <a:cs typeface="メイリオ" panose="020B0604030504040204" pitchFamily="50" charset="-128"/>
+              </a:rPr>
+              <a:t> ゲーム全体のフロー</a:t>
+            </a:r>
+            <a:endParaRPr kumimoji="1" lang="ja-JP" altLang="en-US" sz="1800" b="1" dirty="0">
+              <a:solidFill>
+                <a:schemeClr val="bg1"/>
+              </a:solidFill>
+              <a:latin typeface="メイリオ" panose="020B0604030504040204" pitchFamily="50" charset="-128"/>
+              <a:ea typeface="メイリオ" panose="020B0604030504040204" pitchFamily="50" charset="-128"/>
+              <a:cs typeface="メイリオ" panose="020B0604030504040204" pitchFamily="50" charset="-128"/>
+            </a:endParaRPr>
+          </a:p>
+        </p:txBody>
+      </p:sp>
+      <p:sp>
+        <p:nvSpPr>
+          <p:cNvPr id="13" name="正方形/長方形 12"/>
+          <p:cNvSpPr/>
+          <p:nvPr/>
+        </p:nvSpPr>
+        <p:spPr>
+          <a:xfrm>
+            <a:off x="8569291" y="1777927"/>
+            <a:ext cx="6349865" cy="7393311"/>
+          </a:xfrm>
+          <a:prstGeom prst="rect">
+            <a:avLst/>
+          </a:prstGeom>
+          <a:noFill/>
+          <a:ln w="25400">
+            <a:solidFill>
+              <a:srgbClr val="D24726"/>
+            </a:solidFill>
+          </a:ln>
+        </p:spPr>
+        <p:style>
+          <a:lnRef idx="2">
+            <a:schemeClr val="accent1">
+              <a:shade val="50000"/>
+            </a:schemeClr>
+          </a:lnRef>
+          <a:fillRef idx="1">
+            <a:schemeClr val="accent1"/>
+          </a:fillRef>
+          <a:effectRef idx="0">
+            <a:schemeClr val="accent1"/>
+          </a:effectRef>
+          <a:fontRef idx="minor">
+            <a:schemeClr val="lt1"/>
+          </a:fontRef>
+        </p:style>
+        <p:txBody>
+          <a:bodyPr rtlCol="0" anchor="ctr"/>
+          <a:lstStyle/>
+          <a:p>
+            <a:pPr algn="ctr"/>
+            <a:endParaRPr kumimoji="1" lang="ja-JP" altLang="en-US"/>
+          </a:p>
+        </p:txBody>
+      </p:sp>
+      <p:sp>
+        <p:nvSpPr>
+          <p:cNvPr id="16" name="テキスト ボックス 15"/>
+          <p:cNvSpPr txBox="1"/>
+          <p:nvPr/>
+        </p:nvSpPr>
+        <p:spPr>
+          <a:xfrm>
+            <a:off x="367256" y="1777927"/>
+            <a:ext cx="3991798" cy="369332"/>
+          </a:xfrm>
+          <a:prstGeom prst="rect">
+            <a:avLst/>
+          </a:prstGeom>
+          <a:solidFill>
+            <a:srgbClr val="D24726"/>
+          </a:solidFill>
+        </p:spPr>
+        <p:txBody>
+          <a:bodyPr wrap="none" rtlCol="0">
+            <a:spAutoFit/>
+          </a:bodyPr>
+          <a:lstStyle/>
+          <a:p>
+            <a:r>
+              <a:rPr kumimoji="1" lang="en-US" altLang="ja-JP" sz="1800" b="1" dirty="0" smtClean="0">
+                <a:solidFill>
+                  <a:schemeClr val="bg1"/>
+                </a:solidFill>
+                <a:latin typeface="メイリオ" panose="020B0604030504040204" pitchFamily="50" charset="-128"/>
+                <a:ea typeface="メイリオ" panose="020B0604030504040204" pitchFamily="50" charset="-128"/>
+                <a:cs typeface="メイリオ" panose="020B0604030504040204" pitchFamily="50" charset="-128"/>
+              </a:rPr>
+              <a:t>2-1.</a:t>
+            </a:r>
+            <a:r>
+              <a:rPr kumimoji="1" lang="ja-JP" altLang="en-US" sz="1800" b="1" dirty="0" smtClean="0">
+                <a:solidFill>
+                  <a:schemeClr val="bg1"/>
+                </a:solidFill>
+                <a:latin typeface="メイリオ" panose="020B0604030504040204" pitchFamily="50" charset="-128"/>
+                <a:ea typeface="メイリオ" panose="020B0604030504040204" pitchFamily="50" charset="-128"/>
+                <a:cs typeface="メイリオ" panose="020B0604030504040204" pitchFamily="50" charset="-128"/>
+              </a:rPr>
+              <a:t> ゲームエリアと走行体の抽象化</a:t>
+            </a:r>
+            <a:endParaRPr kumimoji="1" lang="ja-JP" altLang="en-US" sz="1800" b="1" dirty="0">
+              <a:solidFill>
+                <a:schemeClr val="bg1"/>
+              </a:solidFill>
+              <a:latin typeface="メイリオ" panose="020B0604030504040204" pitchFamily="50" charset="-128"/>
+              <a:ea typeface="メイリオ" panose="020B0604030504040204" pitchFamily="50" charset="-128"/>
+              <a:cs typeface="メイリオ" panose="020B0604030504040204" pitchFamily="50" charset="-128"/>
+            </a:endParaRPr>
+          </a:p>
+        </p:txBody>
+      </p:sp>
+      <p:sp>
+        <p:nvSpPr>
+          <p:cNvPr id="10" name="テキスト ボックス 9"/>
+          <p:cNvSpPr txBox="1"/>
+          <p:nvPr/>
+        </p:nvSpPr>
+        <p:spPr>
+          <a:xfrm>
+            <a:off x="361024" y="2157909"/>
+            <a:ext cx="4789734" cy="1323439"/>
+          </a:xfrm>
+          <a:prstGeom prst="rect">
+            <a:avLst/>
+          </a:prstGeom>
+          <a:noFill/>
+        </p:spPr>
+        <p:txBody>
+          <a:bodyPr wrap="square" rtlCol="0">
+            <a:spAutoFit/>
+          </a:bodyPr>
+          <a:lstStyle/>
+          <a:p>
+            <a:r>
+              <a:rPr kumimoji="1" lang="ja-JP" altLang="en-US" sz="1600" dirty="0" smtClean="0">
+                <a:latin typeface="メイリオ" panose="020B0604030504040204" pitchFamily="50" charset="-128"/>
+                <a:ea typeface="メイリオ" panose="020B0604030504040204" pitchFamily="50" charset="-128"/>
+                <a:cs typeface="メイリオ" panose="020B0604030504040204" pitchFamily="50" charset="-128"/>
+              </a:rPr>
+              <a:t>４ｘ４マスの格子であるゲームエリアを、格子点間の中点で分割し</a:t>
+            </a:r>
+            <a:r>
+              <a:rPr kumimoji="1" lang="ja-JP" altLang="en-US" sz="1600" dirty="0" smtClean="0">
+                <a:latin typeface="メイリオ" panose="020B0604030504040204" pitchFamily="50" charset="-128"/>
+                <a:ea typeface="メイリオ" panose="020B0604030504040204" pitchFamily="50" charset="-128"/>
+                <a:cs typeface="メイリオ" panose="020B0604030504040204" pitchFamily="50" charset="-128"/>
+              </a:rPr>
+              <a:t>、右図</a:t>
+            </a:r>
+            <a:r>
+              <a:rPr kumimoji="1" lang="ja-JP" altLang="en-US" sz="1600" dirty="0" smtClean="0">
+                <a:latin typeface="メイリオ" panose="020B0604030504040204" pitchFamily="50" charset="-128"/>
+                <a:ea typeface="メイリオ" panose="020B0604030504040204" pitchFamily="50" charset="-128"/>
+                <a:cs typeface="メイリオ" panose="020B0604030504040204" pitchFamily="50" charset="-128"/>
+              </a:rPr>
+              <a:t>のような座標系で表現した</a:t>
+            </a:r>
+            <a:r>
+              <a:rPr kumimoji="1" lang="ja-JP" altLang="en-US" sz="1600" b="1" dirty="0" smtClean="0">
+                <a:solidFill>
+                  <a:srgbClr val="0000FF"/>
+                </a:solidFill>
+                <a:latin typeface="メイリオ" panose="020B0604030504040204" pitchFamily="50" charset="-128"/>
+                <a:ea typeface="メイリオ" panose="020B0604030504040204" pitchFamily="50" charset="-128"/>
+                <a:cs typeface="メイリオ" panose="020B0604030504040204" pitchFamily="50" charset="-128"/>
+              </a:rPr>
+              <a:t>抽象マップ</a:t>
+            </a:r>
+            <a:r>
+              <a:rPr kumimoji="1" lang="ja-JP" altLang="en-US" sz="1600" dirty="0" smtClean="0">
+                <a:latin typeface="メイリオ" panose="020B0604030504040204" pitchFamily="50" charset="-128"/>
+                <a:ea typeface="メイリオ" panose="020B0604030504040204" pitchFamily="50" charset="-128"/>
+                <a:cs typeface="メイリオ" panose="020B0604030504040204" pitchFamily="50" charset="-128"/>
+              </a:rPr>
+              <a:t>を設ける。抽象マップ上では</a:t>
+            </a:r>
+            <a:r>
+              <a:rPr lang="ja-JP" altLang="en-US" sz="1600" dirty="0" smtClean="0">
+                <a:latin typeface="メイリオ" panose="020B0604030504040204" pitchFamily="50" charset="-128"/>
+                <a:ea typeface="メイリオ" panose="020B0604030504040204" pitchFamily="50" charset="-128"/>
+                <a:cs typeface="メイリオ" panose="020B0604030504040204" pitchFamily="50" charset="-128"/>
+              </a:rPr>
+              <a:t>走行体は位置、向き、</a:t>
+            </a:r>
+            <a:r>
+              <a:rPr lang="ja-JP" altLang="en-US" sz="1600" dirty="0">
+                <a:latin typeface="メイリオ" panose="020B0604030504040204" pitchFamily="50" charset="-128"/>
+                <a:ea typeface="メイリオ" panose="020B0604030504040204" pitchFamily="50" charset="-128"/>
+                <a:cs typeface="メイリオ" panose="020B0604030504040204" pitchFamily="50" charset="-128"/>
+              </a:rPr>
+              <a:t>把持</a:t>
+            </a:r>
+            <a:r>
+              <a:rPr lang="ja-JP" altLang="en-US" sz="1600" dirty="0" smtClean="0">
+                <a:latin typeface="メイリオ" panose="020B0604030504040204" pitchFamily="50" charset="-128"/>
+                <a:ea typeface="メイリオ" panose="020B0604030504040204" pitchFamily="50" charset="-128"/>
+                <a:cs typeface="メイリオ" panose="020B0604030504040204" pitchFamily="50" charset="-128"/>
+              </a:rPr>
+              <a:t>ブロック</a:t>
+            </a:r>
+            <a:r>
+              <a:rPr lang="ja-JP" altLang="en-US" sz="1600" dirty="0" smtClean="0">
+                <a:latin typeface="メイリオ" panose="020B0604030504040204" pitchFamily="50" charset="-128"/>
+                <a:ea typeface="メイリオ" panose="020B0604030504040204" pitchFamily="50" charset="-128"/>
+                <a:cs typeface="メイリオ" panose="020B0604030504040204" pitchFamily="50" charset="-128"/>
+              </a:rPr>
+              <a:t>の有無および色の</a:t>
+            </a:r>
+            <a:r>
+              <a:rPr lang="ja-JP" altLang="en-US" sz="1600" dirty="0" smtClean="0">
+                <a:latin typeface="メイリオ" panose="020B0604030504040204" pitchFamily="50" charset="-128"/>
+                <a:ea typeface="メイリオ" panose="020B0604030504040204" pitchFamily="50" charset="-128"/>
+                <a:cs typeface="メイリオ" panose="020B0604030504040204" pitchFamily="50" charset="-128"/>
+              </a:rPr>
+              <a:t>状態を持つ</a:t>
+            </a:r>
+            <a:r>
+              <a:rPr lang="ja-JP" altLang="en-US" sz="1600" b="1" dirty="0" smtClean="0">
+                <a:solidFill>
+                  <a:srgbClr val="0000FF"/>
+                </a:solidFill>
+                <a:latin typeface="メイリオ" panose="020B0604030504040204" pitchFamily="50" charset="-128"/>
+                <a:ea typeface="メイリオ" panose="020B0604030504040204" pitchFamily="50" charset="-128"/>
+                <a:cs typeface="メイリオ" panose="020B0604030504040204" pitchFamily="50" charset="-128"/>
+              </a:rPr>
+              <a:t>抽象走行体</a:t>
+            </a:r>
+            <a:r>
+              <a:rPr lang="ja-JP" altLang="en-US" sz="1600" dirty="0" smtClean="0">
+                <a:latin typeface="メイリオ" panose="020B0604030504040204" pitchFamily="50" charset="-128"/>
+                <a:ea typeface="メイリオ" panose="020B0604030504040204" pitchFamily="50" charset="-128"/>
+                <a:cs typeface="メイリオ" panose="020B0604030504040204" pitchFamily="50" charset="-128"/>
+              </a:rPr>
+              <a:t>として表現される。</a:t>
+            </a:r>
+            <a:endParaRPr lang="en-US" altLang="ja-JP" sz="1600" dirty="0" smtClean="0">
+              <a:latin typeface="メイリオ" panose="020B0604030504040204" pitchFamily="50" charset="-128"/>
+              <a:ea typeface="メイリオ" panose="020B0604030504040204" pitchFamily="50" charset="-128"/>
+              <a:cs typeface="メイリオ" panose="020B0604030504040204" pitchFamily="50" charset="-128"/>
+            </a:endParaRPr>
+          </a:p>
+        </p:txBody>
+      </p:sp>
+      <p:pic>
+        <p:nvPicPr>
+          <p:cNvPr id="11" name="図 10"/>
+          <p:cNvPicPr>
+            <a:picLocks noChangeAspect="1"/>
+          </p:cNvPicPr>
+          <p:nvPr/>
+        </p:nvPicPr>
+        <p:blipFill>
+          <a:blip r:embed="rId2"/>
+          <a:stretch>
+            <a:fillRect/>
+          </a:stretch>
+        </p:blipFill>
+        <p:spPr>
+          <a:xfrm>
+            <a:off x="5136160" y="2055630"/>
+            <a:ext cx="1023597" cy="1177247"/>
+          </a:xfrm>
+          <a:prstGeom prst="rect">
+            <a:avLst/>
+          </a:prstGeom>
+        </p:spPr>
+      </p:pic>
+      <p:sp>
+        <p:nvSpPr>
+          <p:cNvPr id="12" name="右矢印 11"/>
+          <p:cNvSpPr/>
+          <p:nvPr/>
+        </p:nvSpPr>
+        <p:spPr>
+          <a:xfrm>
+            <a:off x="6257619" y="2396602"/>
+            <a:ext cx="457200" cy="495300"/>
+          </a:xfrm>
+          <a:prstGeom prst="rightArrow">
+            <a:avLst/>
+          </a:prstGeom>
+        </p:spPr>
+        <p:style>
+          <a:lnRef idx="2">
+            <a:schemeClr val="accent1">
+              <a:shade val="50000"/>
+            </a:schemeClr>
+          </a:lnRef>
+          <a:fillRef idx="1">
+            <a:schemeClr val="accent1"/>
+          </a:fillRef>
+          <a:effectRef idx="0">
+            <a:schemeClr val="accent1"/>
+          </a:effectRef>
+          <a:fontRef idx="minor">
+            <a:schemeClr val="lt1"/>
+          </a:fontRef>
+        </p:style>
+        <p:txBody>
+          <a:bodyPr rtlCol="0" anchor="ctr"/>
+          <a:lstStyle/>
+          <a:p>
+            <a:pPr algn="ctr"/>
+            <a:endParaRPr kumimoji="1" lang="ja-JP" altLang="en-US"/>
+          </a:p>
+        </p:txBody>
+      </p:sp>
+      <p:pic>
+        <p:nvPicPr>
+          <p:cNvPr id="17" name="図 16"/>
+          <p:cNvPicPr>
+            <a:picLocks noChangeAspect="1"/>
+          </p:cNvPicPr>
+          <p:nvPr/>
+        </p:nvPicPr>
+        <p:blipFill>
+          <a:blip r:embed="rId3"/>
+          <a:stretch>
+            <a:fillRect/>
+          </a:stretch>
+        </p:blipFill>
+        <p:spPr>
+          <a:xfrm>
+            <a:off x="6785981" y="1952080"/>
+            <a:ext cx="1758131" cy="1384345"/>
+          </a:xfrm>
+          <a:prstGeom prst="rect">
+            <a:avLst/>
+          </a:prstGeom>
+        </p:spPr>
+      </p:pic>
+      <p:pic>
+        <p:nvPicPr>
+          <p:cNvPr id="4" name="図 3"/>
+          <p:cNvPicPr>
+            <a:picLocks noChangeAspect="1"/>
+          </p:cNvPicPr>
+          <p:nvPr/>
+        </p:nvPicPr>
+        <p:blipFill>
+          <a:blip r:embed="rId4"/>
+          <a:stretch>
+            <a:fillRect/>
+          </a:stretch>
+        </p:blipFill>
+        <p:spPr>
+          <a:xfrm>
+            <a:off x="8619645" y="2199445"/>
+            <a:ext cx="6299512" cy="6971792"/>
+          </a:xfrm>
+          <a:prstGeom prst="rect">
+            <a:avLst/>
+          </a:prstGeom>
+        </p:spPr>
+      </p:pic>
+      <p:pic>
+        <p:nvPicPr>
+          <p:cNvPr id="5" name="図 4"/>
+          <p:cNvPicPr>
+            <a:picLocks noChangeAspect="1"/>
+          </p:cNvPicPr>
+          <p:nvPr/>
+        </p:nvPicPr>
+        <p:blipFill>
+          <a:blip r:embed="rId5"/>
+          <a:stretch>
+            <a:fillRect/>
+          </a:stretch>
+        </p:blipFill>
+        <p:spPr>
+          <a:xfrm>
+            <a:off x="13287183" y="4738415"/>
+            <a:ext cx="1525145" cy="1875031"/>
+          </a:xfrm>
+          <a:prstGeom prst="rect">
+            <a:avLst/>
+          </a:prstGeom>
+        </p:spPr>
+      </p:pic>
+      <p:sp>
+        <p:nvSpPr>
+          <p:cNvPr id="22" name="正方形/長方形 21"/>
+          <p:cNvSpPr/>
+          <p:nvPr/>
+        </p:nvSpPr>
+        <p:spPr>
+          <a:xfrm>
+            <a:off x="361022" y="6578526"/>
+            <a:ext cx="8208266" cy="2592711"/>
+          </a:xfrm>
+          <a:prstGeom prst="rect">
+            <a:avLst/>
+          </a:prstGeom>
+          <a:noFill/>
+          <a:ln w="25400">
+            <a:solidFill>
+              <a:srgbClr val="D24726"/>
+            </a:solidFill>
+          </a:ln>
+        </p:spPr>
+        <p:style>
+          <a:lnRef idx="2">
+            <a:schemeClr val="accent1">
+              <a:shade val="50000"/>
+            </a:schemeClr>
+          </a:lnRef>
+          <a:fillRef idx="1">
+            <a:schemeClr val="accent1"/>
+          </a:fillRef>
+          <a:effectRef idx="0">
+            <a:schemeClr val="accent1"/>
+          </a:effectRef>
+          <a:fontRef idx="minor">
+            <a:schemeClr val="lt1"/>
+          </a:fontRef>
+        </p:style>
+        <p:txBody>
+          <a:bodyPr rtlCol="0" anchor="ctr"/>
+          <a:lstStyle/>
+          <a:p>
+            <a:pPr algn="ctr"/>
+            <a:endParaRPr kumimoji="1" lang="ja-JP" altLang="en-US"/>
+          </a:p>
+        </p:txBody>
+      </p:sp>
+      <p:sp>
+        <p:nvSpPr>
+          <p:cNvPr id="24" name="テキスト ボックス 23"/>
+          <p:cNvSpPr txBox="1"/>
+          <p:nvPr/>
+        </p:nvSpPr>
+        <p:spPr>
+          <a:xfrm>
+            <a:off x="361019" y="6578525"/>
+            <a:ext cx="6992620" cy="369332"/>
+          </a:xfrm>
+          <a:prstGeom prst="rect">
+            <a:avLst/>
+          </a:prstGeom>
+          <a:solidFill>
+            <a:srgbClr val="D24726"/>
+          </a:solidFill>
+        </p:spPr>
+        <p:txBody>
+          <a:bodyPr wrap="none" rtlCol="0">
+            <a:spAutoFit/>
+          </a:bodyPr>
+          <a:lstStyle/>
+          <a:p>
+            <a:r>
+              <a:rPr kumimoji="1" lang="en-US" altLang="ja-JP" sz="1800" b="1" dirty="0" smtClean="0">
+                <a:solidFill>
+                  <a:schemeClr val="bg1"/>
+                </a:solidFill>
+                <a:latin typeface="メイリオ" panose="020B0604030504040204" pitchFamily="50" charset="-128"/>
+                <a:ea typeface="メイリオ" panose="020B0604030504040204" pitchFamily="50" charset="-128"/>
+                <a:cs typeface="メイリオ" panose="020B0604030504040204" pitchFamily="50" charset="-128"/>
+              </a:rPr>
+              <a:t>2-3.</a:t>
+            </a:r>
+            <a:r>
+              <a:rPr kumimoji="1" lang="ja-JP" altLang="en-US" sz="1800" b="1" dirty="0" smtClean="0">
+                <a:solidFill>
+                  <a:schemeClr val="bg1"/>
+                </a:solidFill>
+                <a:latin typeface="メイリオ" panose="020B0604030504040204" pitchFamily="50" charset="-128"/>
+                <a:ea typeface="メイリオ" panose="020B0604030504040204" pitchFamily="50" charset="-128"/>
+                <a:cs typeface="メイリオ" panose="020B0604030504040204" pitchFamily="50" charset="-128"/>
+              </a:rPr>
+              <a:t> 抽象走行体の進入位置および最初の移動候補ブロックの決定</a:t>
+            </a:r>
+            <a:endParaRPr kumimoji="1" lang="ja-JP" altLang="en-US" sz="1800" b="1" dirty="0">
+              <a:solidFill>
+                <a:schemeClr val="bg1"/>
+              </a:solidFill>
+              <a:latin typeface="メイリオ" panose="020B0604030504040204" pitchFamily="50" charset="-128"/>
+              <a:ea typeface="メイリオ" panose="020B0604030504040204" pitchFamily="50" charset="-128"/>
+              <a:cs typeface="メイリオ" panose="020B0604030504040204" pitchFamily="50" charset="-128"/>
+            </a:endParaRPr>
+          </a:p>
+        </p:txBody>
+      </p:sp>
+      <p:sp>
+        <p:nvSpPr>
+          <p:cNvPr id="25" name="テキスト ボックス 24"/>
+          <p:cNvSpPr txBox="1"/>
+          <p:nvPr/>
+        </p:nvSpPr>
+        <p:spPr>
+          <a:xfrm>
+            <a:off x="397500" y="6978001"/>
+            <a:ext cx="6388481" cy="830997"/>
+          </a:xfrm>
+          <a:prstGeom prst="rect">
+            <a:avLst/>
+          </a:prstGeom>
+          <a:noFill/>
+        </p:spPr>
+        <p:txBody>
+          <a:bodyPr wrap="square" rtlCol="0">
+            <a:spAutoFit/>
+          </a:bodyPr>
+          <a:lstStyle/>
+          <a:p>
+            <a:r>
+              <a:rPr lang="ja-JP" altLang="en-US" sz="1600" dirty="0" smtClean="0">
+                <a:latin typeface="メイリオ" panose="020B0604030504040204" pitchFamily="50" charset="-128"/>
+                <a:ea typeface="メイリオ" panose="020B0604030504040204" pitchFamily="50" charset="-128"/>
+                <a:cs typeface="メイリオ" panose="020B0604030504040204" pitchFamily="50" charset="-128"/>
+              </a:rPr>
+              <a:t>抽象マップ上の侵入位置の候補を</a:t>
+            </a:r>
+            <a:r>
+              <a:rPr lang="en-US" altLang="ja-JP" sz="1600" dirty="0" smtClean="0">
+                <a:latin typeface="メイリオ" panose="020B0604030504040204" pitchFamily="50" charset="-128"/>
+                <a:ea typeface="メイリオ" panose="020B0604030504040204" pitchFamily="50" charset="-128"/>
+                <a:cs typeface="メイリオ" panose="020B0604030504040204" pitchFamily="50" charset="-128"/>
+              </a:rPr>
+              <a:t>(0,1)</a:t>
+            </a:r>
+            <a:r>
+              <a:rPr lang="ja-JP" altLang="en-US" sz="1600" dirty="0" err="1" smtClean="0">
+                <a:latin typeface="メイリオ" panose="020B0604030504040204" pitchFamily="50" charset="-128"/>
+                <a:ea typeface="メイリオ" panose="020B0604030504040204" pitchFamily="50" charset="-128"/>
+                <a:cs typeface="メイリオ" panose="020B0604030504040204" pitchFamily="50" charset="-128"/>
+              </a:rPr>
+              <a:t>、</a:t>
+            </a:r>
+            <a:r>
+              <a:rPr lang="en-US" altLang="ja-JP" sz="1600" dirty="0" smtClean="0">
+                <a:latin typeface="メイリオ" panose="020B0604030504040204" pitchFamily="50" charset="-128"/>
+                <a:ea typeface="メイリオ" panose="020B0604030504040204" pitchFamily="50" charset="-128"/>
+                <a:cs typeface="メイリオ" panose="020B0604030504040204" pitchFamily="50" charset="-128"/>
+              </a:rPr>
+              <a:t>(0,3)</a:t>
+            </a:r>
+            <a:r>
+              <a:rPr lang="ja-JP" altLang="en-US" sz="1600" dirty="0" err="1" smtClean="0">
+                <a:latin typeface="メイリオ" panose="020B0604030504040204" pitchFamily="50" charset="-128"/>
+                <a:ea typeface="メイリオ" panose="020B0604030504040204" pitchFamily="50" charset="-128"/>
+                <a:cs typeface="メイリオ" panose="020B0604030504040204" pitchFamily="50" charset="-128"/>
+              </a:rPr>
+              <a:t>、</a:t>
+            </a:r>
+            <a:r>
+              <a:rPr lang="en-US" altLang="ja-JP" sz="1600" dirty="0" smtClean="0">
+                <a:latin typeface="メイリオ" panose="020B0604030504040204" pitchFamily="50" charset="-128"/>
+                <a:ea typeface="メイリオ" panose="020B0604030504040204" pitchFamily="50" charset="-128"/>
+                <a:cs typeface="メイリオ" panose="020B0604030504040204" pitchFamily="50" charset="-128"/>
+              </a:rPr>
+              <a:t>(0,5)</a:t>
+            </a:r>
+            <a:r>
+              <a:rPr lang="ja-JP" altLang="en-US" sz="1600" dirty="0" smtClean="0">
+                <a:latin typeface="メイリオ" panose="020B0604030504040204" pitchFamily="50" charset="-128"/>
+                <a:ea typeface="メイリオ" panose="020B0604030504040204" pitchFamily="50" charset="-128"/>
+                <a:cs typeface="メイリオ" panose="020B0604030504040204" pitchFamily="50" charset="-128"/>
+              </a:rPr>
+              <a:t>とする。各点ごとに、最近の移動候補ブロックを囲むまでの</a:t>
+            </a:r>
+            <a:r>
+              <a:rPr lang="ja-JP" altLang="en-US" sz="1600" b="1" dirty="0">
+                <a:solidFill>
+                  <a:srgbClr val="0000FF"/>
+                </a:solidFill>
+                <a:latin typeface="メイリオ" panose="020B0604030504040204" pitchFamily="50" charset="-128"/>
+                <a:ea typeface="メイリオ" panose="020B0604030504040204" pitchFamily="50" charset="-128"/>
+                <a:cs typeface="メイリオ" panose="020B0604030504040204" pitchFamily="50" charset="-128"/>
+              </a:rPr>
+              <a:t>移動</a:t>
+            </a:r>
+            <a:r>
+              <a:rPr lang="ja-JP" altLang="en-US" sz="1600" b="1" dirty="0" smtClean="0">
+                <a:solidFill>
+                  <a:srgbClr val="0000FF"/>
+                </a:solidFill>
+                <a:latin typeface="メイリオ" panose="020B0604030504040204" pitchFamily="50" charset="-128"/>
+                <a:ea typeface="メイリオ" panose="020B0604030504040204" pitchFamily="50" charset="-128"/>
+                <a:cs typeface="メイリオ" panose="020B0604030504040204" pitchFamily="50" charset="-128"/>
+              </a:rPr>
+              <a:t>経路</a:t>
+            </a:r>
+            <a:r>
+              <a:rPr lang="ja-JP" altLang="en-US" sz="1600" dirty="0" smtClean="0">
+                <a:latin typeface="メイリオ" panose="020B0604030504040204" pitchFamily="50" charset="-128"/>
+                <a:ea typeface="メイリオ" panose="020B0604030504040204" pitchFamily="50" charset="-128"/>
+                <a:cs typeface="メイリオ" panose="020B0604030504040204" pitchFamily="50" charset="-128"/>
+              </a:rPr>
+              <a:t>を計算し、その</a:t>
+            </a:r>
+            <a:r>
+              <a:rPr lang="ja-JP" altLang="en-US" sz="1600" b="1" dirty="0" smtClean="0">
+                <a:solidFill>
+                  <a:srgbClr val="0000FF"/>
+                </a:solidFill>
+                <a:latin typeface="メイリオ" panose="020B0604030504040204" pitchFamily="50" charset="-128"/>
+                <a:ea typeface="メイリオ" panose="020B0604030504040204" pitchFamily="50" charset="-128"/>
+                <a:cs typeface="メイリオ" panose="020B0604030504040204" pitchFamily="50" charset="-128"/>
+              </a:rPr>
+              <a:t>移動コスト</a:t>
+            </a:r>
+            <a:r>
+              <a:rPr lang="ja-JP" altLang="en-US" sz="1600" dirty="0" smtClean="0">
+                <a:latin typeface="メイリオ" panose="020B0604030504040204" pitchFamily="50" charset="-128"/>
+                <a:ea typeface="メイリオ" panose="020B0604030504040204" pitchFamily="50" charset="-128"/>
+                <a:cs typeface="メイリオ" panose="020B0604030504040204" pitchFamily="50" charset="-128"/>
+              </a:rPr>
+              <a:t>を計算し、移動コストが</a:t>
+            </a:r>
+            <a:endParaRPr lang="en-US" altLang="ja-JP" sz="1600" dirty="0" smtClean="0">
+              <a:latin typeface="メイリオ" panose="020B0604030504040204" pitchFamily="50" charset="-128"/>
+              <a:ea typeface="メイリオ" panose="020B0604030504040204" pitchFamily="50" charset="-128"/>
+              <a:cs typeface="メイリオ" panose="020B0604030504040204" pitchFamily="50" charset="-128"/>
+            </a:endParaRPr>
+          </a:p>
+        </p:txBody>
+      </p:sp>
+      <p:sp>
+        <p:nvSpPr>
+          <p:cNvPr id="26" name="正方形/長方形 25"/>
+          <p:cNvSpPr/>
+          <p:nvPr/>
+        </p:nvSpPr>
+        <p:spPr>
+          <a:xfrm>
+            <a:off x="361022" y="3620976"/>
+            <a:ext cx="8208266" cy="2592711"/>
+          </a:xfrm>
+          <a:prstGeom prst="rect">
+            <a:avLst/>
+          </a:prstGeom>
+          <a:noFill/>
+          <a:ln w="25400">
+            <a:solidFill>
+              <a:srgbClr val="D24726"/>
+            </a:solidFill>
+          </a:ln>
+        </p:spPr>
+        <p:style>
+          <a:lnRef idx="2">
+            <a:schemeClr val="accent1">
+              <a:shade val="50000"/>
+            </a:schemeClr>
+          </a:lnRef>
+          <a:fillRef idx="1">
+            <a:schemeClr val="accent1"/>
+          </a:fillRef>
+          <a:effectRef idx="0">
+            <a:schemeClr val="accent1"/>
+          </a:effectRef>
+          <a:fontRef idx="minor">
+            <a:schemeClr val="lt1"/>
+          </a:fontRef>
+        </p:style>
+        <p:txBody>
+          <a:bodyPr rtlCol="0" anchor="ctr"/>
+          <a:lstStyle/>
+          <a:p>
+            <a:pPr algn="ctr"/>
+            <a:endParaRPr kumimoji="1" lang="ja-JP" altLang="en-US"/>
+          </a:p>
+        </p:txBody>
+      </p:sp>
+      <p:sp>
+        <p:nvSpPr>
+          <p:cNvPr id="27" name="テキスト ボックス 26"/>
+          <p:cNvSpPr txBox="1"/>
+          <p:nvPr/>
+        </p:nvSpPr>
+        <p:spPr>
+          <a:xfrm>
+            <a:off x="361019" y="3620975"/>
+            <a:ext cx="1452642" cy="369332"/>
+          </a:xfrm>
+          <a:prstGeom prst="rect">
+            <a:avLst/>
+          </a:prstGeom>
+          <a:solidFill>
+            <a:srgbClr val="D24726"/>
+          </a:solidFill>
+        </p:spPr>
+        <p:txBody>
+          <a:bodyPr wrap="none" rtlCol="0">
+            <a:spAutoFit/>
+          </a:bodyPr>
+          <a:lstStyle/>
+          <a:p>
+            <a:r>
+              <a:rPr kumimoji="1" lang="en-US" altLang="ja-JP" sz="1800" b="1" dirty="0" smtClean="0">
+                <a:solidFill>
+                  <a:schemeClr val="bg1"/>
+                </a:solidFill>
+                <a:latin typeface="メイリオ" panose="020B0604030504040204" pitchFamily="50" charset="-128"/>
+                <a:ea typeface="メイリオ" panose="020B0604030504040204" pitchFamily="50" charset="-128"/>
+                <a:cs typeface="メイリオ" panose="020B0604030504040204" pitchFamily="50" charset="-128"/>
+              </a:rPr>
+              <a:t>2-2.</a:t>
+            </a:r>
+            <a:r>
+              <a:rPr kumimoji="1" lang="ja-JP" altLang="en-US" sz="1800" b="1" dirty="0" smtClean="0">
+                <a:solidFill>
+                  <a:schemeClr val="bg1"/>
+                </a:solidFill>
+                <a:latin typeface="メイリオ" panose="020B0604030504040204" pitchFamily="50" charset="-128"/>
+                <a:ea typeface="メイリオ" panose="020B0604030504040204" pitchFamily="50" charset="-128"/>
+                <a:cs typeface="メイリオ" panose="020B0604030504040204" pitchFamily="50" charset="-128"/>
+              </a:rPr>
+              <a:t> 候補点</a:t>
+            </a:r>
+            <a:endParaRPr kumimoji="1" lang="ja-JP" altLang="en-US" sz="1800" b="1" dirty="0">
+              <a:solidFill>
+                <a:schemeClr val="bg1"/>
+              </a:solidFill>
               <a:latin typeface="メイリオ" panose="020B0604030504040204" pitchFamily="50" charset="-128"/>
               <a:ea typeface="メイリオ" panose="020B0604030504040204" pitchFamily="50" charset="-128"/>
               <a:cs typeface="メイリオ" panose="020B0604030504040204" pitchFamily="50" charset="-128"/>

</xml_diff>

<commit_message>
Analysis model has been reviewed and fixed.
</commit_message>
<xml_diff>
--- a/design/2016/models/2_analysis_model.pptx
+++ b/design/2016/models/2_analysis_model.pptx
@@ -11,7 +11,7 @@
     <p:sldId id="261" r:id="rId2"/>
   </p:sldIdLst>
   <p:sldSz cx="15119350" cy="10691813"/>
-  <p:notesSz cx="6735763" cy="9866313"/>
+  <p:notesSz cx="9866313" cy="14295438"/>
   <p:defaultTextStyle>
     <a:defPPr>
       <a:defRPr lang="ja-JP"/>
@@ -109,7 +109,18 @@
   </p:defaultTextStyle>
   <p:extLst>
     <p:ext uri="{EFAFB233-063F-42B5-8137-9DF3F51BA10A}">
-      <p15:sldGuideLst xmlns:p15="http://schemas.microsoft.com/office/powerpoint/2012/main" xmlns=""/>
+      <p15:sldGuideLst xmlns:p15="http://schemas.microsoft.com/office/powerpoint/2012/main">
+        <p15:guide id="1" orient="horz" pos="3367">
+          <p15:clr>
+            <a:srgbClr val="A4A3A4"/>
+          </p15:clr>
+        </p15:guide>
+        <p15:guide id="2" pos="4762">
+          <p15:clr>
+            <a:srgbClr val="A4A3A4"/>
+          </p15:clr>
+        </p15:guide>
+      </p15:sldGuideLst>
     </p:ext>
   </p:extLst>
 </p:presentation>
@@ -149,18 +160,18 @@
         </p:nvSpPr>
         <p:spPr>
           <a:xfrm>
-            <a:off x="0" y="0"/>
-            <a:ext cx="2918831" cy="495029"/>
+            <a:off x="1" y="1"/>
+            <a:ext cx="4275403" cy="717254"/>
           </a:xfrm>
           <a:prstGeom prst="rect">
             <a:avLst/>
           </a:prstGeom>
         </p:spPr>
         <p:txBody>
-          <a:bodyPr vert="horz" lIns="91440" tIns="45720" rIns="91440" bIns="45720" rtlCol="0"/>
+          <a:bodyPr vert="horz" lIns="133073" tIns="66536" rIns="133073" bIns="66536" rtlCol="0"/>
           <a:lstStyle>
             <a:lvl1pPr algn="l">
-              <a:defRPr sz="1200"/>
+              <a:defRPr sz="1700"/>
             </a:lvl1pPr>
           </a:lstStyle>
           <a:p>
@@ -180,24 +191,24 @@
         </p:nvSpPr>
         <p:spPr>
           <a:xfrm>
-            <a:off x="3815373" y="0"/>
-            <a:ext cx="2918831" cy="495029"/>
+            <a:off x="5588627" y="1"/>
+            <a:ext cx="4275403" cy="717254"/>
           </a:xfrm>
           <a:prstGeom prst="rect">
             <a:avLst/>
           </a:prstGeom>
         </p:spPr>
         <p:txBody>
-          <a:bodyPr vert="horz" lIns="91440" tIns="45720" rIns="91440" bIns="45720" rtlCol="0"/>
+          <a:bodyPr vert="horz" lIns="133073" tIns="66536" rIns="133073" bIns="66536" rtlCol="0"/>
           <a:lstStyle>
             <a:lvl1pPr algn="r">
-              <a:defRPr sz="1200"/>
+              <a:defRPr sz="1700"/>
             </a:lvl1pPr>
           </a:lstStyle>
           <a:p>
             <a:fld id="{729140AA-5DCF-4644-846F-5EE03622738A}" type="datetimeFigureOut">
               <a:rPr kumimoji="1" lang="ja-JP" altLang="en-US" smtClean="0"/>
-              <a:t>2016/8/16</a:t>
+              <a:t>2016/8/17</a:t>
             </a:fld>
             <a:endParaRPr kumimoji="1" lang="ja-JP" altLang="en-US"/>
           </a:p>
@@ -215,8 +226,8 @@
         </p:nvSpPr>
         <p:spPr>
           <a:xfrm>
-            <a:off x="1014413" y="1233488"/>
-            <a:ext cx="4706937" cy="3328987"/>
+            <a:off x="1522413" y="1787525"/>
+            <a:ext cx="6821487" cy="4822825"/>
           </a:xfrm>
           <a:prstGeom prst="rect">
             <a:avLst/>
@@ -229,7 +240,7 @@
           </a:ln>
         </p:spPr>
         <p:txBody>
-          <a:bodyPr vert="horz" lIns="91440" tIns="45720" rIns="91440" bIns="45720" rtlCol="0" anchor="ctr"/>
+          <a:bodyPr vert="horz" lIns="133073" tIns="66536" rIns="133073" bIns="66536" rtlCol="0" anchor="ctr"/>
           <a:lstStyle/>
           <a:p>
             <a:endParaRPr lang="ja-JP" altLang="en-US"/>
@@ -248,15 +259,15 @@
         </p:nvSpPr>
         <p:spPr>
           <a:xfrm>
-            <a:off x="673577" y="4748163"/>
-            <a:ext cx="5388610" cy="3884861"/>
+            <a:off x="986632" y="6879680"/>
+            <a:ext cx="7893050" cy="5628829"/>
           </a:xfrm>
           <a:prstGeom prst="rect">
             <a:avLst/>
           </a:prstGeom>
         </p:spPr>
         <p:txBody>
-          <a:bodyPr vert="horz" lIns="91440" tIns="45720" rIns="91440" bIns="45720" rtlCol="0"/>
+          <a:bodyPr vert="horz" lIns="133073" tIns="66536" rIns="133073" bIns="66536" rtlCol="0"/>
           <a:lstStyle/>
           <a:p>
             <a:pPr lvl="0"/>
@@ -340,18 +351,18 @@
         </p:nvSpPr>
         <p:spPr>
           <a:xfrm>
-            <a:off x="0" y="9371286"/>
-            <a:ext cx="2918831" cy="495028"/>
+            <a:off x="1" y="13578186"/>
+            <a:ext cx="4275403" cy="717253"/>
           </a:xfrm>
           <a:prstGeom prst="rect">
             <a:avLst/>
           </a:prstGeom>
         </p:spPr>
         <p:txBody>
-          <a:bodyPr vert="horz" lIns="91440" tIns="45720" rIns="91440" bIns="45720" rtlCol="0" anchor="b"/>
+          <a:bodyPr vert="horz" lIns="133073" tIns="66536" rIns="133073" bIns="66536" rtlCol="0" anchor="b"/>
           <a:lstStyle>
             <a:lvl1pPr algn="l">
-              <a:defRPr sz="1200"/>
+              <a:defRPr sz="1700"/>
             </a:lvl1pPr>
           </a:lstStyle>
           <a:p>
@@ -371,18 +382,18 @@
         </p:nvSpPr>
         <p:spPr>
           <a:xfrm>
-            <a:off x="3815373" y="9371286"/>
-            <a:ext cx="2918831" cy="495028"/>
+            <a:off x="5588627" y="13578186"/>
+            <a:ext cx="4275403" cy="717253"/>
           </a:xfrm>
           <a:prstGeom prst="rect">
             <a:avLst/>
           </a:prstGeom>
         </p:spPr>
         <p:txBody>
-          <a:bodyPr vert="horz" lIns="91440" tIns="45720" rIns="91440" bIns="45720" rtlCol="0" anchor="b"/>
+          <a:bodyPr vert="horz" lIns="133073" tIns="66536" rIns="133073" bIns="66536" rtlCol="0" anchor="b"/>
           <a:lstStyle>
             <a:lvl1pPr algn="r">
-              <a:defRPr sz="1200"/>
+              <a:defRPr sz="1700"/>
             </a:lvl1pPr>
           </a:lstStyle>
           <a:p>
@@ -628,7 +639,7 @@
           <a:p>
             <a:fld id="{D72B48E1-50D5-40B7-9AA4-D680720A3CD4}" type="datetimeFigureOut">
               <a:rPr kumimoji="1" lang="ja-JP" altLang="en-US" smtClean="0"/>
-              <a:t>2016/8/16</a:t>
+              <a:t>2016/8/17</a:t>
             </a:fld>
             <a:endParaRPr kumimoji="1" lang="ja-JP" altLang="en-US"/>
           </a:p>
@@ -830,7 +841,7 @@
           <a:p>
             <a:fld id="{D72B48E1-50D5-40B7-9AA4-D680720A3CD4}" type="datetimeFigureOut">
               <a:rPr kumimoji="1" lang="ja-JP" altLang="en-US" smtClean="0"/>
-              <a:t>2016/8/16</a:t>
+              <a:t>2016/8/17</a:t>
             </a:fld>
             <a:endParaRPr kumimoji="1" lang="ja-JP" altLang="en-US"/>
           </a:p>
@@ -1042,7 +1053,7 @@
           <a:p>
             <a:fld id="{D72B48E1-50D5-40B7-9AA4-D680720A3CD4}" type="datetimeFigureOut">
               <a:rPr kumimoji="1" lang="ja-JP" altLang="en-US" smtClean="0"/>
-              <a:t>2016/8/16</a:t>
+              <a:t>2016/8/17</a:t>
             </a:fld>
             <a:endParaRPr kumimoji="1" lang="ja-JP" altLang="en-US"/>
           </a:p>
@@ -1281,7 +1292,7 @@
           <a:p>
             <a:fld id="{D72B48E1-50D5-40B7-9AA4-D680720A3CD4}" type="datetimeFigureOut">
               <a:rPr kumimoji="1" lang="ja-JP" altLang="en-US" smtClean="0"/>
-              <a:t>2016/8/16</a:t>
+              <a:t>2016/8/17</a:t>
             </a:fld>
             <a:endParaRPr kumimoji="1" lang="ja-JP" altLang="en-US"/>
           </a:p>
@@ -1525,7 +1536,7 @@
           <a:p>
             <a:fld id="{D72B48E1-50D5-40B7-9AA4-D680720A3CD4}" type="datetimeFigureOut">
               <a:rPr kumimoji="1" lang="ja-JP" altLang="en-US" smtClean="0"/>
-              <a:t>2016/8/16</a:t>
+              <a:t>2016/8/17</a:t>
             </a:fld>
             <a:endParaRPr kumimoji="1" lang="ja-JP" altLang="en-US"/>
           </a:p>
@@ -1821,7 +1832,7 @@
           <a:p>
             <a:fld id="{D72B48E1-50D5-40B7-9AA4-D680720A3CD4}" type="datetimeFigureOut">
               <a:rPr kumimoji="1" lang="ja-JP" altLang="en-US" smtClean="0"/>
-              <a:t>2016/8/16</a:t>
+              <a:t>2016/8/17</a:t>
             </a:fld>
             <a:endParaRPr kumimoji="1" lang="ja-JP" altLang="en-US"/>
           </a:p>
@@ -2252,7 +2263,7 @@
           <a:p>
             <a:fld id="{D72B48E1-50D5-40B7-9AA4-D680720A3CD4}" type="datetimeFigureOut">
               <a:rPr kumimoji="1" lang="ja-JP" altLang="en-US" smtClean="0"/>
-              <a:t>2016/8/16</a:t>
+              <a:t>2016/8/17</a:t>
             </a:fld>
             <a:endParaRPr kumimoji="1" lang="ja-JP" altLang="en-US"/>
           </a:p>
@@ -2370,7 +2381,7 @@
           <a:p>
             <a:fld id="{D72B48E1-50D5-40B7-9AA4-D680720A3CD4}" type="datetimeFigureOut">
               <a:rPr kumimoji="1" lang="ja-JP" altLang="en-US" smtClean="0"/>
-              <a:t>2016/8/16</a:t>
+              <a:t>2016/8/17</a:t>
             </a:fld>
             <a:endParaRPr kumimoji="1" lang="ja-JP" altLang="en-US"/>
           </a:p>
@@ -2465,7 +2476,7 @@
           <a:p>
             <a:fld id="{D72B48E1-50D5-40B7-9AA4-D680720A3CD4}" type="datetimeFigureOut">
               <a:rPr kumimoji="1" lang="ja-JP" altLang="en-US" smtClean="0"/>
-              <a:t>2016/8/16</a:t>
+              <a:t>2016/8/17</a:t>
             </a:fld>
             <a:endParaRPr kumimoji="1" lang="ja-JP" altLang="en-US"/>
           </a:p>
@@ -2774,7 +2785,7 @@
           <a:p>
             <a:fld id="{D72B48E1-50D5-40B7-9AA4-D680720A3CD4}" type="datetimeFigureOut">
               <a:rPr kumimoji="1" lang="ja-JP" altLang="en-US" smtClean="0"/>
-              <a:t>2016/8/16</a:t>
+              <a:t>2016/8/17</a:t>
             </a:fld>
             <a:endParaRPr kumimoji="1" lang="ja-JP" altLang="en-US"/>
           </a:p>
@@ -3031,7 +3042,7 @@
           <a:p>
             <a:fld id="{D72B48E1-50D5-40B7-9AA4-D680720A3CD4}" type="datetimeFigureOut">
               <a:rPr kumimoji="1" lang="ja-JP" altLang="en-US" smtClean="0"/>
-              <a:t>2016/8/16</a:t>
+              <a:t>2016/8/17</a:t>
             </a:fld>
             <a:endParaRPr kumimoji="1" lang="ja-JP" altLang="en-US"/>
           </a:p>
@@ -3276,7 +3287,7 @@
           <a:p>
             <a:fld id="{D72B48E1-50D5-40B7-9AA4-D680720A3CD4}" type="datetimeFigureOut">
               <a:rPr kumimoji="1" lang="ja-JP" altLang="en-US" smtClean="0"/>
-              <a:t>2016/8/16</a:t>
+              <a:t>2016/8/17</a:t>
             </a:fld>
             <a:endParaRPr kumimoji="1" lang="ja-JP" altLang="en-US"/>
           </a:p>
@@ -4504,7 +4515,7 @@
         <p:spPr>
           <a:xfrm>
             <a:off x="6260542" y="6387063"/>
-            <a:ext cx="2616535" cy="307777"/>
+            <a:ext cx="1890681" cy="307777"/>
           </a:xfrm>
           <a:prstGeom prst="rect">
             <a:avLst/>
@@ -4539,7 +4550,18 @@
                 <a:ea typeface="メイリオ" panose="020B0604030504040204" pitchFamily="50" charset="-128"/>
                 <a:cs typeface="メイリオ" panose="020B0604030504040204" pitchFamily="50" charset="-128"/>
               </a:rPr>
-              <a:t> 経路の移動コストの算出</a:t>
+              <a:t> 経路</a:t>
+            </a:r>
+            <a:r>
+              <a:rPr kumimoji="1" lang="ja-JP" altLang="en-US" sz="1400" b="1" dirty="0" smtClean="0">
+                <a:solidFill>
+                  <a:schemeClr val="bg1"/>
+                </a:solidFill>
+                <a:latin typeface="メイリオ" panose="020B0604030504040204" pitchFamily="50" charset="-128"/>
+                <a:ea typeface="メイリオ" panose="020B0604030504040204" pitchFamily="50" charset="-128"/>
+                <a:cs typeface="メイリオ" panose="020B0604030504040204" pitchFamily="50" charset="-128"/>
+              </a:rPr>
+              <a:t>の選択基準</a:t>
             </a:r>
             <a:endParaRPr kumimoji="1" lang="ja-JP" altLang="en-US" sz="1400" b="1" dirty="0">
               <a:solidFill>
@@ -4560,8 +4582,8 @@
         </p:nvSpPr>
         <p:spPr>
           <a:xfrm>
-            <a:off x="6260542" y="6387064"/>
-            <a:ext cx="8423020" cy="3054426"/>
+            <a:off x="6254612" y="6387064"/>
+            <a:ext cx="8428950" cy="3054426"/>
           </a:xfrm>
           <a:prstGeom prst="rect">
             <a:avLst/>
@@ -4664,7 +4686,7 @@
         <p:spPr>
           <a:xfrm>
             <a:off x="392103" y="1894505"/>
-            <a:ext cx="5938710" cy="1015663"/>
+            <a:ext cx="5938710" cy="830997"/>
           </a:xfrm>
           <a:prstGeom prst="rect">
             <a:avLst/>
@@ -4684,7 +4706,23 @@
                 <a:ea typeface="メイリオ" panose="020B0604030504040204" pitchFamily="50" charset="-128"/>
                 <a:cs typeface="メイリオ" panose="020B0604030504040204" pitchFamily="50" charset="-128"/>
               </a:rPr>
-              <a:t>４ｘ４マスの格子であるゲームエリアを、格子点間の中点で分割し、右図のような座標系で表現した</a:t>
+              <a:t>４ｘ４マスの格子であるゲームエリアを、格子点間の中点で分割し</a:t>
+            </a:r>
+            <a:r>
+              <a:rPr kumimoji="1" lang="ja-JP" altLang="en-US" sz="1200" dirty="0" smtClean="0">
+                <a:latin typeface="メイリオ" panose="020B0604030504040204" pitchFamily="50" charset="-128"/>
+                <a:ea typeface="メイリオ" panose="020B0604030504040204" pitchFamily="50" charset="-128"/>
+                <a:cs typeface="メイリオ" panose="020B0604030504040204" pitchFamily="50" charset="-128"/>
+              </a:rPr>
+              <a:t>、下図</a:t>
+            </a:r>
+            <a:r>
+              <a:rPr kumimoji="1" lang="ja-JP" altLang="en-US" sz="1200" dirty="0" smtClean="0">
+                <a:latin typeface="メイリオ" panose="020B0604030504040204" pitchFamily="50" charset="-128"/>
+                <a:ea typeface="メイリオ" panose="020B0604030504040204" pitchFamily="50" charset="-128"/>
+                <a:cs typeface="メイリオ" panose="020B0604030504040204" pitchFamily="50" charset="-128"/>
+              </a:rPr>
+              <a:t>のような座標系で表現した</a:t>
             </a:r>
             <a:r>
               <a:rPr kumimoji="1" lang="ja-JP" altLang="en-US" sz="1200" b="1" dirty="0" smtClean="0">
@@ -4727,23 +4765,7 @@
                 <a:ea typeface="メイリオ" panose="020B0604030504040204" pitchFamily="50" charset="-128"/>
                 <a:cs typeface="メイリオ" panose="020B0604030504040204" pitchFamily="50" charset="-128"/>
               </a:rPr>
-              <a:t>ブロックの</a:t>
-            </a:r>
-            <a:r>
-              <a:rPr lang="ja-JP" altLang="en-US" sz="1200" dirty="0" smtClean="0">
-                <a:latin typeface="メイリオ" panose="020B0604030504040204" pitchFamily="50" charset="-128"/>
-                <a:ea typeface="メイリオ" panose="020B0604030504040204" pitchFamily="50" charset="-128"/>
-                <a:cs typeface="メイリオ" panose="020B0604030504040204" pitchFamily="50" charset="-128"/>
-              </a:rPr>
-              <a:t>有無を</a:t>
-            </a:r>
-            <a:r>
-              <a:rPr lang="ja-JP" altLang="en-US" sz="1200" dirty="0" smtClean="0">
-                <a:latin typeface="メイリオ" panose="020B0604030504040204" pitchFamily="50" charset="-128"/>
-                <a:ea typeface="メイリオ" panose="020B0604030504040204" pitchFamily="50" charset="-128"/>
-                <a:cs typeface="メイリオ" panose="020B0604030504040204" pitchFamily="50" charset="-128"/>
-              </a:rPr>
-              <a:t>持つ</a:t>
+              <a:t>ブロックの有無を持つ</a:t>
             </a:r>
             <a:r>
               <a:rPr lang="ja-JP" altLang="en-US" sz="1200" b="1" dirty="0" smtClean="0">
@@ -4762,7 +4784,7 @@
                 <a:ea typeface="メイリオ" panose="020B0604030504040204" pitchFamily="50" charset="-128"/>
                 <a:cs typeface="メイリオ" panose="020B0604030504040204" pitchFamily="50" charset="-128"/>
               </a:rPr>
-              <a:t>として表現される</a:t>
+              <a:t>として</a:t>
             </a:r>
             <a:r>
               <a:rPr lang="ja-JP" altLang="en-US" sz="1200" dirty="0" smtClean="0">
@@ -4770,7 +4792,111 @@
                 <a:ea typeface="メイリオ" panose="020B0604030504040204" pitchFamily="50" charset="-128"/>
                 <a:cs typeface="メイリオ" panose="020B0604030504040204" pitchFamily="50" charset="-128"/>
               </a:rPr>
-              <a:t>。走行体の振る舞いはこの抽象マップ上で検討され、実際の動作へと変換される。</a:t>
+              <a:t>表現</a:t>
+            </a:r>
+            <a:r>
+              <a:rPr lang="ja-JP" altLang="en-US" sz="1200" dirty="0" smtClean="0">
+                <a:latin typeface="メイリオ" panose="020B0604030504040204" pitchFamily="50" charset="-128"/>
+                <a:ea typeface="メイリオ" panose="020B0604030504040204" pitchFamily="50" charset="-128"/>
+                <a:cs typeface="メイリオ" panose="020B0604030504040204" pitchFamily="50" charset="-128"/>
+              </a:rPr>
+              <a:t>す</a:t>
+            </a:r>
+            <a:r>
+              <a:rPr lang="ja-JP" altLang="en-US" sz="1200" dirty="0">
+                <a:latin typeface="メイリオ" panose="020B0604030504040204" pitchFamily="50" charset="-128"/>
+                <a:ea typeface="メイリオ" panose="020B0604030504040204" pitchFamily="50" charset="-128"/>
+                <a:cs typeface="メイリオ" panose="020B0604030504040204" pitchFamily="50" charset="-128"/>
+              </a:rPr>
+              <a:t>る</a:t>
+            </a:r>
+            <a:r>
+              <a:rPr lang="ja-JP" altLang="en-US" sz="1200" dirty="0" smtClean="0">
+                <a:latin typeface="メイリオ" panose="020B0604030504040204" pitchFamily="50" charset="-128"/>
+                <a:ea typeface="メイリオ" panose="020B0604030504040204" pitchFamily="50" charset="-128"/>
+                <a:cs typeface="メイリオ" panose="020B0604030504040204" pitchFamily="50" charset="-128"/>
+              </a:rPr>
+              <a:t>。</a:t>
+            </a:r>
+            <a:r>
+              <a:rPr lang="ja-JP" altLang="en-US" sz="1200" dirty="0" smtClean="0">
+                <a:latin typeface="メイリオ" panose="020B0604030504040204" pitchFamily="50" charset="-128"/>
+                <a:ea typeface="メイリオ" panose="020B0604030504040204" pitchFamily="50" charset="-128"/>
+                <a:cs typeface="メイリオ" panose="020B0604030504040204" pitchFamily="50" charset="-128"/>
+              </a:rPr>
+              <a:t>走行体の</a:t>
+            </a:r>
+            <a:r>
+              <a:rPr lang="ja-JP" altLang="en-US" sz="1200" dirty="0" smtClean="0">
+                <a:latin typeface="メイリオ" panose="020B0604030504040204" pitchFamily="50" charset="-128"/>
+                <a:ea typeface="メイリオ" panose="020B0604030504040204" pitchFamily="50" charset="-128"/>
+                <a:cs typeface="メイリオ" panose="020B0604030504040204" pitchFamily="50" charset="-128"/>
+              </a:rPr>
+              <a:t>振る舞い</a:t>
+            </a:r>
+            <a:r>
+              <a:rPr lang="ja-JP" altLang="en-US" sz="1200" dirty="0">
+                <a:latin typeface="メイリオ" panose="020B0604030504040204" pitchFamily="50" charset="-128"/>
+                <a:ea typeface="メイリオ" panose="020B0604030504040204" pitchFamily="50" charset="-128"/>
+                <a:cs typeface="メイリオ" panose="020B0604030504040204" pitchFamily="50" charset="-128"/>
+              </a:rPr>
+              <a:t>を</a:t>
+            </a:r>
+            <a:r>
+              <a:rPr lang="ja-JP" altLang="en-US" sz="1200" dirty="0" smtClean="0">
+                <a:latin typeface="メイリオ" panose="020B0604030504040204" pitchFamily="50" charset="-128"/>
+                <a:ea typeface="メイリオ" panose="020B0604030504040204" pitchFamily="50" charset="-128"/>
+                <a:cs typeface="メイリオ" panose="020B0604030504040204" pitchFamily="50" charset="-128"/>
+              </a:rPr>
+              <a:t>抽象</a:t>
+            </a:r>
+            <a:r>
+              <a:rPr lang="ja-JP" altLang="en-US" sz="1200" dirty="0" smtClean="0">
+                <a:latin typeface="メイリオ" panose="020B0604030504040204" pitchFamily="50" charset="-128"/>
+                <a:ea typeface="メイリオ" panose="020B0604030504040204" pitchFamily="50" charset="-128"/>
+                <a:cs typeface="メイリオ" panose="020B0604030504040204" pitchFamily="50" charset="-128"/>
+              </a:rPr>
+              <a:t>マップ上で</a:t>
+            </a:r>
+            <a:r>
+              <a:rPr lang="ja-JP" altLang="en-US" sz="1200" dirty="0" smtClean="0">
+                <a:latin typeface="メイリオ" panose="020B0604030504040204" pitchFamily="50" charset="-128"/>
+                <a:ea typeface="メイリオ" panose="020B0604030504040204" pitchFamily="50" charset="-128"/>
+                <a:cs typeface="メイリオ" panose="020B0604030504040204" pitchFamily="50" charset="-128"/>
+              </a:rPr>
+              <a:t>検討</a:t>
+            </a:r>
+            <a:r>
+              <a:rPr lang="ja-JP" altLang="en-US" sz="1200" dirty="0">
+                <a:latin typeface="メイリオ" panose="020B0604030504040204" pitchFamily="50" charset="-128"/>
+                <a:ea typeface="メイリオ" panose="020B0604030504040204" pitchFamily="50" charset="-128"/>
+                <a:cs typeface="メイリオ" panose="020B0604030504040204" pitchFamily="50" charset="-128"/>
+              </a:rPr>
+              <a:t>し</a:t>
+            </a:r>
+            <a:r>
+              <a:rPr lang="ja-JP" altLang="en-US" sz="1200" dirty="0" smtClean="0">
+                <a:latin typeface="メイリオ" panose="020B0604030504040204" pitchFamily="50" charset="-128"/>
+                <a:ea typeface="メイリオ" panose="020B0604030504040204" pitchFamily="50" charset="-128"/>
+                <a:cs typeface="メイリオ" panose="020B0604030504040204" pitchFamily="50" charset="-128"/>
+              </a:rPr>
+              <a:t>、</a:t>
+            </a:r>
+            <a:r>
+              <a:rPr lang="ja-JP" altLang="en-US" sz="1200" dirty="0" smtClean="0">
+                <a:latin typeface="メイリオ" panose="020B0604030504040204" pitchFamily="50" charset="-128"/>
+                <a:ea typeface="メイリオ" panose="020B0604030504040204" pitchFamily="50" charset="-128"/>
+                <a:cs typeface="メイリオ" panose="020B0604030504040204" pitchFamily="50" charset="-128"/>
+              </a:rPr>
+              <a:t>実際の動作</a:t>
+            </a:r>
+            <a:r>
+              <a:rPr lang="ja-JP" altLang="en-US" sz="1200" dirty="0" smtClean="0">
+                <a:latin typeface="メイリオ" panose="020B0604030504040204" pitchFamily="50" charset="-128"/>
+                <a:ea typeface="メイリオ" panose="020B0604030504040204" pitchFamily="50" charset="-128"/>
+                <a:cs typeface="メイリオ" panose="020B0604030504040204" pitchFamily="50" charset="-128"/>
+              </a:rPr>
+              <a:t>へ変換する。</a:t>
             </a:r>
             <a:endParaRPr lang="en-US" altLang="ja-JP" sz="1200" dirty="0" smtClean="0">
               <a:latin typeface="メイリオ" panose="020B0604030504040204" pitchFamily="50" charset="-128"/>
@@ -4870,7 +4996,29 @@
                 <a:ea typeface="メイリオ" panose="020B0604030504040204" pitchFamily="50" charset="-128"/>
                 <a:cs typeface="メイリオ" panose="020B0604030504040204" pitchFamily="50" charset="-128"/>
               </a:rPr>
-              <a:t> ブロックの色の管理</a:t>
+              <a:t> </a:t>
+            </a:r>
+            <a:r>
+              <a:rPr kumimoji="1" lang="ja-JP" altLang="en-US" sz="1400" b="1" dirty="0" smtClean="0">
+                <a:solidFill>
+                  <a:schemeClr val="bg1"/>
+                </a:solidFill>
+                <a:latin typeface="メイリオ" panose="020B0604030504040204" pitchFamily="50" charset="-128"/>
+                <a:ea typeface="メイリオ" panose="020B0604030504040204" pitchFamily="50" charset="-128"/>
+                <a:cs typeface="メイリオ" panose="020B0604030504040204" pitchFamily="50" charset="-128"/>
+              </a:rPr>
+              <a:t>ブロックの</a:t>
+            </a:r>
+            <a:r>
+              <a:rPr kumimoji="1" lang="ja-JP" altLang="en-US" sz="1400" b="1" dirty="0" smtClean="0">
+                <a:solidFill>
+                  <a:schemeClr val="bg1"/>
+                </a:solidFill>
+                <a:latin typeface="メイリオ" panose="020B0604030504040204" pitchFamily="50" charset="-128"/>
+                <a:ea typeface="メイリオ" panose="020B0604030504040204" pitchFamily="50" charset="-128"/>
+                <a:cs typeface="メイリオ" panose="020B0604030504040204" pitchFamily="50" charset="-128"/>
+              </a:rPr>
+              <a:t>色の管理</a:t>
             </a:r>
             <a:endParaRPr kumimoji="1" lang="ja-JP" altLang="en-US" sz="1400" b="1" dirty="0">
               <a:solidFill>
@@ -4938,7 +5086,7 @@
         <p:spPr>
           <a:xfrm>
             <a:off x="6265802" y="1777929"/>
-            <a:ext cx="2967479" cy="307777"/>
+            <a:ext cx="2428870" cy="307777"/>
           </a:xfrm>
           <a:prstGeom prst="rect">
             <a:avLst/>
@@ -4984,7 +5132,29 @@
                 <a:ea typeface="メイリオ" panose="020B0604030504040204" pitchFamily="50" charset="-128"/>
                 <a:cs typeface="メイリオ" panose="020B0604030504040204" pitchFamily="50" charset="-128"/>
               </a:rPr>
-              <a:t>抽象マップ上での移動の規則</a:t>
+              <a:t>抽象</a:t>
+            </a:r>
+            <a:r>
+              <a:rPr lang="ja-JP" altLang="en-US" sz="1400" b="1" dirty="0" smtClean="0">
+                <a:solidFill>
+                  <a:schemeClr val="bg1"/>
+                </a:solidFill>
+                <a:latin typeface="メイリオ" panose="020B0604030504040204" pitchFamily="50" charset="-128"/>
+                <a:ea typeface="メイリオ" panose="020B0604030504040204" pitchFamily="50" charset="-128"/>
+                <a:cs typeface="メイリオ" panose="020B0604030504040204" pitchFamily="50" charset="-128"/>
+              </a:rPr>
+              <a:t>走行体の</a:t>
+            </a:r>
+            <a:r>
+              <a:rPr kumimoji="1" lang="ja-JP" altLang="en-US" sz="1400" b="1" dirty="0" smtClean="0">
+                <a:solidFill>
+                  <a:schemeClr val="bg1"/>
+                </a:solidFill>
+                <a:latin typeface="メイリオ" panose="020B0604030504040204" pitchFamily="50" charset="-128"/>
+                <a:ea typeface="メイリオ" panose="020B0604030504040204" pitchFamily="50" charset="-128"/>
+                <a:cs typeface="メイリオ" panose="020B0604030504040204" pitchFamily="50" charset="-128"/>
+              </a:rPr>
+              <a:t>移動規則</a:t>
             </a:r>
             <a:endParaRPr kumimoji="1" lang="ja-JP" altLang="en-US" sz="1400" b="1" dirty="0">
               <a:solidFill>
@@ -5006,7 +5176,7 @@
         <p:spPr>
           <a:xfrm>
             <a:off x="6391775" y="1836444"/>
-            <a:ext cx="6608362" cy="1323439"/>
+            <a:ext cx="6723272" cy="1323439"/>
           </a:xfrm>
           <a:prstGeom prst="rect">
             <a:avLst/>
@@ -5018,7 +5188,7 @@
           </a:bodyPr>
           <a:lstStyle/>
           <a:p>
-            <a:pPr indent="2870200"/>
+            <a:pPr indent="2333625"/>
             <a:r>
               <a:rPr lang="ja-JP" altLang="en-US" sz="1200" dirty="0" smtClean="0">
                 <a:latin typeface="メイリオ" panose="020B0604030504040204" pitchFamily="50" charset="-128"/>
@@ -5050,7 +5220,15 @@
                 <a:ea typeface="メイリオ" panose="020B0604030504040204" pitchFamily="50" charset="-128"/>
                 <a:cs typeface="メイリオ" panose="020B0604030504040204" pitchFamily="50" charset="-128"/>
               </a:rPr>
-              <a:t>移動中を除き、常に</a:t>
+              <a:t>停止中は、</a:t>
+            </a:r>
+            <a:r>
+              <a:rPr lang="ja-JP" altLang="en-US" sz="1200" dirty="0" smtClean="0">
+                <a:latin typeface="メイリオ" panose="020B0604030504040204" pitchFamily="50" charset="-128"/>
+                <a:ea typeface="メイリオ" panose="020B0604030504040204" pitchFamily="50" charset="-128"/>
+                <a:cs typeface="メイリオ" panose="020B0604030504040204" pitchFamily="50" charset="-128"/>
+              </a:rPr>
+              <a:t>常にサークルとサークルの中間</a:t>
             </a:r>
             <a:r>
               <a:rPr lang="en-US" altLang="ja-JP" sz="1200" dirty="0" smtClean="0">
@@ -5058,7 +5236,7 @@
                 <a:ea typeface="メイリオ" panose="020B0604030504040204" pitchFamily="50" charset="-128"/>
                 <a:cs typeface="メイリオ" panose="020B0604030504040204" pitchFamily="50" charset="-128"/>
               </a:rPr>
-              <a:t>XY</a:t>
+              <a:t>(</a:t>
             </a:r>
             <a:r>
               <a:rPr lang="ja-JP" altLang="en-US" sz="1200" dirty="0" smtClean="0">
@@ -5066,15 +5244,7 @@
                 <a:ea typeface="メイリオ" panose="020B0604030504040204" pitchFamily="50" charset="-128"/>
                 <a:cs typeface="メイリオ" panose="020B0604030504040204" pitchFamily="50" charset="-128"/>
               </a:rPr>
-              <a:t>座標の</a:t>
-            </a:r>
-            <a:r>
-              <a:rPr lang="ja-JP" altLang="en-US" sz="1200" b="1" dirty="0" smtClean="0">
-                <a:latin typeface="メイリオ" panose="020B0604030504040204" pitchFamily="50" charset="-128"/>
-                <a:ea typeface="メイリオ" panose="020B0604030504040204" pitchFamily="50" charset="-128"/>
-                <a:cs typeface="メイリオ" panose="020B0604030504040204" pitchFamily="50" charset="-128"/>
-              </a:rPr>
-              <a:t>一方のみが奇数</a:t>
+              <a:t>以降</a:t>
             </a:r>
             <a:r>
               <a:rPr lang="ja-JP" altLang="en-US" sz="1200" dirty="0" smtClean="0">
@@ -5082,7 +5252,7 @@
                 <a:ea typeface="メイリオ" panose="020B0604030504040204" pitchFamily="50" charset="-128"/>
                 <a:cs typeface="メイリオ" panose="020B0604030504040204" pitchFamily="50" charset="-128"/>
               </a:rPr>
-              <a:t>の点（以後、</a:t>
+              <a:t>、</a:t>
             </a:r>
             <a:r>
               <a:rPr lang="ja-JP" altLang="en-US" sz="1200" b="1" dirty="0" smtClean="0">
@@ -5096,12 +5266,28 @@
               <a:t>中間点</a:t>
             </a:r>
             <a:r>
+              <a:rPr lang="en-US" altLang="ja-JP" sz="1200" dirty="0">
+                <a:latin typeface="メイリオ" panose="020B0604030504040204" pitchFamily="50" charset="-128"/>
+                <a:ea typeface="メイリオ" panose="020B0604030504040204" pitchFamily="50" charset="-128"/>
+                <a:cs typeface="メイリオ" panose="020B0604030504040204" pitchFamily="50" charset="-128"/>
+              </a:rPr>
+              <a:t>)</a:t>
+            </a:r>
+            <a:r>
               <a:rPr lang="ja-JP" altLang="en-US" sz="1200" dirty="0" smtClean="0">
                 <a:latin typeface="メイリオ" panose="020B0604030504040204" pitchFamily="50" charset="-128"/>
                 <a:ea typeface="メイリオ" panose="020B0604030504040204" pitchFamily="50" charset="-128"/>
                 <a:cs typeface="メイリオ" panose="020B0604030504040204" pitchFamily="50" charset="-128"/>
               </a:rPr>
-              <a:t>）に存在する。</a:t>
+              <a:t>に</a:t>
+            </a:r>
+            <a:r>
+              <a:rPr lang="ja-JP" altLang="en-US" sz="1200" dirty="0" smtClean="0">
+                <a:latin typeface="メイリオ" panose="020B0604030504040204" pitchFamily="50" charset="-128"/>
+                <a:ea typeface="メイリオ" panose="020B0604030504040204" pitchFamily="50" charset="-128"/>
+                <a:cs typeface="メイリオ" panose="020B0604030504040204" pitchFamily="50" charset="-128"/>
+              </a:rPr>
+              <a:t>存在する。</a:t>
             </a:r>
             <a:endParaRPr lang="en-US" altLang="ja-JP" sz="1200" dirty="0" smtClean="0">
               <a:latin typeface="メイリオ" panose="020B0604030504040204" pitchFamily="50" charset="-128"/>
@@ -5132,10 +5318,18 @@
                 <a:ea typeface="メイリオ" panose="020B0604030504040204" pitchFamily="50" charset="-128"/>
                 <a:cs typeface="メイリオ" panose="020B0604030504040204" pitchFamily="50" charset="-128"/>
               </a:rPr>
-              <a:t>停止中の向きは必ず</a:t>
-            </a:r>
-            <a:r>
-              <a:rPr lang="en-US" altLang="ja-JP" sz="1200" dirty="0">
+              <a:t>停止中の向き</a:t>
+            </a:r>
+            <a:r>
+              <a:rPr lang="ja-JP" altLang="en-US" sz="1200" dirty="0" smtClean="0">
+                <a:latin typeface="メイリオ" panose="020B0604030504040204" pitchFamily="50" charset="-128"/>
+                <a:ea typeface="メイリオ" panose="020B0604030504040204" pitchFamily="50" charset="-128"/>
+                <a:cs typeface="メイリオ" panose="020B0604030504040204" pitchFamily="50" charset="-128"/>
+              </a:rPr>
+              <a:t>は、必ず</a:t>
+            </a:r>
+            <a:r>
+              <a:rPr lang="en-US" altLang="ja-JP" sz="1200" dirty="0" smtClean="0">
                 <a:latin typeface="メイリオ" panose="020B0604030504040204" pitchFamily="50" charset="-128"/>
                 <a:ea typeface="メイリオ" panose="020B0604030504040204" pitchFamily="50" charset="-128"/>
                 <a:cs typeface="メイリオ" panose="020B0604030504040204" pitchFamily="50" charset="-128"/>
@@ -5143,28 +5337,36 @@
               <a:t>X</a:t>
             </a:r>
             <a:r>
+              <a:rPr lang="ja-JP" altLang="en-US" sz="1200" dirty="0" smtClean="0">
+                <a:latin typeface="メイリオ" panose="020B0604030504040204" pitchFamily="50" charset="-128"/>
+                <a:ea typeface="メイリオ" panose="020B0604030504040204" pitchFamily="50" charset="-128"/>
+                <a:cs typeface="メイリオ" panose="020B0604030504040204" pitchFamily="50" charset="-128"/>
+              </a:rPr>
+              <a:t>または</a:t>
+            </a:r>
+            <a:r>
+              <a:rPr lang="en-US" altLang="ja-JP" sz="1200" dirty="0" smtClean="0">
+                <a:latin typeface="メイリオ" panose="020B0604030504040204" pitchFamily="50" charset="-128"/>
+                <a:ea typeface="メイリオ" panose="020B0604030504040204" pitchFamily="50" charset="-128"/>
+                <a:cs typeface="メイリオ" panose="020B0604030504040204" pitchFamily="50" charset="-128"/>
+              </a:rPr>
+              <a:t>Y</a:t>
+            </a:r>
+            <a:r>
+              <a:rPr lang="ja-JP" altLang="en-US" sz="1200" dirty="0" smtClean="0">
+                <a:latin typeface="メイリオ" panose="020B0604030504040204" pitchFamily="50" charset="-128"/>
+                <a:ea typeface="メイリオ" panose="020B0604030504040204" pitchFamily="50" charset="-128"/>
+                <a:cs typeface="メイリオ" panose="020B0604030504040204" pitchFamily="50" charset="-128"/>
+              </a:rPr>
+              <a:t>軸に</a:t>
+            </a:r>
+            <a:r>
               <a:rPr lang="ja-JP" altLang="en-US" sz="1200" dirty="0">
                 <a:latin typeface="メイリオ" panose="020B0604030504040204" pitchFamily="50" charset="-128"/>
                 <a:ea typeface="メイリオ" panose="020B0604030504040204" pitchFamily="50" charset="-128"/>
                 <a:cs typeface="メイリオ" panose="020B0604030504040204" pitchFamily="50" charset="-128"/>
               </a:rPr>
-              <a:t>または</a:t>
-            </a:r>
-            <a:r>
-              <a:rPr lang="en-US" altLang="ja-JP" sz="1200" dirty="0">
-                <a:latin typeface="メイリオ" panose="020B0604030504040204" pitchFamily="50" charset="-128"/>
-                <a:ea typeface="メイリオ" panose="020B0604030504040204" pitchFamily="50" charset="-128"/>
-                <a:cs typeface="メイリオ" panose="020B0604030504040204" pitchFamily="50" charset="-128"/>
-              </a:rPr>
-              <a:t>Y</a:t>
-            </a:r>
-            <a:r>
-              <a:rPr lang="ja-JP" altLang="en-US" sz="1200" dirty="0">
-                <a:latin typeface="メイリオ" panose="020B0604030504040204" pitchFamily="50" charset="-128"/>
-                <a:ea typeface="メイリオ" panose="020B0604030504040204" pitchFamily="50" charset="-128"/>
-                <a:cs typeface="メイリオ" panose="020B0604030504040204" pitchFamily="50" charset="-128"/>
-              </a:rPr>
-              <a:t>軸に平行である。</a:t>
+              <a:t>平行である。</a:t>
             </a:r>
             <a:endParaRPr lang="en-US" altLang="ja-JP" sz="1200" dirty="0" smtClean="0">
               <a:latin typeface="メイリオ" panose="020B0604030504040204" pitchFamily="50" charset="-128"/>
@@ -5195,7 +5397,23 @@
                 <a:ea typeface="メイリオ" panose="020B0604030504040204" pitchFamily="50" charset="-128"/>
                 <a:cs typeface="メイリオ" panose="020B0604030504040204" pitchFamily="50" charset="-128"/>
               </a:rPr>
-              <a:t>把持しておらずかつ停止中のみ</a:t>
+              <a:t>把持して</a:t>
+            </a:r>
+            <a:r>
+              <a:rPr lang="ja-JP" altLang="en-US" sz="1200" b="1" dirty="0" smtClean="0">
+                <a:latin typeface="メイリオ" panose="020B0604030504040204" pitchFamily="50" charset="-128"/>
+                <a:ea typeface="メイリオ" panose="020B0604030504040204" pitchFamily="50" charset="-128"/>
+                <a:cs typeface="メイリオ" panose="020B0604030504040204" pitchFamily="50" charset="-128"/>
+              </a:rPr>
+              <a:t>おらず、かつ停止中</a:t>
+            </a:r>
+            <a:r>
+              <a:rPr lang="ja-JP" altLang="en-US" sz="1200" b="1" dirty="0" smtClean="0">
+                <a:latin typeface="メイリオ" panose="020B0604030504040204" pitchFamily="50" charset="-128"/>
+                <a:ea typeface="メイリオ" panose="020B0604030504040204" pitchFamily="50" charset="-128"/>
+                <a:cs typeface="メイリオ" panose="020B0604030504040204" pitchFamily="50" charset="-128"/>
+              </a:rPr>
+              <a:t>のみ</a:t>
             </a:r>
             <a:r>
               <a:rPr lang="ja-JP" altLang="en-US" sz="1200" dirty="0" smtClean="0">
@@ -5301,12 +5519,84 @@
               <a:t>45</a:t>
             </a:r>
             <a:r>
+              <a:rPr lang="ja-JP" altLang="en-US" sz="1200" b="1" dirty="0" smtClean="0">
+                <a:latin typeface="メイリオ" panose="020B0604030504040204" pitchFamily="50" charset="-128"/>
+                <a:ea typeface="メイリオ" panose="020B0604030504040204" pitchFamily="50" charset="-128"/>
+                <a:cs typeface="メイリオ" panose="020B0604030504040204" pitchFamily="50" charset="-128"/>
+              </a:rPr>
+              <a:t>度</a:t>
+            </a:r>
+            <a:r>
               <a:rPr lang="ja-JP" altLang="en-US" sz="1200" dirty="0" smtClean="0">
                 <a:latin typeface="メイリオ" panose="020B0604030504040204" pitchFamily="50" charset="-128"/>
                 <a:ea typeface="メイリオ" panose="020B0604030504040204" pitchFamily="50" charset="-128"/>
                 <a:cs typeface="メイリオ" panose="020B0604030504040204" pitchFamily="50" charset="-128"/>
               </a:rPr>
-              <a:t>変えることができる（左図に例示）。</a:t>
+              <a:t>変える</a:t>
+            </a:r>
+            <a:r>
+              <a:rPr lang="ja-JP" altLang="en-US" sz="1200" dirty="0" smtClean="0">
+                <a:latin typeface="メイリオ" panose="020B0604030504040204" pitchFamily="50" charset="-128"/>
+                <a:ea typeface="メイリオ" panose="020B0604030504040204" pitchFamily="50" charset="-128"/>
+                <a:cs typeface="メイリオ" panose="020B0604030504040204" pitchFamily="50" charset="-128"/>
+              </a:rPr>
+              <a:t>ことが</a:t>
+            </a:r>
+            <a:r>
+              <a:rPr lang="ja-JP" altLang="en-US" sz="1200" dirty="0" smtClean="0">
+                <a:latin typeface="メイリオ" panose="020B0604030504040204" pitchFamily="50" charset="-128"/>
+                <a:ea typeface="メイリオ" panose="020B0604030504040204" pitchFamily="50" charset="-128"/>
+                <a:cs typeface="メイリオ" panose="020B0604030504040204" pitchFamily="50" charset="-128"/>
+              </a:rPr>
+              <a:t>できる</a:t>
+            </a:r>
+            <a:r>
+              <a:rPr lang="en-US" altLang="ja-JP" sz="1200" dirty="0" smtClean="0">
+                <a:latin typeface="メイリオ" panose="020B0604030504040204" pitchFamily="50" charset="-128"/>
+                <a:ea typeface="メイリオ" panose="020B0604030504040204" pitchFamily="50" charset="-128"/>
+                <a:cs typeface="メイリオ" panose="020B0604030504040204" pitchFamily="50" charset="-128"/>
+              </a:rPr>
+              <a:t>(</a:t>
+            </a:r>
+            <a:r>
+              <a:rPr lang="ja-JP" altLang="en-US" sz="1200" dirty="0" smtClean="0">
+                <a:latin typeface="メイリオ" panose="020B0604030504040204" pitchFamily="50" charset="-128"/>
+                <a:ea typeface="メイリオ" panose="020B0604030504040204" pitchFamily="50" charset="-128"/>
+                <a:cs typeface="メイリオ" panose="020B0604030504040204" pitchFamily="50" charset="-128"/>
+              </a:rPr>
+              <a:t>左図</a:t>
+            </a:r>
+            <a:r>
+              <a:rPr lang="ja-JP" altLang="en-US" sz="1200" dirty="0" smtClean="0">
+                <a:latin typeface="メイリオ" panose="020B0604030504040204" pitchFamily="50" charset="-128"/>
+                <a:ea typeface="メイリオ" panose="020B0604030504040204" pitchFamily="50" charset="-128"/>
+                <a:cs typeface="メイリオ" panose="020B0604030504040204" pitchFamily="50" charset="-128"/>
+              </a:rPr>
+              <a:t>に</a:t>
+            </a:r>
+            <a:r>
+              <a:rPr lang="ja-JP" altLang="en-US" sz="1200" dirty="0" smtClean="0">
+                <a:latin typeface="メイリオ" panose="020B0604030504040204" pitchFamily="50" charset="-128"/>
+                <a:ea typeface="メイリオ" panose="020B0604030504040204" pitchFamily="50" charset="-128"/>
+                <a:cs typeface="メイリオ" panose="020B0604030504040204" pitchFamily="50" charset="-128"/>
+              </a:rPr>
+              <a:t>例示</a:t>
+            </a:r>
+            <a:r>
+              <a:rPr lang="en-US" altLang="ja-JP" sz="1200" dirty="0" smtClean="0">
+                <a:latin typeface="メイリオ" panose="020B0604030504040204" pitchFamily="50" charset="-128"/>
+                <a:ea typeface="メイリオ" panose="020B0604030504040204" pitchFamily="50" charset="-128"/>
+                <a:cs typeface="メイリオ" panose="020B0604030504040204" pitchFamily="50" charset="-128"/>
+              </a:rPr>
+              <a:t>)</a:t>
+            </a:r>
+            <a:r>
+              <a:rPr lang="ja-JP" altLang="en-US" sz="1200" dirty="0" err="1" smtClean="0">
+                <a:latin typeface="メイリオ" panose="020B0604030504040204" pitchFamily="50" charset="-128"/>
+                <a:ea typeface="メイリオ" panose="020B0604030504040204" pitchFamily="50" charset="-128"/>
+                <a:cs typeface="メイリオ" panose="020B0604030504040204" pitchFamily="50" charset="-128"/>
+              </a:rPr>
+              <a:t>。</a:t>
             </a:r>
             <a:endParaRPr lang="en-US" altLang="ja-JP" sz="1200" dirty="0" smtClean="0">
               <a:latin typeface="メイリオ" panose="020B0604030504040204" pitchFamily="50" charset="-128"/>
@@ -5355,8 +5645,8 @@
         </p:nvSpPr>
         <p:spPr>
           <a:xfrm>
-            <a:off x="6273040" y="3604403"/>
-            <a:ext cx="6279074" cy="2739211"/>
+            <a:off x="6273040" y="3569567"/>
+            <a:ext cx="6285918" cy="2862322"/>
           </a:xfrm>
           <a:prstGeom prst="rect">
             <a:avLst/>
@@ -5393,7 +5683,119 @@
                 <a:ea typeface="メイリオ" panose="020B0604030504040204" pitchFamily="50" charset="-128"/>
                 <a:cs typeface="メイリオ" panose="020B0604030504040204" pitchFamily="50" charset="-128"/>
               </a:rPr>
-              <a:t>  始点から終点への経路の探索範囲は、始点と、終点での走行体と反対の向きの隣接点（右図の</a:t>
+              <a:t>  始点から終点への経路の探索範囲</a:t>
+            </a:r>
+            <a:r>
+              <a:rPr lang="ja-JP" altLang="en-US" sz="1200" dirty="0" smtClean="0">
+                <a:latin typeface="メイリオ" panose="020B0604030504040204" pitchFamily="50" charset="-128"/>
+                <a:ea typeface="メイリオ" panose="020B0604030504040204" pitchFamily="50" charset="-128"/>
+                <a:cs typeface="メイリオ" panose="020B0604030504040204" pitchFamily="50" charset="-128"/>
+              </a:rPr>
+              <a:t>は、</a:t>
+            </a:r>
+            <a:r>
+              <a:rPr lang="en-US" altLang="ja-JP" sz="1200" dirty="0" smtClean="0">
+                <a:latin typeface="メイリオ" panose="020B0604030504040204" pitchFamily="50" charset="-128"/>
+                <a:ea typeface="メイリオ" panose="020B0604030504040204" pitchFamily="50" charset="-128"/>
+                <a:cs typeface="メイリオ" panose="020B0604030504040204" pitchFamily="50" charset="-128"/>
+              </a:rPr>
+              <a:t>『</a:t>
+            </a:r>
+            <a:r>
+              <a:rPr lang="ja-JP" altLang="en-US" sz="1200" dirty="0" smtClean="0">
+                <a:latin typeface="メイリオ" panose="020B0604030504040204" pitchFamily="50" charset="-128"/>
+                <a:ea typeface="メイリオ" panose="020B0604030504040204" pitchFamily="50" charset="-128"/>
+                <a:cs typeface="メイリオ" panose="020B0604030504040204" pitchFamily="50" charset="-128"/>
+              </a:rPr>
+              <a:t>始点</a:t>
+            </a:r>
+            <a:r>
+              <a:rPr lang="en-US" altLang="ja-JP" sz="1200" dirty="0" smtClean="0">
+                <a:latin typeface="メイリオ" panose="020B0604030504040204" pitchFamily="50" charset="-128"/>
+                <a:ea typeface="メイリオ" panose="020B0604030504040204" pitchFamily="50" charset="-128"/>
+                <a:cs typeface="メイリオ" panose="020B0604030504040204" pitchFamily="50" charset="-128"/>
+              </a:rPr>
+              <a:t>』</a:t>
+            </a:r>
+            <a:r>
+              <a:rPr lang="ja-JP" altLang="en-US" sz="1200" dirty="0" smtClean="0">
+                <a:latin typeface="メイリオ" panose="020B0604030504040204" pitchFamily="50" charset="-128"/>
+                <a:ea typeface="メイリオ" panose="020B0604030504040204" pitchFamily="50" charset="-128"/>
+                <a:cs typeface="メイリオ" panose="020B0604030504040204" pitchFamily="50" charset="-128"/>
+              </a:rPr>
+              <a:t>と</a:t>
+            </a:r>
+            <a:r>
+              <a:rPr lang="en-US" altLang="ja-JP" sz="1200" dirty="0" smtClean="0">
+                <a:latin typeface="メイリオ" panose="020B0604030504040204" pitchFamily="50" charset="-128"/>
+                <a:ea typeface="メイリオ" panose="020B0604030504040204" pitchFamily="50" charset="-128"/>
+                <a:cs typeface="メイリオ" panose="020B0604030504040204" pitchFamily="50" charset="-128"/>
+              </a:rPr>
+              <a:t>『</a:t>
+            </a:r>
+            <a:r>
+              <a:rPr lang="ja-JP" altLang="en-US" sz="1200" dirty="0" smtClean="0">
+                <a:latin typeface="メイリオ" panose="020B0604030504040204" pitchFamily="50" charset="-128"/>
+                <a:ea typeface="メイリオ" panose="020B0604030504040204" pitchFamily="50" charset="-128"/>
+                <a:cs typeface="メイリオ" panose="020B0604030504040204" pitchFamily="50" charset="-128"/>
+              </a:rPr>
+              <a:t>終点</a:t>
+            </a:r>
+            <a:r>
+              <a:rPr lang="ja-JP" altLang="en-US" sz="1200" dirty="0" smtClean="0">
+                <a:latin typeface="メイリオ" panose="020B0604030504040204" pitchFamily="50" charset="-128"/>
+                <a:ea typeface="メイリオ" panose="020B0604030504040204" pitchFamily="50" charset="-128"/>
+                <a:cs typeface="メイリオ" panose="020B0604030504040204" pitchFamily="50" charset="-128"/>
+              </a:rPr>
+              <a:t>での</a:t>
+            </a:r>
+            <a:r>
+              <a:rPr lang="ja-JP" altLang="en-US" sz="1200" dirty="0" smtClean="0">
+                <a:latin typeface="メイリオ" panose="020B0604030504040204" pitchFamily="50" charset="-128"/>
+                <a:ea typeface="メイリオ" panose="020B0604030504040204" pitchFamily="50" charset="-128"/>
+                <a:cs typeface="メイリオ" panose="020B0604030504040204" pitchFamily="50" charset="-128"/>
+              </a:rPr>
+              <a:t>走行体の向きと反対の</a:t>
+            </a:r>
+            <a:r>
+              <a:rPr lang="ja-JP" altLang="en-US" sz="1200" dirty="0" smtClean="0">
+                <a:latin typeface="メイリオ" panose="020B0604030504040204" pitchFamily="50" charset="-128"/>
+                <a:ea typeface="メイリオ" panose="020B0604030504040204" pitchFamily="50" charset="-128"/>
+                <a:cs typeface="メイリオ" panose="020B0604030504040204" pitchFamily="50" charset="-128"/>
+              </a:rPr>
+              <a:t>隣</a:t>
+            </a:r>
+            <a:r>
+              <a:rPr lang="ja-JP" altLang="en-US" sz="1200" dirty="0" smtClean="0">
+                <a:latin typeface="メイリオ" panose="020B0604030504040204" pitchFamily="50" charset="-128"/>
+                <a:ea typeface="メイリオ" panose="020B0604030504040204" pitchFamily="50" charset="-128"/>
+                <a:cs typeface="メイリオ" panose="020B0604030504040204" pitchFamily="50" charset="-128"/>
+              </a:rPr>
+              <a:t>接点</a:t>
+            </a:r>
+            <a:r>
+              <a:rPr lang="en-US" altLang="ja-JP" sz="1200" dirty="0" smtClean="0">
+                <a:latin typeface="メイリオ" panose="020B0604030504040204" pitchFamily="50" charset="-128"/>
+                <a:ea typeface="メイリオ" panose="020B0604030504040204" pitchFamily="50" charset="-128"/>
+                <a:cs typeface="メイリオ" panose="020B0604030504040204" pitchFamily="50" charset="-128"/>
+              </a:rPr>
+              <a:t>(</a:t>
+            </a:r>
+            <a:r>
+              <a:rPr lang="ja-JP" altLang="en-US" sz="1200" dirty="0" smtClean="0">
+                <a:latin typeface="メイリオ" panose="020B0604030504040204" pitchFamily="50" charset="-128"/>
+                <a:ea typeface="メイリオ" panose="020B0604030504040204" pitchFamily="50" charset="-128"/>
+                <a:cs typeface="メイリオ" panose="020B0604030504040204" pitchFamily="50" charset="-128"/>
+              </a:rPr>
+              <a:t>右図</a:t>
+            </a:r>
+            <a:r>
+              <a:rPr lang="ja-JP" altLang="en-US" sz="1200" dirty="0" smtClean="0">
+                <a:latin typeface="メイリオ" panose="020B0604030504040204" pitchFamily="50" charset="-128"/>
+                <a:ea typeface="メイリオ" panose="020B0604030504040204" pitchFamily="50" charset="-128"/>
+                <a:cs typeface="メイリオ" panose="020B0604030504040204" pitchFamily="50" charset="-128"/>
+              </a:rPr>
+              <a:t>の</a:t>
             </a:r>
             <a:r>
               <a:rPr lang="ja-JP" altLang="en-US" sz="1200" dirty="0" smtClean="0">
@@ -5418,12 +5820,28 @@
               <a:t>C</a:t>
             </a:r>
             <a:r>
+              <a:rPr lang="en-US" altLang="ja-JP" sz="1200" dirty="0">
+                <a:latin typeface="メイリオ" panose="020B0604030504040204" pitchFamily="50" charset="-128"/>
+                <a:ea typeface="メイリオ" panose="020B0604030504040204" pitchFamily="50" charset="-128"/>
+                <a:cs typeface="メイリオ" panose="020B0604030504040204" pitchFamily="50" charset="-128"/>
+              </a:rPr>
+              <a:t>)</a:t>
+            </a:r>
+            <a:r>
               <a:rPr lang="ja-JP" altLang="en-US" sz="1200" dirty="0" smtClean="0">
                 <a:latin typeface="メイリオ" panose="020B0604030504040204" pitchFamily="50" charset="-128"/>
                 <a:ea typeface="メイリオ" panose="020B0604030504040204" pitchFamily="50" charset="-128"/>
                 <a:cs typeface="メイリオ" panose="020B0604030504040204" pitchFamily="50" charset="-128"/>
               </a:rPr>
-              <a:t>）を中心とする</a:t>
+              <a:t>を</a:t>
+            </a:r>
+            <a:r>
+              <a:rPr lang="ja-JP" altLang="en-US" sz="1200" dirty="0" smtClean="0">
+                <a:latin typeface="メイリオ" panose="020B0604030504040204" pitchFamily="50" charset="-128"/>
+                <a:ea typeface="メイリオ" panose="020B0604030504040204" pitchFamily="50" charset="-128"/>
+                <a:cs typeface="メイリオ" panose="020B0604030504040204" pitchFamily="50" charset="-128"/>
+              </a:rPr>
+              <a:t>中心とする</a:t>
             </a:r>
             <a:r>
               <a:rPr lang="ja-JP" altLang="en-US" sz="1200" b="1" dirty="0" smtClean="0">
@@ -5447,7 +5865,23 @@
                 <a:ea typeface="メイリオ" panose="020B0604030504040204" pitchFamily="50" charset="-128"/>
                 <a:cs typeface="メイリオ" panose="020B0604030504040204" pitchFamily="50" charset="-128"/>
               </a:rPr>
-              <a:t>の矩形</a:t>
+              <a:t>の</a:t>
+            </a:r>
+            <a:r>
+              <a:rPr lang="ja-JP" altLang="en-US" sz="1200" b="1" dirty="0" smtClean="0">
+                <a:latin typeface="メイリオ" panose="020B0604030504040204" pitchFamily="50" charset="-128"/>
+                <a:ea typeface="メイリオ" panose="020B0604030504040204" pitchFamily="50" charset="-128"/>
+                <a:cs typeface="メイリオ" panose="020B0604030504040204" pitchFamily="50" charset="-128"/>
+              </a:rPr>
+              <a:t>矩形</a:t>
+            </a:r>
+            <a:r>
+              <a:rPr lang="en-US" altLang="ja-JP" sz="1200" dirty="0">
+                <a:latin typeface="メイリオ" panose="020B0604030504040204" pitchFamily="50" charset="-128"/>
+                <a:ea typeface="メイリオ" panose="020B0604030504040204" pitchFamily="50" charset="-128"/>
+                <a:cs typeface="メイリオ" panose="020B0604030504040204" pitchFamily="50" charset="-128"/>
+              </a:rPr>
+              <a:t>(</a:t>
             </a:r>
             <a:r>
               <a:rPr lang="ja-JP" altLang="en-US" sz="1200" dirty="0" smtClean="0">
@@ -5455,7 +5889,15 @@
                 <a:ea typeface="メイリオ" panose="020B0604030504040204" pitchFamily="50" charset="-128"/>
                 <a:cs typeface="メイリオ" panose="020B0604030504040204" pitchFamily="50" charset="-128"/>
               </a:rPr>
-              <a:t>（以降、</a:t>
+              <a:t>以降</a:t>
+            </a:r>
+            <a:r>
+              <a:rPr lang="ja-JP" altLang="en-US" sz="1200" dirty="0" smtClean="0">
+                <a:latin typeface="メイリオ" panose="020B0604030504040204" pitchFamily="50" charset="-128"/>
+                <a:ea typeface="メイリオ" panose="020B0604030504040204" pitchFamily="50" charset="-128"/>
+                <a:cs typeface="メイリオ" panose="020B0604030504040204" pitchFamily="50" charset="-128"/>
+              </a:rPr>
+              <a:t>、</a:t>
             </a:r>
             <a:r>
               <a:rPr lang="ja-JP" altLang="en-US" sz="1200" b="1" dirty="0" smtClean="0">
@@ -5466,7 +5908,26 @@
                 <a:ea typeface="メイリオ" panose="020B0604030504040204" pitchFamily="50" charset="-128"/>
                 <a:cs typeface="メイリオ" panose="020B0604030504040204" pitchFamily="50" charset="-128"/>
               </a:rPr>
-              <a:t>終点近傍</a:t>
+              <a:t>終点</a:t>
+            </a:r>
+            <a:r>
+              <a:rPr lang="ja-JP" altLang="en-US" sz="1200" b="1" dirty="0" smtClean="0">
+                <a:solidFill>
+                  <a:srgbClr val="0000FF"/>
+                </a:solidFill>
+                <a:latin typeface="メイリオ" panose="020B0604030504040204" pitchFamily="50" charset="-128"/>
+                <a:ea typeface="メイリオ" panose="020B0604030504040204" pitchFamily="50" charset="-128"/>
+                <a:cs typeface="メイリオ" panose="020B0604030504040204" pitchFamily="50" charset="-128"/>
+              </a:rPr>
+              <a:t>近傍 </a:t>
+            </a:r>
+            <a:r>
+              <a:rPr lang="en-US" altLang="ja-JP" sz="1200" dirty="0" smtClean="0">
+                <a:latin typeface="メイリオ" panose="020B0604030504040204" pitchFamily="50" charset="-128"/>
+                <a:ea typeface="メイリオ" panose="020B0604030504040204" pitchFamily="50" charset="-128"/>
+                <a:cs typeface="メイリオ" panose="020B0604030504040204" pitchFamily="50" charset="-128"/>
+              </a:rPr>
+              <a:t>:</a:t>
             </a:r>
             <a:r>
               <a:rPr lang="ja-JP" altLang="en-US" sz="1200" dirty="0" smtClean="0">
@@ -5474,7 +5935,23 @@
                 <a:ea typeface="メイリオ" panose="020B0604030504040204" pitchFamily="50" charset="-128"/>
                 <a:cs typeface="メイリオ" panose="020B0604030504040204" pitchFamily="50" charset="-128"/>
               </a:rPr>
-              <a:t>：右図の</a:t>
+              <a:t> </a:t>
+            </a:r>
+            <a:r>
+              <a:rPr lang="ja-JP" altLang="en-US" sz="1200" dirty="0" smtClean="0">
+                <a:latin typeface="メイリオ" panose="020B0604030504040204" pitchFamily="50" charset="-128"/>
+                <a:ea typeface="メイリオ" panose="020B0604030504040204" pitchFamily="50" charset="-128"/>
+                <a:cs typeface="メイリオ" panose="020B0604030504040204" pitchFamily="50" charset="-128"/>
+              </a:rPr>
+              <a:t>右図</a:t>
+            </a:r>
+            <a:r>
+              <a:rPr lang="ja-JP" altLang="en-US" sz="1200" dirty="0" smtClean="0">
+                <a:latin typeface="メイリオ" panose="020B0604030504040204" pitchFamily="50" charset="-128"/>
+                <a:ea typeface="メイリオ" panose="020B0604030504040204" pitchFamily="50" charset="-128"/>
+                <a:cs typeface="メイリオ" panose="020B0604030504040204" pitchFamily="50" charset="-128"/>
+              </a:rPr>
+              <a:t>の</a:t>
             </a:r>
             <a:r>
               <a:rPr lang="ja-JP" altLang="en-US" sz="1200" dirty="0" smtClean="0">
@@ -5485,15 +5962,74 @@
                 <a:ea typeface="メイリオ" panose="020B0604030504040204" pitchFamily="50" charset="-128"/>
                 <a:cs typeface="メイリオ" panose="020B0604030504040204" pitchFamily="50" charset="-128"/>
               </a:rPr>
-              <a:t>赤破線</a:t>
+              <a:t>赤</a:t>
             </a:r>
             <a:r>
               <a:rPr lang="ja-JP" altLang="en-US" sz="1200" dirty="0" smtClean="0">
-                <a:latin typeface="メイリオ" panose="020B0604030504040204" pitchFamily="50" charset="-128"/>
-                <a:ea typeface="メイリオ" panose="020B0604030504040204" pitchFamily="50" charset="-128"/>
-                <a:cs typeface="メイリオ" panose="020B0604030504040204" pitchFamily="50" charset="-128"/>
-              </a:rPr>
-              <a:t>）を含む矩形（右図の</a:t>
+                <a:solidFill>
+                  <a:srgbClr val="FF0000"/>
+                </a:solidFill>
+                <a:latin typeface="メイリオ" panose="020B0604030504040204" pitchFamily="50" charset="-128"/>
+                <a:ea typeface="メイリオ" panose="020B0604030504040204" pitchFamily="50" charset="-128"/>
+                <a:cs typeface="メイリオ" panose="020B0604030504040204" pitchFamily="50" charset="-128"/>
+              </a:rPr>
+              <a:t>破線</a:t>
+            </a:r>
+            <a:r>
+              <a:rPr lang="en-US" altLang="ja-JP" sz="1200" dirty="0" smtClean="0">
+                <a:latin typeface="メイリオ" panose="020B0604030504040204" pitchFamily="50" charset="-128"/>
+                <a:ea typeface="メイリオ" panose="020B0604030504040204" pitchFamily="50" charset="-128"/>
+                <a:cs typeface="メイリオ" panose="020B0604030504040204" pitchFamily="50" charset="-128"/>
+              </a:rPr>
+              <a:t>)』</a:t>
+            </a:r>
+            <a:r>
+              <a:rPr lang="ja-JP" altLang="en-US" sz="1200" dirty="0" smtClean="0">
+                <a:latin typeface="メイリオ" panose="020B0604030504040204" pitchFamily="50" charset="-128"/>
+                <a:ea typeface="メイリオ" panose="020B0604030504040204" pitchFamily="50" charset="-128"/>
+                <a:cs typeface="メイリオ" panose="020B0604030504040204" pitchFamily="50" charset="-128"/>
+              </a:rPr>
+              <a:t>を</a:t>
+            </a:r>
+            <a:r>
+              <a:rPr lang="ja-JP" altLang="en-US" sz="1200" dirty="0" smtClean="0">
+                <a:latin typeface="メイリオ" panose="020B0604030504040204" pitchFamily="50" charset="-128"/>
+                <a:ea typeface="メイリオ" panose="020B0604030504040204" pitchFamily="50" charset="-128"/>
+                <a:cs typeface="メイリオ" panose="020B0604030504040204" pitchFamily="50" charset="-128"/>
+              </a:rPr>
+              <a:t>含む</a:t>
+            </a:r>
+            <a:r>
+              <a:rPr lang="ja-JP" altLang="en-US" sz="1200" dirty="0" smtClean="0">
+                <a:latin typeface="メイリオ" panose="020B0604030504040204" pitchFamily="50" charset="-128"/>
+                <a:ea typeface="メイリオ" panose="020B0604030504040204" pitchFamily="50" charset="-128"/>
+                <a:cs typeface="メイリオ" panose="020B0604030504040204" pitchFamily="50" charset="-128"/>
+              </a:rPr>
+              <a:t>矩形</a:t>
+            </a:r>
+            <a:r>
+              <a:rPr lang="en-US" altLang="ja-JP" sz="1200" dirty="0" smtClean="0">
+                <a:latin typeface="メイリオ" panose="020B0604030504040204" pitchFamily="50" charset="-128"/>
+                <a:ea typeface="メイリオ" panose="020B0604030504040204" pitchFamily="50" charset="-128"/>
+                <a:cs typeface="メイリオ" panose="020B0604030504040204" pitchFamily="50" charset="-128"/>
+              </a:rPr>
+              <a:t>(</a:t>
+            </a:r>
+            <a:r>
+              <a:rPr lang="ja-JP" altLang="en-US" sz="1200" dirty="0" smtClean="0">
+                <a:latin typeface="メイリオ" panose="020B0604030504040204" pitchFamily="50" charset="-128"/>
+                <a:ea typeface="メイリオ" panose="020B0604030504040204" pitchFamily="50" charset="-128"/>
+                <a:cs typeface="メイリオ" panose="020B0604030504040204" pitchFamily="50" charset="-128"/>
+              </a:rPr>
+              <a:t>右図</a:t>
+            </a:r>
+            <a:r>
+              <a:rPr lang="ja-JP" altLang="en-US" sz="1200" dirty="0" smtClean="0">
+                <a:latin typeface="メイリオ" panose="020B0604030504040204" pitchFamily="50" charset="-128"/>
+                <a:ea typeface="メイリオ" panose="020B0604030504040204" pitchFamily="50" charset="-128"/>
+                <a:cs typeface="メイリオ" panose="020B0604030504040204" pitchFamily="50" charset="-128"/>
+              </a:rPr>
+              <a:t>の</a:t>
             </a:r>
             <a:r>
               <a:rPr lang="ja-JP" altLang="en-US" sz="1200" dirty="0" smtClean="0">
@@ -5504,15 +6040,66 @@
                 <a:ea typeface="メイリオ" panose="020B0604030504040204" pitchFamily="50" charset="-128"/>
                 <a:cs typeface="メイリオ" panose="020B0604030504040204" pitchFamily="50" charset="-128"/>
               </a:rPr>
-              <a:t>青破線</a:t>
+              <a:t>青</a:t>
             </a:r>
             <a:r>
               <a:rPr lang="ja-JP" altLang="en-US" sz="1200" dirty="0" smtClean="0">
-                <a:latin typeface="メイリオ" panose="020B0604030504040204" pitchFamily="50" charset="-128"/>
-                <a:ea typeface="メイリオ" panose="020B0604030504040204" pitchFamily="50" charset="-128"/>
-                <a:cs typeface="メイリオ" panose="020B0604030504040204" pitchFamily="50" charset="-128"/>
-              </a:rPr>
-              <a:t>）とする。走行体は探索範囲中の格子点を経由するが</a:t>
+                <a:solidFill>
+                  <a:srgbClr val="0000FF"/>
+                </a:solidFill>
+                <a:latin typeface="メイリオ" panose="020B0604030504040204" pitchFamily="50" charset="-128"/>
+                <a:ea typeface="メイリオ" panose="020B0604030504040204" pitchFamily="50" charset="-128"/>
+                <a:cs typeface="メイリオ" panose="020B0604030504040204" pitchFamily="50" charset="-128"/>
+              </a:rPr>
+              <a:t>破線</a:t>
+            </a:r>
+            <a:r>
+              <a:rPr lang="en-US" altLang="ja-JP" sz="1200" dirty="0">
+                <a:latin typeface="メイリオ" panose="020B0604030504040204" pitchFamily="50" charset="-128"/>
+                <a:ea typeface="メイリオ" panose="020B0604030504040204" pitchFamily="50" charset="-128"/>
+                <a:cs typeface="メイリオ" panose="020B0604030504040204" pitchFamily="50" charset="-128"/>
+              </a:rPr>
+              <a:t>)</a:t>
+            </a:r>
+            <a:r>
+              <a:rPr lang="ja-JP" altLang="en-US" sz="1200" dirty="0" smtClean="0">
+                <a:latin typeface="メイリオ" panose="020B0604030504040204" pitchFamily="50" charset="-128"/>
+                <a:ea typeface="メイリオ" panose="020B0604030504040204" pitchFamily="50" charset="-128"/>
+                <a:cs typeface="メイリオ" panose="020B0604030504040204" pitchFamily="50" charset="-128"/>
+              </a:rPr>
+              <a:t>と</a:t>
+            </a:r>
+            <a:r>
+              <a:rPr lang="ja-JP" altLang="en-US" sz="1200" dirty="0" smtClean="0">
+                <a:latin typeface="メイリオ" panose="020B0604030504040204" pitchFamily="50" charset="-128"/>
+                <a:ea typeface="メイリオ" panose="020B0604030504040204" pitchFamily="50" charset="-128"/>
+                <a:cs typeface="メイリオ" panose="020B0604030504040204" pitchFamily="50" charset="-128"/>
+              </a:rPr>
+              <a:t>する。走行体は探索範囲中の格子点を経由する</a:t>
+            </a:r>
+            <a:r>
+              <a:rPr lang="ja-JP" altLang="en-US" sz="1200" dirty="0" smtClean="0">
+                <a:latin typeface="メイリオ" panose="020B0604030504040204" pitchFamily="50" charset="-128"/>
+                <a:ea typeface="メイリオ" panose="020B0604030504040204" pitchFamily="50" charset="-128"/>
+                <a:cs typeface="メイリオ" panose="020B0604030504040204" pitchFamily="50" charset="-128"/>
+              </a:rPr>
+              <a:t>が</a:t>
+            </a:r>
+            <a:r>
+              <a:rPr lang="en-US" altLang="ja-JP" sz="1200" dirty="0">
+                <a:latin typeface="メイリオ" panose="020B0604030504040204" pitchFamily="50" charset="-128"/>
+                <a:ea typeface="メイリオ" panose="020B0604030504040204" pitchFamily="50" charset="-128"/>
+                <a:cs typeface="メイリオ" panose="020B0604030504040204" pitchFamily="50" charset="-128"/>
+              </a:rPr>
+              <a:t>(</a:t>
+            </a:r>
+            <a:r>
+              <a:rPr lang="ja-JP" altLang="en-US" sz="1200" dirty="0" smtClean="0">
+                <a:latin typeface="メイリオ" panose="020B0604030504040204" pitchFamily="50" charset="-128"/>
+                <a:ea typeface="メイリオ" panose="020B0604030504040204" pitchFamily="50" charset="-128"/>
+                <a:cs typeface="メイリオ" panose="020B0604030504040204" pitchFamily="50" charset="-128"/>
+              </a:rPr>
+              <a:t>以降</a:t>
             </a:r>
             <a:r>
               <a:rPr lang="ja-JP" altLang="en-US" sz="1200" dirty="0">
@@ -5520,7 +6107,7 @@
                 <a:ea typeface="メイリオ" panose="020B0604030504040204" pitchFamily="50" charset="-128"/>
                 <a:cs typeface="メイリオ" panose="020B0604030504040204" pitchFamily="50" charset="-128"/>
               </a:rPr>
-              <a:t>（以降、</a:t>
+              <a:t>、</a:t>
             </a:r>
             <a:r>
               <a:rPr lang="ja-JP" altLang="en-US" sz="1200" b="1" dirty="0" smtClean="0">
@@ -5550,23 +6137,91 @@
                 <a:ea typeface="メイリオ" panose="020B0604030504040204" pitchFamily="50" charset="-128"/>
                 <a:cs typeface="メイリオ" panose="020B0604030504040204" pitchFamily="50" charset="-128"/>
               </a:rPr>
-              <a:t>ピンク色の点</a:t>
+              <a:t>ピンク色の</a:t>
             </a:r>
             <a:r>
               <a:rPr lang="ja-JP" altLang="en-US" sz="1200" dirty="0" smtClean="0">
-                <a:latin typeface="メイリオ" panose="020B0604030504040204" pitchFamily="50" charset="-128"/>
-                <a:ea typeface="メイリオ" panose="020B0604030504040204" pitchFamily="50" charset="-128"/>
-                <a:cs typeface="メイリオ" panose="020B0604030504040204" pitchFamily="50" charset="-128"/>
-              </a:rPr>
-              <a:t>）、始点と終点を除く矩形の頂点は除外される。</a:t>
-            </a:r>
-            <a:endParaRPr lang="en-US" altLang="ja-JP" sz="1200" dirty="0" smtClean="0">
-              <a:latin typeface="メイリオ" panose="020B0604030504040204" pitchFamily="50" charset="-128"/>
-              <a:ea typeface="メイリオ" panose="020B0604030504040204" pitchFamily="50" charset="-128"/>
-              <a:cs typeface="メイリオ" panose="020B0604030504040204" pitchFamily="50" charset="-128"/>
-            </a:endParaRPr>
-          </a:p>
-          <a:p>
+                <a:solidFill>
+                  <a:srgbClr val="FF00FF"/>
+                </a:solidFill>
+                <a:latin typeface="メイリオ" panose="020B0604030504040204" pitchFamily="50" charset="-128"/>
+                <a:ea typeface="メイリオ" panose="020B0604030504040204" pitchFamily="50" charset="-128"/>
+                <a:cs typeface="メイリオ" panose="020B0604030504040204" pitchFamily="50" charset="-128"/>
+              </a:rPr>
+              <a:t>点</a:t>
+            </a:r>
+            <a:r>
+              <a:rPr lang="en-US" altLang="ja-JP" sz="1200" dirty="0" smtClean="0">
+                <a:latin typeface="メイリオ" panose="020B0604030504040204" pitchFamily="50" charset="-128"/>
+                <a:ea typeface="メイリオ" panose="020B0604030504040204" pitchFamily="50" charset="-128"/>
+                <a:cs typeface="メイリオ" panose="020B0604030504040204" pitchFamily="50" charset="-128"/>
+              </a:rPr>
+              <a:t>)</a:t>
+            </a:r>
+            <a:r>
+              <a:rPr lang="ja-JP" altLang="en-US" sz="1200" dirty="0" err="1" smtClean="0">
+                <a:latin typeface="メイリオ" panose="020B0604030504040204" pitchFamily="50" charset="-128"/>
+                <a:ea typeface="メイリオ" panose="020B0604030504040204" pitchFamily="50" charset="-128"/>
+                <a:cs typeface="メイリオ" panose="020B0604030504040204" pitchFamily="50" charset="-128"/>
+              </a:rPr>
+              <a:t>、</a:t>
+            </a:r>
+            <a:r>
+              <a:rPr lang="ja-JP" altLang="en-US" sz="1200" dirty="0" smtClean="0">
+                <a:latin typeface="メイリオ" panose="020B0604030504040204" pitchFamily="50" charset="-128"/>
+                <a:ea typeface="メイリオ" panose="020B0604030504040204" pitchFamily="50" charset="-128"/>
+                <a:cs typeface="メイリオ" panose="020B0604030504040204" pitchFamily="50" charset="-128"/>
+              </a:rPr>
+              <a:t>始点と終点を除く矩形の</a:t>
+            </a:r>
+            <a:r>
+              <a:rPr lang="ja-JP" altLang="en-US" sz="1200" dirty="0" smtClean="0">
+                <a:latin typeface="メイリオ" panose="020B0604030504040204" pitchFamily="50" charset="-128"/>
+                <a:ea typeface="メイリオ" panose="020B0604030504040204" pitchFamily="50" charset="-128"/>
+                <a:cs typeface="メイリオ" panose="020B0604030504040204" pitchFamily="50" charset="-128"/>
+              </a:rPr>
+              <a:t>頂点</a:t>
+            </a:r>
+            <a:r>
+              <a:rPr lang="ja-JP" altLang="en-US" sz="1200" dirty="0" smtClean="0">
+                <a:latin typeface="メイリオ" panose="020B0604030504040204" pitchFamily="50" charset="-128"/>
+                <a:ea typeface="メイリオ" panose="020B0604030504040204" pitchFamily="50" charset="-128"/>
+                <a:cs typeface="メイリオ" panose="020B0604030504040204" pitchFamily="50" charset="-128"/>
+              </a:rPr>
+              <a:t>は</a:t>
+            </a:r>
+            <a:r>
+              <a:rPr lang="ja-JP" altLang="en-US" sz="1200" dirty="0" smtClean="0">
+                <a:latin typeface="メイリオ" panose="020B0604030504040204" pitchFamily="50" charset="-128"/>
+                <a:ea typeface="メイリオ" panose="020B0604030504040204" pitchFamily="50" charset="-128"/>
+                <a:cs typeface="メイリオ" panose="020B0604030504040204" pitchFamily="50" charset="-128"/>
+              </a:rPr>
+              <a:t>除外</a:t>
+            </a:r>
+            <a:r>
+              <a:rPr lang="ja-JP" altLang="en-US" sz="1200" dirty="0" smtClean="0">
+                <a:latin typeface="メイリオ" panose="020B0604030504040204" pitchFamily="50" charset="-128"/>
+                <a:ea typeface="メイリオ" panose="020B0604030504040204" pitchFamily="50" charset="-128"/>
+                <a:cs typeface="メイリオ" panose="020B0604030504040204" pitchFamily="50" charset="-128"/>
+              </a:rPr>
+              <a:t>す</a:t>
+            </a:r>
+            <a:r>
+              <a:rPr lang="ja-JP" altLang="en-US" sz="1200" dirty="0">
+                <a:latin typeface="メイリオ" panose="020B0604030504040204" pitchFamily="50" charset="-128"/>
+                <a:ea typeface="メイリオ" panose="020B0604030504040204" pitchFamily="50" charset="-128"/>
+                <a:cs typeface="メイリオ" panose="020B0604030504040204" pitchFamily="50" charset="-128"/>
+              </a:rPr>
+              <a:t>る</a:t>
+            </a:r>
+            <a:r>
+              <a:rPr lang="ja-JP" altLang="en-US" sz="1200" dirty="0" smtClean="0">
+                <a:latin typeface="メイリオ" panose="020B0604030504040204" pitchFamily="50" charset="-128"/>
+                <a:ea typeface="メイリオ" panose="020B0604030504040204" pitchFamily="50" charset="-128"/>
+                <a:cs typeface="メイリオ" panose="020B0604030504040204" pitchFamily="50" charset="-128"/>
+              </a:rPr>
+              <a:t>。</a:t>
+            </a:r>
             <a:endParaRPr lang="en-US" altLang="ja-JP" sz="800" dirty="0">
               <a:latin typeface="メイリオ" panose="020B0604030504040204" pitchFamily="50" charset="-128"/>
               <a:ea typeface="メイリオ" panose="020B0604030504040204" pitchFamily="50" charset="-128"/>
@@ -5623,7 +6278,23 @@
                 <a:ea typeface="メイリオ" panose="020B0604030504040204" pitchFamily="50" charset="-128"/>
                 <a:cs typeface="メイリオ" panose="020B0604030504040204" pitchFamily="50" charset="-128"/>
               </a:rPr>
-              <a:t>の規則に従って移動しながら通過した経由点を記録する</a:t>
+              <a:t>の規則に従って移動</a:t>
+            </a:r>
+            <a:r>
+              <a:rPr lang="ja-JP" altLang="en-US" sz="1200" dirty="0" smtClean="0">
+                <a:latin typeface="メイリオ" panose="020B0604030504040204" pitchFamily="50" charset="-128"/>
+                <a:ea typeface="メイリオ" panose="020B0604030504040204" pitchFamily="50" charset="-128"/>
+                <a:cs typeface="メイリオ" panose="020B0604030504040204" pitchFamily="50" charset="-128"/>
+              </a:rPr>
+              <a:t>しながら、通過</a:t>
+            </a:r>
+            <a:r>
+              <a:rPr lang="ja-JP" altLang="en-US" sz="1200" dirty="0" smtClean="0">
+                <a:latin typeface="メイリオ" panose="020B0604030504040204" pitchFamily="50" charset="-128"/>
+                <a:ea typeface="メイリオ" panose="020B0604030504040204" pitchFamily="50" charset="-128"/>
+                <a:cs typeface="メイリオ" panose="020B0604030504040204" pitchFamily="50" charset="-128"/>
+              </a:rPr>
+              <a:t>した経由点を記録する</a:t>
             </a:r>
             <a:r>
               <a:rPr lang="ja-JP" altLang="en-US" sz="1200" b="1" dirty="0" smtClean="0">
@@ -5642,16 +6313,112 @@
                 <a:ea typeface="メイリオ" panose="020B0604030504040204" pitchFamily="50" charset="-128"/>
                 <a:cs typeface="メイリオ" panose="020B0604030504040204" pitchFamily="50" charset="-128"/>
               </a:rPr>
-              <a:t>を設ける。探索子は向きを変える度に複製・分岐され、それぞれの方向に移動する。探索子の停止条件は以下の通り。</a:t>
-            </a:r>
-            <a:endParaRPr lang="en-US" altLang="ja-JP" sz="1200" dirty="0" smtClean="0">
+              <a:t>を設ける。探索</a:t>
+            </a:r>
+            <a:r>
+              <a:rPr lang="ja-JP" altLang="en-US" sz="1200" dirty="0" smtClean="0">
+                <a:latin typeface="メイリオ" panose="020B0604030504040204" pitchFamily="50" charset="-128"/>
+                <a:ea typeface="メイリオ" panose="020B0604030504040204" pitchFamily="50" charset="-128"/>
+                <a:cs typeface="メイリオ" panose="020B0604030504040204" pitchFamily="50" charset="-128"/>
+              </a:rPr>
+              <a:t>子は右下図のように、次の移動先が複数</a:t>
+            </a:r>
+            <a:r>
+              <a:rPr lang="ja-JP" altLang="en-US" sz="1200" dirty="0" smtClean="0">
+                <a:latin typeface="メイリオ" panose="020B0604030504040204" pitchFamily="50" charset="-128"/>
+                <a:ea typeface="メイリオ" panose="020B0604030504040204" pitchFamily="50" charset="-128"/>
+                <a:cs typeface="メイリオ" panose="020B0604030504040204" pitchFamily="50" charset="-128"/>
+              </a:rPr>
+              <a:t>になるたびに</a:t>
+            </a:r>
+            <a:r>
+              <a:rPr lang="ja-JP" altLang="en-US" sz="1200" dirty="0" smtClean="0">
+                <a:latin typeface="メイリオ" panose="020B0604030504040204" pitchFamily="50" charset="-128"/>
+                <a:ea typeface="メイリオ" panose="020B0604030504040204" pitchFamily="50" charset="-128"/>
+                <a:cs typeface="メイリオ" panose="020B0604030504040204" pitchFamily="50" charset="-128"/>
+              </a:rPr>
+              <a:t>複製</a:t>
+            </a:r>
+            <a:r>
+              <a:rPr lang="ja-JP" altLang="en-US" sz="1200" dirty="0" smtClean="0">
+                <a:latin typeface="メイリオ" panose="020B0604030504040204" pitchFamily="50" charset="-128"/>
+                <a:ea typeface="メイリオ" panose="020B0604030504040204" pitchFamily="50" charset="-128"/>
+                <a:cs typeface="メイリオ" panose="020B0604030504040204" pitchFamily="50" charset="-128"/>
+              </a:rPr>
+              <a:t>・</a:t>
+            </a:r>
+            <a:r>
+              <a:rPr lang="ja-JP" altLang="en-US" sz="1200" dirty="0" smtClean="0">
+                <a:latin typeface="メイリオ" panose="020B0604030504040204" pitchFamily="50" charset="-128"/>
+                <a:ea typeface="メイリオ" panose="020B0604030504040204" pitchFamily="50" charset="-128"/>
+                <a:cs typeface="メイリオ" panose="020B0604030504040204" pitchFamily="50" charset="-128"/>
+              </a:rPr>
+              <a:t>分岐</a:t>
+            </a:r>
+            <a:r>
+              <a:rPr lang="ja-JP" altLang="en-US" sz="1200" dirty="0">
+                <a:latin typeface="メイリオ" panose="020B0604030504040204" pitchFamily="50" charset="-128"/>
+                <a:ea typeface="メイリオ" panose="020B0604030504040204" pitchFamily="50" charset="-128"/>
+                <a:cs typeface="メイリオ" panose="020B0604030504040204" pitchFamily="50" charset="-128"/>
+              </a:rPr>
+              <a:t>し</a:t>
+            </a:r>
+            <a:r>
+              <a:rPr lang="ja-JP" altLang="en-US" sz="1200" dirty="0" smtClean="0">
+                <a:latin typeface="メイリオ" panose="020B0604030504040204" pitchFamily="50" charset="-128"/>
+                <a:ea typeface="メイリオ" panose="020B0604030504040204" pitchFamily="50" charset="-128"/>
+                <a:cs typeface="メイリオ" panose="020B0604030504040204" pitchFamily="50" charset="-128"/>
+              </a:rPr>
+              <a:t>、</a:t>
+            </a:r>
+            <a:r>
+              <a:rPr lang="ja-JP" altLang="en-US" sz="1200" dirty="0" smtClean="0">
+                <a:latin typeface="メイリオ" panose="020B0604030504040204" pitchFamily="50" charset="-128"/>
+                <a:ea typeface="メイリオ" panose="020B0604030504040204" pitchFamily="50" charset="-128"/>
+                <a:cs typeface="メイリオ" panose="020B0604030504040204" pitchFamily="50" charset="-128"/>
+              </a:rPr>
+              <a:t>それぞれの方向に移動する。探索子の停止条件は以下の通り</a:t>
+            </a:r>
+            <a:r>
+              <a:rPr lang="ja-JP" altLang="en-US" sz="1200" dirty="0" smtClean="0">
+                <a:latin typeface="メイリオ" panose="020B0604030504040204" pitchFamily="50" charset="-128"/>
+                <a:ea typeface="メイリオ" panose="020B0604030504040204" pitchFamily="50" charset="-128"/>
+                <a:cs typeface="メイリオ" panose="020B0604030504040204" pitchFamily="50" charset="-128"/>
+              </a:rPr>
+              <a:t>。</a:t>
+            </a:r>
+            <a:endParaRPr lang="en-US" altLang="ja-JP" sz="1200" dirty="0">
               <a:latin typeface="メイリオ" panose="020B0604030504040204" pitchFamily="50" charset="-128"/>
               <a:ea typeface="メイリオ" panose="020B0604030504040204" pitchFamily="50" charset="-128"/>
               <a:cs typeface="メイリオ" panose="020B0604030504040204" pitchFamily="50" charset="-128"/>
             </a:endParaRPr>
           </a:p>
           <a:p>
-            <a:endParaRPr lang="en-US" altLang="ja-JP" sz="800" dirty="0">
+            <a:r>
+              <a:rPr lang="en-US" altLang="ja-JP" sz="1200" dirty="0" smtClean="0">
+                <a:latin typeface="メイリオ" panose="020B0604030504040204" pitchFamily="50" charset="-128"/>
+                <a:ea typeface="メイリオ" panose="020B0604030504040204" pitchFamily="50" charset="-128"/>
+                <a:cs typeface="メイリオ" panose="020B0604030504040204" pitchFamily="50" charset="-128"/>
+              </a:rPr>
+              <a:t>(</a:t>
+            </a:r>
+            <a:r>
+              <a:rPr lang="ja-JP" altLang="en-US" sz="1200" dirty="0" smtClean="0">
+                <a:latin typeface="メイリオ" panose="020B0604030504040204" pitchFamily="50" charset="-128"/>
+                <a:ea typeface="メイリオ" panose="020B0604030504040204" pitchFamily="50" charset="-128"/>
+                <a:cs typeface="メイリオ" panose="020B0604030504040204" pitchFamily="50" charset="-128"/>
+              </a:rPr>
+              <a:t>探索成功</a:t>
+            </a:r>
+            <a:r>
+              <a:rPr lang="en-US" altLang="ja-JP" sz="1200" dirty="0" smtClean="0">
+                <a:latin typeface="メイリオ" panose="020B0604030504040204" pitchFamily="50" charset="-128"/>
+                <a:ea typeface="メイリオ" panose="020B0604030504040204" pitchFamily="50" charset="-128"/>
+                <a:cs typeface="メイリオ" panose="020B0604030504040204" pitchFamily="50" charset="-128"/>
+              </a:rPr>
+              <a:t>)</a:t>
+            </a:r>
+            <a:endParaRPr lang="en-US" altLang="ja-JP" sz="1200" dirty="0">
               <a:latin typeface="メイリオ" panose="020B0604030504040204" pitchFamily="50" charset="-128"/>
               <a:ea typeface="メイリオ" panose="020B0604030504040204" pitchFamily="50" charset="-128"/>
               <a:cs typeface="メイリオ" panose="020B0604030504040204" pitchFamily="50" charset="-128"/>
@@ -5664,7 +6431,47 @@
                 <a:ea typeface="メイリオ" panose="020B0604030504040204" pitchFamily="50" charset="-128"/>
                 <a:cs typeface="メイリオ" panose="020B0604030504040204" pitchFamily="50" charset="-128"/>
               </a:rPr>
-              <a:t>・終点に到達し、走行体の向きとの違いが</a:t>
+              <a:t>・終点に到達し</a:t>
+            </a:r>
+            <a:r>
+              <a:rPr lang="ja-JP" altLang="en-US" sz="1200" dirty="0" smtClean="0">
+                <a:latin typeface="メイリオ" panose="020B0604030504040204" pitchFamily="50" charset="-128"/>
+                <a:ea typeface="メイリオ" panose="020B0604030504040204" pitchFamily="50" charset="-128"/>
+                <a:cs typeface="メイリオ" panose="020B0604030504040204" pitchFamily="50" charset="-128"/>
+              </a:rPr>
+              <a:t>、終点での走行体</a:t>
+            </a:r>
+            <a:r>
+              <a:rPr lang="ja-JP" altLang="en-US" sz="1200" dirty="0">
+                <a:latin typeface="メイリオ" panose="020B0604030504040204" pitchFamily="50" charset="-128"/>
+                <a:ea typeface="メイリオ" panose="020B0604030504040204" pitchFamily="50" charset="-128"/>
+                <a:cs typeface="メイリオ" panose="020B0604030504040204" pitchFamily="50" charset="-128"/>
+              </a:rPr>
+              <a:t>の向きと</a:t>
+            </a:r>
+            <a:r>
+              <a:rPr lang="ja-JP" altLang="en-US" sz="1200" dirty="0" smtClean="0">
+                <a:latin typeface="メイリオ" panose="020B0604030504040204" pitchFamily="50" charset="-128"/>
+                <a:ea typeface="メイリオ" panose="020B0604030504040204" pitchFamily="50" charset="-128"/>
+                <a:cs typeface="メイリオ" panose="020B0604030504040204" pitchFamily="50" charset="-128"/>
+              </a:rPr>
+              <a:t>の</a:t>
+            </a:r>
+            <a:r>
+              <a:rPr lang="ja-JP" altLang="en-US" sz="1200" dirty="0">
+                <a:latin typeface="メイリオ" panose="020B0604030504040204" pitchFamily="50" charset="-128"/>
+                <a:ea typeface="メイリオ" panose="020B0604030504040204" pitchFamily="50" charset="-128"/>
+                <a:cs typeface="メイリオ" panose="020B0604030504040204" pitchFamily="50" charset="-128"/>
+              </a:rPr>
+              <a:t>差</a:t>
+            </a:r>
+            <a:r>
+              <a:rPr lang="ja-JP" altLang="en-US" sz="1200" dirty="0" smtClean="0">
+                <a:latin typeface="メイリオ" panose="020B0604030504040204" pitchFamily="50" charset="-128"/>
+                <a:ea typeface="メイリオ" panose="020B0604030504040204" pitchFamily="50" charset="-128"/>
+                <a:cs typeface="メイリオ" panose="020B0604030504040204" pitchFamily="50" charset="-128"/>
+              </a:rPr>
+              <a:t>が</a:t>
             </a:r>
             <a:r>
               <a:rPr lang="en-US" altLang="ja-JP" sz="1200" dirty="0">
@@ -5688,15 +6495,7 @@
                 <a:ea typeface="メイリオ" panose="020B0604030504040204" pitchFamily="50" charset="-128"/>
                 <a:cs typeface="メイリオ" panose="020B0604030504040204" pitchFamily="50" charset="-128"/>
               </a:rPr>
-              <a:t>ある。</a:t>
-            </a:r>
-            <a:r>
-              <a:rPr lang="en-US" altLang="ja-JP" sz="1200" dirty="0" smtClean="0">
-                <a:latin typeface="メイリオ" panose="020B0604030504040204" pitchFamily="50" charset="-128"/>
-                <a:ea typeface="メイリオ" panose="020B0604030504040204" pitchFamily="50" charset="-128"/>
-                <a:cs typeface="メイリオ" panose="020B0604030504040204" pitchFamily="50" charset="-128"/>
-              </a:rPr>
-              <a:t>…</a:t>
+              <a:t>ある</a:t>
             </a:r>
             <a:r>
               <a:rPr lang="ja-JP" altLang="en-US" sz="1200" dirty="0" smtClean="0">
@@ -5704,18 +6503,7 @@
                 <a:ea typeface="メイリオ" panose="020B0604030504040204" pitchFamily="50" charset="-128"/>
                 <a:cs typeface="メイリオ" panose="020B0604030504040204" pitchFamily="50" charset="-128"/>
               </a:rPr>
-              <a:t> </a:t>
-            </a:r>
-            <a:r>
-              <a:rPr lang="ja-JP" altLang="en-US" sz="1200" b="1" dirty="0" smtClean="0">
-                <a:solidFill>
-                  <a:srgbClr val="FF0000"/>
-                </a:solidFill>
-                <a:latin typeface="メイリオ" panose="020B0604030504040204" pitchFamily="50" charset="-128"/>
-                <a:ea typeface="メイリオ" panose="020B0604030504040204" pitchFamily="50" charset="-128"/>
-                <a:cs typeface="メイリオ" panose="020B0604030504040204" pitchFamily="50" charset="-128"/>
-              </a:rPr>
-              <a:t>探索成功</a:t>
+              <a:t>。</a:t>
             </a:r>
             <a:endParaRPr lang="en-US" altLang="ja-JP" sz="1200" b="1" dirty="0" smtClean="0">
               <a:solidFill>
@@ -5728,12 +6516,12 @@
           </a:p>
           <a:p>
             <a:r>
-              <a:rPr lang="ja-JP" altLang="en-US" sz="1200" dirty="0">
-                <a:latin typeface="メイリオ" panose="020B0604030504040204" pitchFamily="50" charset="-128"/>
-                <a:ea typeface="メイリオ" panose="020B0604030504040204" pitchFamily="50" charset="-128"/>
-                <a:cs typeface="メイリオ" panose="020B0604030504040204" pitchFamily="50" charset="-128"/>
-              </a:rPr>
-              <a:t>・終点に到達し</a:t>
+              <a:rPr lang="en-US" altLang="ja-JP" sz="1200" dirty="0" smtClean="0">
+                <a:latin typeface="メイリオ" panose="020B0604030504040204" pitchFamily="50" charset="-128"/>
+                <a:ea typeface="メイリオ" panose="020B0604030504040204" pitchFamily="50" charset="-128"/>
+                <a:cs typeface="メイリオ" panose="020B0604030504040204" pitchFamily="50" charset="-128"/>
+              </a:rPr>
+              <a:t>(</a:t>
             </a:r>
             <a:r>
               <a:rPr lang="ja-JP" altLang="en-US" sz="1200" dirty="0" smtClean="0">
@@ -5741,15 +6529,7 @@
                 <a:ea typeface="メイリオ" panose="020B0604030504040204" pitchFamily="50" charset="-128"/>
                 <a:cs typeface="メイリオ" panose="020B0604030504040204" pitchFamily="50" charset="-128"/>
               </a:rPr>
-              <a:t>、</a:t>
-            </a:r>
-            <a:r>
-              <a:rPr lang="ja-JP" altLang="en-US" sz="1200" dirty="0">
-                <a:latin typeface="メイリオ" panose="020B0604030504040204" pitchFamily="50" charset="-128"/>
-                <a:ea typeface="メイリオ" panose="020B0604030504040204" pitchFamily="50" charset="-128"/>
-                <a:cs typeface="メイリオ" panose="020B0604030504040204" pitchFamily="50" charset="-128"/>
-              </a:rPr>
-              <a:t>走行体の向きとの違いが</a:t>
+              <a:t>探索失敗</a:t>
             </a:r>
             <a:r>
               <a:rPr lang="en-US" altLang="ja-JP" sz="1200" dirty="0" smtClean="0">
@@ -5757,39 +6537,7 @@
                 <a:ea typeface="メイリオ" panose="020B0604030504040204" pitchFamily="50" charset="-128"/>
                 <a:cs typeface="メイリオ" panose="020B0604030504040204" pitchFamily="50" charset="-128"/>
               </a:rPr>
-              <a:t>±</a:t>
-            </a:r>
-            <a:r>
-              <a:rPr lang="en-US" altLang="ja-JP" sz="1200" dirty="0">
-                <a:latin typeface="メイリオ" panose="020B0604030504040204" pitchFamily="50" charset="-128"/>
-                <a:ea typeface="メイリオ" panose="020B0604030504040204" pitchFamily="50" charset="-128"/>
-                <a:cs typeface="メイリオ" panose="020B0604030504040204" pitchFamily="50" charset="-128"/>
-              </a:rPr>
-              <a:t>90</a:t>
-            </a:r>
-            <a:r>
-              <a:rPr lang="ja-JP" altLang="en-US" sz="1200" dirty="0" smtClean="0">
-                <a:latin typeface="メイリオ" panose="020B0604030504040204" pitchFamily="50" charset="-128"/>
-                <a:ea typeface="メイリオ" panose="020B0604030504040204" pitchFamily="50" charset="-128"/>
-                <a:cs typeface="メイリオ" panose="020B0604030504040204" pitchFamily="50" charset="-128"/>
-              </a:rPr>
-              <a:t>度以上である。</a:t>
-            </a:r>
-            <a:r>
-              <a:rPr lang="en-US" altLang="ja-JP" sz="1200" dirty="0" smtClean="0">
-                <a:latin typeface="メイリオ" panose="020B0604030504040204" pitchFamily="50" charset="-128"/>
-                <a:ea typeface="メイリオ" panose="020B0604030504040204" pitchFamily="50" charset="-128"/>
-                <a:cs typeface="メイリオ" panose="020B0604030504040204" pitchFamily="50" charset="-128"/>
-              </a:rPr>
-              <a:t>…</a:t>
-            </a:r>
-            <a:r>
-              <a:rPr lang="ja-JP" altLang="en-US" sz="1200" dirty="0" smtClean="0">
-                <a:latin typeface="メイリオ" panose="020B0604030504040204" pitchFamily="50" charset="-128"/>
-                <a:ea typeface="メイリオ" panose="020B0604030504040204" pitchFamily="50" charset="-128"/>
-                <a:cs typeface="メイリオ" panose="020B0604030504040204" pitchFamily="50" charset="-128"/>
-              </a:rPr>
-              <a:t> 探索失敗</a:t>
+              <a:t>)</a:t>
             </a:r>
             <a:endParaRPr lang="en-US" altLang="ja-JP" sz="1200" dirty="0" smtClean="0">
               <a:latin typeface="メイリオ" panose="020B0604030504040204" pitchFamily="50" charset="-128"/>
@@ -5804,7 +6552,7 @@
                 <a:ea typeface="メイリオ" panose="020B0604030504040204" pitchFamily="50" charset="-128"/>
                 <a:cs typeface="メイリオ" panose="020B0604030504040204" pitchFamily="50" charset="-128"/>
               </a:rPr>
-              <a:t>・点</a:t>
+              <a:t>・終点に到達し、終点での走行体の向きとの違いが</a:t>
             </a:r>
             <a:r>
               <a:rPr lang="en-US" altLang="ja-JP" sz="1200" dirty="0" smtClean="0">
@@ -5812,7 +6560,7 @@
                 <a:ea typeface="メイリオ" panose="020B0604030504040204" pitchFamily="50" charset="-128"/>
                 <a:cs typeface="メイリオ" panose="020B0604030504040204" pitchFamily="50" charset="-128"/>
               </a:rPr>
-              <a:t>C</a:t>
+              <a:t>±90</a:t>
             </a:r>
             <a:r>
               <a:rPr lang="ja-JP" altLang="en-US" sz="1200" dirty="0" smtClean="0">
@@ -5820,18 +6568,15 @@
                 <a:ea typeface="メイリオ" panose="020B0604030504040204" pitchFamily="50" charset="-128"/>
                 <a:cs typeface="メイリオ" panose="020B0604030504040204" pitchFamily="50" charset="-128"/>
               </a:rPr>
-              <a:t>を除く</a:t>
-            </a:r>
-            <a:r>
-              <a:rPr lang="ja-JP" altLang="en-US" sz="1200" b="1" dirty="0" smtClean="0">
-                <a:solidFill>
-                  <a:srgbClr val="0000FF"/>
-                </a:solidFill>
-                <a:latin typeface="メイリオ" panose="020B0604030504040204" pitchFamily="50" charset="-128"/>
-                <a:ea typeface="メイリオ" panose="020B0604030504040204" pitchFamily="50" charset="-128"/>
-                <a:cs typeface="メイリオ" panose="020B0604030504040204" pitchFamily="50" charset="-128"/>
-              </a:rPr>
-              <a:t>終点近傍</a:t>
+              <a:t>度以上である。</a:t>
+            </a:r>
+            <a:r>
+              <a:rPr lang="en-US" altLang="ja-JP" sz="1200" dirty="0" smtClean="0">
+                <a:latin typeface="メイリオ" panose="020B0604030504040204" pitchFamily="50" charset="-128"/>
+                <a:ea typeface="メイリオ" panose="020B0604030504040204" pitchFamily="50" charset="-128"/>
+                <a:cs typeface="メイリオ" panose="020B0604030504040204" pitchFamily="50" charset="-128"/>
+              </a:rPr>
+              <a:t>…</a:t>
             </a:r>
             <a:r>
               <a:rPr lang="ja-JP" altLang="en-US" sz="1200" dirty="0" smtClean="0">
@@ -5839,23 +6584,7 @@
                 <a:ea typeface="メイリオ" panose="020B0604030504040204" pitchFamily="50" charset="-128"/>
                 <a:cs typeface="メイリオ" panose="020B0604030504040204" pitchFamily="50" charset="-128"/>
               </a:rPr>
-              <a:t>の点を</a:t>
-            </a:r>
-            <a:r>
-              <a:rPr lang="en-US" altLang="ja-JP" sz="1200" dirty="0" smtClean="0">
-                <a:latin typeface="メイリオ" panose="020B0604030504040204" pitchFamily="50" charset="-128"/>
-                <a:ea typeface="メイリオ" panose="020B0604030504040204" pitchFamily="50" charset="-128"/>
-                <a:cs typeface="メイリオ" panose="020B0604030504040204" pitchFamily="50" charset="-128"/>
-              </a:rPr>
-              <a:t>2</a:t>
-            </a:r>
-            <a:r>
-              <a:rPr lang="ja-JP" altLang="en-US" sz="1200" dirty="0" smtClean="0">
-                <a:latin typeface="メイリオ" panose="020B0604030504040204" pitchFamily="50" charset="-128"/>
-                <a:ea typeface="メイリオ" panose="020B0604030504040204" pitchFamily="50" charset="-128"/>
-                <a:cs typeface="メイリオ" panose="020B0604030504040204" pitchFamily="50" charset="-128"/>
-              </a:rPr>
-              <a:t>回通過する。</a:t>
+              <a:t> 探索失敗</a:t>
             </a:r>
             <a:endParaRPr lang="en-US" altLang="ja-JP" sz="1200" dirty="0" smtClean="0">
               <a:latin typeface="メイリオ" panose="020B0604030504040204" pitchFamily="50" charset="-128"/>
@@ -5870,10 +6599,53 @@
                 <a:ea typeface="メイリオ" panose="020B0604030504040204" pitchFamily="50" charset="-128"/>
                 <a:cs typeface="メイリオ" panose="020B0604030504040204" pitchFamily="50" charset="-128"/>
               </a:rPr>
-              <a:t>・同じ経由点を</a:t>
-            </a:r>
-            <a:r>
-              <a:rPr lang="en-US" altLang="ja-JP" sz="1200" dirty="0">
+              <a:t>・</a:t>
+            </a:r>
+            <a:r>
+              <a:rPr lang="ja-JP" altLang="en-US" sz="1200" dirty="0" smtClean="0">
+                <a:latin typeface="メイリオ" panose="020B0604030504040204" pitchFamily="50" charset="-128"/>
+                <a:ea typeface="メイリオ" panose="020B0604030504040204" pitchFamily="50" charset="-128"/>
+                <a:cs typeface="メイリオ" panose="020B0604030504040204" pitchFamily="50" charset="-128"/>
+              </a:rPr>
+              <a:t>点</a:t>
+            </a:r>
+            <a:r>
+              <a:rPr lang="en-US" altLang="ja-JP" sz="1200" dirty="0" smtClean="0">
+                <a:latin typeface="メイリオ" panose="020B0604030504040204" pitchFamily="50" charset="-128"/>
+                <a:ea typeface="メイリオ" panose="020B0604030504040204" pitchFamily="50" charset="-128"/>
+                <a:cs typeface="メイリオ" panose="020B0604030504040204" pitchFamily="50" charset="-128"/>
+              </a:rPr>
+              <a:t>C</a:t>
+            </a:r>
+            <a:r>
+              <a:rPr lang="ja-JP" altLang="en-US" sz="1200" dirty="0" smtClean="0">
+                <a:latin typeface="メイリオ" panose="020B0604030504040204" pitchFamily="50" charset="-128"/>
+                <a:ea typeface="メイリオ" panose="020B0604030504040204" pitchFamily="50" charset="-128"/>
+                <a:cs typeface="メイリオ" panose="020B0604030504040204" pitchFamily="50" charset="-128"/>
+              </a:rPr>
+              <a:t>を除く</a:t>
+            </a:r>
+            <a:r>
+              <a:rPr lang="ja-JP" altLang="en-US" sz="1200" b="1" dirty="0" smtClean="0">
+                <a:solidFill>
+                  <a:srgbClr val="0000FF"/>
+                </a:solidFill>
+                <a:latin typeface="メイリオ" panose="020B0604030504040204" pitchFamily="50" charset="-128"/>
+                <a:ea typeface="メイリオ" panose="020B0604030504040204" pitchFamily="50" charset="-128"/>
+                <a:cs typeface="メイリオ" panose="020B0604030504040204" pitchFamily="50" charset="-128"/>
+              </a:rPr>
+              <a:t>終点近傍</a:t>
+            </a:r>
+            <a:r>
+              <a:rPr lang="ja-JP" altLang="en-US" sz="1200" dirty="0" smtClean="0">
+                <a:latin typeface="メイリオ" panose="020B0604030504040204" pitchFamily="50" charset="-128"/>
+                <a:ea typeface="メイリオ" panose="020B0604030504040204" pitchFamily="50" charset="-128"/>
+                <a:cs typeface="メイリオ" panose="020B0604030504040204" pitchFamily="50" charset="-128"/>
+              </a:rPr>
+              <a:t>の点を</a:t>
+            </a:r>
+            <a:r>
+              <a:rPr lang="en-US" altLang="ja-JP" sz="1200" dirty="0" smtClean="0">
                 <a:latin typeface="メイリオ" panose="020B0604030504040204" pitchFamily="50" charset="-128"/>
                 <a:ea typeface="メイリオ" panose="020B0604030504040204" pitchFamily="50" charset="-128"/>
                 <a:cs typeface="メイリオ" panose="020B0604030504040204" pitchFamily="50" charset="-128"/>
@@ -5886,15 +6658,7 @@
                 <a:ea typeface="メイリオ" panose="020B0604030504040204" pitchFamily="50" charset="-128"/>
                 <a:cs typeface="メイリオ" panose="020B0604030504040204" pitchFamily="50" charset="-128"/>
               </a:rPr>
-              <a:t>回通過する。</a:t>
-            </a:r>
-            <a:r>
-              <a:rPr lang="en-US" altLang="ja-JP" sz="1200" dirty="0" smtClean="0">
-                <a:latin typeface="メイリオ" panose="020B0604030504040204" pitchFamily="50" charset="-128"/>
-                <a:ea typeface="メイリオ" panose="020B0604030504040204" pitchFamily="50" charset="-128"/>
-                <a:cs typeface="メイリオ" panose="020B0604030504040204" pitchFamily="50" charset="-128"/>
-              </a:rPr>
-              <a:t>…</a:t>
+              <a:t>回通過する</a:t>
             </a:r>
             <a:r>
               <a:rPr lang="ja-JP" altLang="en-US" sz="1200" dirty="0" smtClean="0">
@@ -5902,23 +6666,7 @@
                 <a:ea typeface="メイリオ" panose="020B0604030504040204" pitchFamily="50" charset="-128"/>
                 <a:cs typeface="メイリオ" panose="020B0604030504040204" pitchFamily="50" charset="-128"/>
               </a:rPr>
-              <a:t> </a:t>
-            </a:r>
-            <a:r>
-              <a:rPr lang="ja-JP" altLang="en-US" sz="1200" dirty="0">
-                <a:latin typeface="メイリオ" panose="020B0604030504040204" pitchFamily="50" charset="-128"/>
-                <a:ea typeface="メイリオ" panose="020B0604030504040204" pitchFamily="50" charset="-128"/>
-                <a:cs typeface="メイリオ" panose="020B0604030504040204" pitchFamily="50" charset="-128"/>
-              </a:rPr>
-              <a:t>探索</a:t>
-            </a:r>
-            <a:r>
-              <a:rPr lang="ja-JP" altLang="en-US" sz="1200" dirty="0" smtClean="0">
-                <a:latin typeface="メイリオ" panose="020B0604030504040204" pitchFamily="50" charset="-128"/>
-                <a:ea typeface="メイリオ" panose="020B0604030504040204" pitchFamily="50" charset="-128"/>
-                <a:cs typeface="メイリオ" panose="020B0604030504040204" pitchFamily="50" charset="-128"/>
-              </a:rPr>
-              <a:t>失敗</a:t>
+              <a:t>。</a:t>
             </a:r>
             <a:endParaRPr lang="en-US" altLang="ja-JP" sz="1200" dirty="0" smtClean="0">
               <a:latin typeface="メイリオ" panose="020B0604030504040204" pitchFamily="50" charset="-128"/>
@@ -5933,15 +6681,15 @@
                 <a:ea typeface="メイリオ" panose="020B0604030504040204" pitchFamily="50" charset="-128"/>
                 <a:cs typeface="メイリオ" panose="020B0604030504040204" pitchFamily="50" charset="-128"/>
               </a:rPr>
-              <a:t>・移動可能な経由点が存在しない。</a:t>
-            </a:r>
-            <a:r>
-              <a:rPr lang="en-US" altLang="ja-JP" sz="1200" dirty="0" smtClean="0">
-                <a:latin typeface="メイリオ" panose="020B0604030504040204" pitchFamily="50" charset="-128"/>
-                <a:ea typeface="メイリオ" panose="020B0604030504040204" pitchFamily="50" charset="-128"/>
-                <a:cs typeface="メイリオ" panose="020B0604030504040204" pitchFamily="50" charset="-128"/>
-              </a:rPr>
-              <a:t>…</a:t>
+              <a:t>・同じ経由点を</a:t>
+            </a:r>
+            <a:r>
+              <a:rPr lang="en-US" altLang="ja-JP" sz="1200" dirty="0">
+                <a:latin typeface="メイリオ" panose="020B0604030504040204" pitchFamily="50" charset="-128"/>
+                <a:ea typeface="メイリオ" panose="020B0604030504040204" pitchFamily="50" charset="-128"/>
+                <a:cs typeface="メイリオ" panose="020B0604030504040204" pitchFamily="50" charset="-128"/>
+              </a:rPr>
+              <a:t>2</a:t>
             </a:r>
             <a:r>
               <a:rPr lang="ja-JP" altLang="en-US" sz="1200" dirty="0" smtClean="0">
@@ -5949,15 +6697,7 @@
                 <a:ea typeface="メイリオ" panose="020B0604030504040204" pitchFamily="50" charset="-128"/>
                 <a:cs typeface="メイリオ" panose="020B0604030504040204" pitchFamily="50" charset="-128"/>
               </a:rPr>
-              <a:t> </a:t>
-            </a:r>
-            <a:r>
-              <a:rPr lang="ja-JP" altLang="en-US" sz="1200" dirty="0">
-                <a:latin typeface="メイリオ" panose="020B0604030504040204" pitchFamily="50" charset="-128"/>
-                <a:ea typeface="メイリオ" panose="020B0604030504040204" pitchFamily="50" charset="-128"/>
-                <a:cs typeface="メイリオ" panose="020B0604030504040204" pitchFamily="50" charset="-128"/>
-              </a:rPr>
-              <a:t>探索</a:t>
+              <a:t>回通過</a:t>
             </a:r>
             <a:r>
               <a:rPr lang="ja-JP" altLang="en-US" sz="1200" dirty="0" smtClean="0">
@@ -5965,7 +6705,30 @@
                 <a:ea typeface="メイリオ" panose="020B0604030504040204" pitchFamily="50" charset="-128"/>
                 <a:cs typeface="メイリオ" panose="020B0604030504040204" pitchFamily="50" charset="-128"/>
               </a:rPr>
-              <a:t>失敗</a:t>
+              <a:t>する。</a:t>
+            </a:r>
+            <a:endParaRPr lang="en-US" altLang="ja-JP" sz="1200" dirty="0" smtClean="0">
+              <a:latin typeface="メイリオ" panose="020B0604030504040204" pitchFamily="50" charset="-128"/>
+              <a:ea typeface="メイリオ" panose="020B0604030504040204" pitchFamily="50" charset="-128"/>
+              <a:cs typeface="メイリオ" panose="020B0604030504040204" pitchFamily="50" charset="-128"/>
+            </a:endParaRPr>
+          </a:p>
+          <a:p>
+            <a:r>
+              <a:rPr lang="ja-JP" altLang="en-US" sz="1200" dirty="0" smtClean="0">
+                <a:latin typeface="メイリオ" panose="020B0604030504040204" pitchFamily="50" charset="-128"/>
+                <a:ea typeface="メイリオ" panose="020B0604030504040204" pitchFamily="50" charset="-128"/>
+                <a:cs typeface="メイリオ" panose="020B0604030504040204" pitchFamily="50" charset="-128"/>
+              </a:rPr>
+              <a:t>・移動可能な経由点が存在しない</a:t>
+            </a:r>
+            <a:r>
+              <a:rPr lang="ja-JP" altLang="en-US" sz="1200" dirty="0" smtClean="0">
+                <a:latin typeface="メイリオ" panose="020B0604030504040204" pitchFamily="50" charset="-128"/>
+                <a:ea typeface="メイリオ" panose="020B0604030504040204" pitchFamily="50" charset="-128"/>
+                <a:cs typeface="メイリオ" panose="020B0604030504040204" pitchFamily="50" charset="-128"/>
+              </a:rPr>
+              <a:t>。</a:t>
             </a:r>
             <a:endParaRPr lang="en-US" altLang="ja-JP" sz="1200" dirty="0" smtClean="0">
               <a:latin typeface="メイリオ" panose="020B0604030504040204" pitchFamily="50" charset="-128"/>
@@ -8144,7 +8907,7 @@
         </p:nvGrpSpPr>
         <p:grpSpPr>
           <a:xfrm>
-            <a:off x="11430210" y="4995854"/>
+            <a:off x="11491173" y="4995854"/>
             <a:ext cx="3091876" cy="1139555"/>
             <a:chOff x="2222560" y="4161006"/>
             <a:chExt cx="3091876" cy="1139555"/>
@@ -9482,7 +10245,7 @@
           </a:bodyPr>
           <a:lstStyle/>
           <a:p>
-            <a:pPr indent="2509838"/>
+            <a:pPr indent="1881188"/>
             <a:r>
               <a:rPr lang="en-US" altLang="ja-JP" sz="1200" b="1" dirty="0" smtClean="0">
                 <a:solidFill>
@@ -9500,7 +10263,55 @@
                 <a:ea typeface="メイリオ" panose="020B0604030504040204" pitchFamily="50" charset="-128"/>
                 <a:cs typeface="メイリオ" panose="020B0604030504040204" pitchFamily="50" charset="-128"/>
               </a:rPr>
-              <a:t>で探索した経路の選択基準として、抽象マップ上での移動距離と向き変更から</a:t>
+              <a:t>で探索した</a:t>
+            </a:r>
+            <a:r>
+              <a:rPr lang="ja-JP" altLang="en-US" sz="1200" dirty="0" smtClean="0">
+                <a:latin typeface="メイリオ" panose="020B0604030504040204" pitchFamily="50" charset="-128"/>
+                <a:ea typeface="メイリオ" panose="020B0604030504040204" pitchFamily="50" charset="-128"/>
+                <a:cs typeface="メイリオ" panose="020B0604030504040204" pitchFamily="50" charset="-128"/>
+              </a:rPr>
+              <a:t>経路</a:t>
+            </a:r>
+            <a:r>
+              <a:rPr lang="ja-JP" altLang="en-US" sz="1200" dirty="0">
+                <a:latin typeface="メイリオ" panose="020B0604030504040204" pitchFamily="50" charset="-128"/>
+                <a:ea typeface="メイリオ" panose="020B0604030504040204" pitchFamily="50" charset="-128"/>
+                <a:cs typeface="メイリオ" panose="020B0604030504040204" pitchFamily="50" charset="-128"/>
+              </a:rPr>
+              <a:t>の</a:t>
+            </a:r>
+            <a:r>
+              <a:rPr lang="ja-JP" altLang="en-US" sz="1200" dirty="0" smtClean="0">
+                <a:latin typeface="メイリオ" panose="020B0604030504040204" pitchFamily="50" charset="-128"/>
+                <a:ea typeface="メイリオ" panose="020B0604030504040204" pitchFamily="50" charset="-128"/>
+                <a:cs typeface="メイリオ" panose="020B0604030504040204" pitchFamily="50" charset="-128"/>
+              </a:rPr>
+              <a:t>、</a:t>
+            </a:r>
+            <a:r>
+              <a:rPr lang="ja-JP" altLang="en-US" sz="1200" dirty="0" smtClean="0">
+                <a:latin typeface="メイリオ" panose="020B0604030504040204" pitchFamily="50" charset="-128"/>
+                <a:ea typeface="メイリオ" panose="020B0604030504040204" pitchFamily="50" charset="-128"/>
+                <a:cs typeface="メイリオ" panose="020B0604030504040204" pitchFamily="50" charset="-128"/>
+              </a:rPr>
+              <a:t>抽象マップ上での移動距離</a:t>
+            </a:r>
+            <a:r>
+              <a:rPr lang="ja-JP" altLang="en-US" sz="1200" dirty="0" smtClean="0">
+                <a:latin typeface="メイリオ" panose="020B0604030504040204" pitchFamily="50" charset="-128"/>
+                <a:ea typeface="メイリオ" panose="020B0604030504040204" pitchFamily="50" charset="-128"/>
+                <a:cs typeface="メイリオ" panose="020B0604030504040204" pitchFamily="50" charset="-128"/>
+              </a:rPr>
+              <a:t>と抽象走行体の向きの変更</a:t>
+            </a:r>
+            <a:r>
+              <a:rPr lang="ja-JP" altLang="en-US" sz="1200" dirty="0" smtClean="0">
+                <a:latin typeface="メイリオ" panose="020B0604030504040204" pitchFamily="50" charset="-128"/>
+                <a:ea typeface="メイリオ" panose="020B0604030504040204" pitchFamily="50" charset="-128"/>
+                <a:cs typeface="メイリオ" panose="020B0604030504040204" pitchFamily="50" charset="-128"/>
+              </a:rPr>
+              <a:t>から</a:t>
             </a:r>
             <a:r>
               <a:rPr lang="ja-JP" altLang="en-US" sz="1200" b="1" dirty="0" smtClean="0">
@@ -9519,7 +10330,31 @@
                 <a:ea typeface="メイリオ" panose="020B0604030504040204" pitchFamily="50" charset="-128"/>
                 <a:cs typeface="メイリオ" panose="020B0604030504040204" pitchFamily="50" charset="-128"/>
               </a:rPr>
-              <a:t>を算出する。移動コストが最も低い経路を採用する。</a:t>
+              <a:t>を</a:t>
+            </a:r>
+            <a:r>
+              <a:rPr lang="ja-JP" altLang="en-US" sz="1200" dirty="0" smtClean="0">
+                <a:latin typeface="メイリオ" panose="020B0604030504040204" pitchFamily="50" charset="-128"/>
+                <a:ea typeface="メイリオ" panose="020B0604030504040204" pitchFamily="50" charset="-128"/>
+                <a:cs typeface="メイリオ" panose="020B0604030504040204" pitchFamily="50" charset="-128"/>
+              </a:rPr>
+              <a:t>算出し、移動</a:t>
+            </a:r>
+            <a:r>
+              <a:rPr lang="ja-JP" altLang="en-US" sz="1200" dirty="0" smtClean="0">
+                <a:latin typeface="メイリオ" panose="020B0604030504040204" pitchFamily="50" charset="-128"/>
+                <a:ea typeface="メイリオ" panose="020B0604030504040204" pitchFamily="50" charset="-128"/>
+                <a:cs typeface="メイリオ" panose="020B0604030504040204" pitchFamily="50" charset="-128"/>
+              </a:rPr>
+              <a:t>コストが最も低い経路</a:t>
+            </a:r>
+            <a:r>
+              <a:rPr lang="ja-JP" altLang="en-US" sz="1200" dirty="0" smtClean="0">
+                <a:latin typeface="メイリオ" panose="020B0604030504040204" pitchFamily="50" charset="-128"/>
+                <a:ea typeface="メイリオ" panose="020B0604030504040204" pitchFamily="50" charset="-128"/>
+                <a:cs typeface="メイリオ" panose="020B0604030504040204" pitchFamily="50" charset="-128"/>
+              </a:rPr>
+              <a:t>を選択する。</a:t>
             </a:r>
             <a:endParaRPr lang="en-US" altLang="ja-JP" sz="1200" dirty="0" smtClean="0">
               <a:latin typeface="メイリオ" panose="020B0604030504040204" pitchFamily="50" charset="-128"/>
@@ -11184,8 +12019,8 @@
             </p:txBody>
           </p:sp>
         </p:grpSp>
-        <mc:AlternateContent xmlns:mc="http://schemas.openxmlformats.org/markup-compatibility/2006">
-          <mc:Choice xmlns:a14="http://schemas.microsoft.com/office/drawing/2010/main" Requires="a14">
+        <mc:AlternateContent xmlns:mc="http://schemas.openxmlformats.org/markup-compatibility/2006" xmlns:a14="http://schemas.microsoft.com/office/drawing/2010/main">
+          <mc:Choice Requires="a14">
             <p:sp>
               <p:nvSpPr>
                 <p:cNvPr id="1090" name="テキスト ボックス 1089"/>
@@ -11208,6 +12043,7 @@
                 </a:bodyPr>
                 <a:lstStyle/>
                 <a:p>
+                  <a:pPr/>
                   <a14:m>
                     <m:oMathPara xmlns:m="http://schemas.openxmlformats.org/officeDocument/2006/math">
                       <m:oMathParaPr>
@@ -11218,7 +12054,7 @@
                           <m:sSubPr>
                             <m:ctrlPr>
                               <a:rPr lang="en-US" altLang="ja-JP" sz="800" i="1">
-                                <a:latin typeface="Cambria Math"/>
+                                <a:latin typeface="Cambria Math" panose="02040503050406030204" pitchFamily="18" charset="0"/>
                                 <a:ea typeface="メイリオ" panose="020B0604030504040204" pitchFamily="50" charset="-128"/>
                               </a:rPr>
                             </m:ctrlPr>
@@ -11256,7 +12092,7 @@
               </p:txBody>
             </p:sp>
           </mc:Choice>
-          <mc:Fallback>
+          <mc:Fallback xmlns="">
             <p:sp>
               <p:nvSpPr>
                 <p:cNvPr id="1090" name="テキスト ボックス 1089"/>
@@ -11295,8 +12131,8 @@
             </p:sp>
           </mc:Fallback>
         </mc:AlternateContent>
-        <mc:AlternateContent xmlns:mc="http://schemas.openxmlformats.org/markup-compatibility/2006">
-          <mc:Choice xmlns:a14="http://schemas.microsoft.com/office/drawing/2010/main" Requires="a14">
+        <mc:AlternateContent xmlns:mc="http://schemas.openxmlformats.org/markup-compatibility/2006" xmlns:a14="http://schemas.microsoft.com/office/drawing/2010/main">
+          <mc:Choice Requires="a14">
             <p:sp>
               <p:nvSpPr>
                 <p:cNvPr id="1091" name="テキスト ボックス 1090"/>
@@ -11319,6 +12155,7 @@
                 </a:bodyPr>
                 <a:lstStyle/>
                 <a:p>
+                  <a:pPr/>
                   <a14:m>
                     <m:oMathPara xmlns:m="http://schemas.openxmlformats.org/officeDocument/2006/math">
                       <m:oMathParaPr>
@@ -11329,7 +12166,7 @@
                           <m:sSubPr>
                             <m:ctrlPr>
                               <a:rPr lang="en-US" altLang="ja-JP" sz="800" i="1" smtClean="0">
-                                <a:latin typeface="Cambria Math"/>
+                                <a:latin typeface="Cambria Math" panose="02040503050406030204" pitchFamily="18" charset="0"/>
                                 <a:ea typeface="メイリオ" panose="020B0604030504040204" pitchFamily="50" charset="-128"/>
                               </a:rPr>
                             </m:ctrlPr>
@@ -11367,7 +12204,7 @@
               </p:txBody>
             </p:sp>
           </mc:Choice>
-          <mc:Fallback>
+          <mc:Fallback xmlns="">
             <p:sp>
               <p:nvSpPr>
                 <p:cNvPr id="1091" name="テキスト ボックス 1090"/>
@@ -11416,7 +12253,7 @@
           <p:nvPr>
             <p:extLst>
               <p:ext uri="{D42A27DB-BD31-4B8C-83A1-F6EECF244321}">
-                <p14:modId xmlns:p14="http://schemas.microsoft.com/office/powerpoint/2010/main" val="4072906076"/>
+                <p14:modId xmlns:p14="http://schemas.microsoft.com/office/powerpoint/2010/main" val="1852561125"/>
               </p:ext>
             </p:extLst>
           </p:nvPr>
@@ -11525,7 +12362,11 @@
                     <a:p>
                       <a:r>
                         <a:rPr kumimoji="1" lang="ja-JP" altLang="en-US" sz="1000" b="1" dirty="0" smtClean="0"/>
-                        <a:t>上記の悪影響の緩和</a:t>
+                        <a:t>上の影響</a:t>
+                      </a:r>
+                      <a:r>
+                        <a:rPr kumimoji="1" lang="ja-JP" altLang="en-US" sz="1000" b="1" dirty="0" smtClean="0"/>
+                        <a:t>の緩和</a:t>
                       </a:r>
                       <a:endParaRPr kumimoji="1" lang="ja-JP" altLang="en-US" sz="1000" b="1" dirty="0"/>
                     </a:p>
@@ -11574,7 +12415,7 @@
                       <m:sSubPr>
                         <m:ctrlPr>
                           <a:rPr lang="en-US" altLang="ja-JP" sz="1050" i="1">
-                            <a:latin typeface="Cambria Math"/>
+                            <a:latin typeface="Cambria Math" panose="02040503050406030204" pitchFamily="18" charset="0"/>
                             <a:ea typeface="メイリオ" panose="020B0604030504040204" pitchFamily="50" charset="-128"/>
                           </a:rPr>
                         </m:ctrlPr>
@@ -11609,7 +12450,7 @@
                       <m:sSubPr>
                         <m:ctrlPr>
                           <a:rPr lang="en-US" altLang="ja-JP" sz="1050" i="1">
-                            <a:latin typeface="Cambria Math"/>
+                            <a:latin typeface="Cambria Math" panose="02040503050406030204" pitchFamily="18" charset="0"/>
                             <a:ea typeface="メイリオ" panose="020B0604030504040204" pitchFamily="50" charset="-128"/>
                           </a:rPr>
                         </m:ctrlPr>
@@ -11663,7 +12504,7 @@
                       <m:sSubPr>
                         <m:ctrlPr>
                           <a:rPr lang="en-US" altLang="ja-JP" sz="1050" i="1">
-                            <a:latin typeface="Cambria Math"/>
+                            <a:latin typeface="Cambria Math" panose="02040503050406030204" pitchFamily="18" charset="0"/>
                             <a:ea typeface="メイリオ" panose="020B0604030504040204" pitchFamily="50" charset="-128"/>
                           </a:rPr>
                         </m:ctrlPr>
@@ -11708,7 +12549,7 @@
                       <m:sSubPr>
                         <m:ctrlPr>
                           <a:rPr lang="en-US" altLang="ja-JP" sz="1050" i="1">
-                            <a:latin typeface="Cambria Math"/>
+                            <a:latin typeface="Cambria Math" panose="02040503050406030204" pitchFamily="18" charset="0"/>
                             <a:ea typeface="メイリオ" panose="020B0604030504040204" pitchFamily="50" charset="-128"/>
                           </a:rPr>
                         </m:ctrlPr>
@@ -11764,7 +12605,7 @@
                       <m:sSubPr>
                         <m:ctrlPr>
                           <a:rPr lang="en-US" altLang="ja-JP" sz="1050" i="1">
-                            <a:latin typeface="Cambria Math"/>
+                            <a:latin typeface="Cambria Math" panose="02040503050406030204" pitchFamily="18" charset="0"/>
                             <a:ea typeface="メイリオ" panose="020B0604030504040204" pitchFamily="50" charset="-128"/>
                           </a:rPr>
                         </m:ctrlPr>
@@ -11834,7 +12675,7 @@
                       <m:sSubPr>
                         <m:ctrlPr>
                           <a:rPr lang="en-US" altLang="ja-JP" sz="1050" i="1">
-                            <a:latin typeface="Cambria Math"/>
+                            <a:latin typeface="Cambria Math" panose="02040503050406030204" pitchFamily="18" charset="0"/>
                             <a:ea typeface="メイリオ" panose="020B0604030504040204" pitchFamily="50" charset="-128"/>
                           </a:rPr>
                         </m:ctrlPr>
@@ -11874,15 +12715,7 @@
                     <a:ea typeface="メイリオ" panose="020B0604030504040204" pitchFamily="50" charset="-128"/>
                     <a:cs typeface="メイリオ" panose="020B0604030504040204" pitchFamily="50" charset="-128"/>
                   </a:rPr>
-                  <a:t>向きの</a:t>
-                </a:r>
-                <a:r>
-                  <a:rPr lang="ja-JP" altLang="en-US" sz="1050" dirty="0">
-                    <a:latin typeface="メイリオ" panose="020B0604030504040204" pitchFamily="50" charset="-128"/>
-                    <a:ea typeface="メイリオ" panose="020B0604030504040204" pitchFamily="50" charset="-128"/>
-                    <a:cs typeface="メイリオ" panose="020B0604030504040204" pitchFamily="50" charset="-128"/>
-                  </a:rPr>
-                  <a:t>変化：</a:t>
+                  <a:t>向きの変化：</a:t>
                 </a:r>
                 <a14:m>
                   <m:oMath xmlns:m="http://schemas.openxmlformats.org/officeDocument/2006/math">
@@ -11890,7 +12723,7 @@
                       <m:sSubPr>
                         <m:ctrlPr>
                           <a:rPr lang="en-US" altLang="ja-JP" sz="1050" i="1">
-                            <a:latin typeface="Cambria Math"/>
+                            <a:latin typeface="Cambria Math" panose="02040503050406030204" pitchFamily="18" charset="0"/>
                             <a:ea typeface="メイリオ" panose="020B0604030504040204" pitchFamily="50" charset="-128"/>
                           </a:rPr>
                         </m:ctrlPr>
@@ -11970,7 +12803,15 @@
                     <a:ea typeface="メイリオ" panose="020B0604030504040204" pitchFamily="50" charset="-128"/>
                     <a:cs typeface="メイリオ" panose="020B0604030504040204" pitchFamily="50" charset="-128"/>
                   </a:rPr>
-                  <a:t>は左周りを正とする</a:t>
+                  <a:t>は右周り</a:t>
+                </a:r>
+                <a:r>
+                  <a:rPr lang="ja-JP" altLang="en-US" sz="1050" dirty="0" smtClean="0">
+                    <a:latin typeface="メイリオ" panose="020B0604030504040204" pitchFamily="50" charset="-128"/>
+                    <a:ea typeface="メイリオ" panose="020B0604030504040204" pitchFamily="50" charset="-128"/>
+                    <a:cs typeface="メイリオ" panose="020B0604030504040204" pitchFamily="50" charset="-128"/>
+                  </a:rPr>
+                  <a:t>を正とする</a:t>
                 </a:r>
                 <a:r>
                   <a:rPr lang="en-US" altLang="ja-JP" sz="1050" dirty="0" smtClean="0">
@@ -12001,7 +12842,7 @@
               <a:prstGeom prst="rect">
                 <a:avLst/>
               </a:prstGeom>
-              <a:blipFill rotWithShape="1">
+              <a:blipFill rotWithShape="0">
                 <a:blip r:embed="rId6"/>
                 <a:stretch>
                   <a:fillRect b="-8824"/>
@@ -12059,8 +12900,8 @@
           </a:p>
         </p:txBody>
       </p:sp>
-      <mc:AlternateContent xmlns:mc="http://schemas.openxmlformats.org/markup-compatibility/2006">
-        <mc:Choice xmlns:a14="http://schemas.microsoft.com/office/drawing/2010/main" Requires="a14">
+      <mc:AlternateContent xmlns:mc="http://schemas.openxmlformats.org/markup-compatibility/2006" xmlns:a14="http://schemas.microsoft.com/office/drawing/2010/main">
+        <mc:Choice Requires="a14">
           <p:sp>
             <p:nvSpPr>
               <p:cNvPr id="1093" name="テキスト ボックス 1092"/>
@@ -12083,6 +12924,7 @@
               </a:bodyPr>
               <a:lstStyle/>
               <a:p>
+                <a:pPr/>
                 <a14:m>
                   <m:oMathPara xmlns:m="http://schemas.openxmlformats.org/officeDocument/2006/math">
                     <m:oMathParaPr>
@@ -12103,7 +12945,7 @@
                           <m:supHide m:val="on"/>
                           <m:ctrlPr>
                             <a:rPr kumimoji="1" lang="ja-JP" altLang="en-US" sz="1200" i="1" smtClean="0">
-                              <a:latin typeface="Cambria Math"/>
+                              <a:latin typeface="Cambria Math" panose="02040503050406030204" pitchFamily="18" charset="0"/>
                             </a:rPr>
                           </m:ctrlPr>
                         </m:naryPr>
@@ -12114,7 +12956,7 @@
                             <m:fPr>
                               <m:ctrlPr>
                                 <a:rPr kumimoji="1" lang="en-US" altLang="ja-JP" sz="1200" i="1" smtClean="0">
-                                  <a:latin typeface="Cambria Math"/>
+                                  <a:latin typeface="Cambria Math" panose="02040503050406030204" pitchFamily="18" charset="0"/>
                                 </a:rPr>
                               </m:ctrlPr>
                             </m:fPr>
@@ -12129,7 +12971,7 @@
                                 <m:dPr>
                                   <m:ctrlPr>
                                     <a:rPr kumimoji="1" lang="en-US" altLang="ja-JP" sz="1200" i="1" smtClean="0">
-                                      <a:latin typeface="Cambria Math"/>
+                                      <a:latin typeface="Cambria Math" panose="02040503050406030204" pitchFamily="18" charset="0"/>
                                     </a:rPr>
                                   </m:ctrlPr>
                                 </m:dPr>
@@ -12139,7 +12981,7 @@
                                       <m:type m:val="lin"/>
                                       <m:ctrlPr>
                                         <a:rPr lang="en-US" altLang="ja-JP" sz="1200" i="1">
-                                          <a:latin typeface="Cambria Math"/>
+                                          <a:latin typeface="Cambria Math" panose="02040503050406030204" pitchFamily="18" charset="0"/>
                                         </a:rPr>
                                       </m:ctrlPr>
                                     </m:fPr>
@@ -12156,7 +12998,7 @@
                                           <m:endChr m:val="|"/>
                                           <m:ctrlPr>
                                             <a:rPr lang="en-US" altLang="ja-JP" sz="1200" i="1">
-                                              <a:latin typeface="Cambria Math"/>
+                                              <a:latin typeface="Cambria Math" panose="02040503050406030204" pitchFamily="18" charset="0"/>
                                             </a:rPr>
                                           </m:ctrlPr>
                                         </m:dPr>
@@ -12165,7 +13007,7 @@
                                             <m:sSubPr>
                                               <m:ctrlPr>
                                                 <a:rPr lang="en-US" altLang="ja-JP" sz="1200" i="1">
-                                                  <a:latin typeface="Cambria Math"/>
+                                                  <a:latin typeface="Cambria Math" panose="02040503050406030204" pitchFamily="18" charset="0"/>
                                                 </a:rPr>
                                               </m:ctrlPr>
                                             </m:sSubPr>
@@ -12196,7 +13038,7 @@
                                             <m:sSubPr>
                                               <m:ctrlPr>
                                                 <a:rPr lang="en-US" altLang="ja-JP" sz="1200" i="1">
-                                                  <a:latin typeface="Cambria Math"/>
+                                                  <a:latin typeface="Cambria Math" panose="02040503050406030204" pitchFamily="18" charset="0"/>
                                                 </a:rPr>
                                               </m:ctrlPr>
                                             </m:sSubPr>
@@ -12239,7 +13081,7 @@
                                   <m:endChr m:val="|"/>
                                   <m:ctrlPr>
                                     <a:rPr kumimoji="1" lang="en-US" altLang="ja-JP" sz="1200" i="1" smtClean="0">
-                                      <a:latin typeface="Cambria Math"/>
+                                      <a:latin typeface="Cambria Math" panose="02040503050406030204" pitchFamily="18" charset="0"/>
                                     </a:rPr>
                                   </m:ctrlPr>
                                 </m:dPr>
@@ -12248,7 +13090,7 @@
                                     <m:sSubPr>
                                       <m:ctrlPr>
                                         <a:rPr kumimoji="1" lang="en-US" altLang="ja-JP" sz="1200" i="1" smtClean="0">
-                                          <a:latin typeface="Cambria Math"/>
+                                          <a:latin typeface="Cambria Math" panose="02040503050406030204" pitchFamily="18" charset="0"/>
                                         </a:rPr>
                                       </m:ctrlPr>
                                     </m:sSubPr>
@@ -12273,7 +13115,7 @@
                                     <m:sSubPr>
                                       <m:ctrlPr>
                                         <a:rPr lang="en-US" altLang="ja-JP" sz="1200" i="1">
-                                          <a:latin typeface="Cambria Math"/>
+                                          <a:latin typeface="Cambria Math" panose="02040503050406030204" pitchFamily="18" charset="0"/>
                                         </a:rPr>
                                       </m:ctrlPr>
                                     </m:sSubPr>
@@ -12308,7 +13150,7 @@
             </p:txBody>
           </p:sp>
         </mc:Choice>
-        <mc:Fallback>
+        <mc:Fallback xmlns="">
           <p:sp>
             <p:nvSpPr>
               <p:cNvPr id="1093" name="テキスト ボックス 1092"/>
@@ -12427,7 +13269,7 @@
             <p:spPr>
               <a:xfrm>
                 <a:off x="11560366" y="8643385"/>
-                <a:ext cx="3025788" cy="798104"/>
+                <a:ext cx="3025788" cy="819070"/>
               </a:xfrm>
               <a:prstGeom prst="rect">
                 <a:avLst/>
@@ -12456,12 +13298,28 @@
                   <a:t>で</a:t>
                 </a:r>
                 <a:r>
+                  <a:rPr lang="ja-JP" altLang="en-US" sz="900" b="1" dirty="0">
+                    <a:latin typeface="メイリオ" panose="020B0604030504040204" pitchFamily="50" charset="-128"/>
+                    <a:ea typeface="メイリオ" panose="020B0604030504040204" pitchFamily="50" charset="-128"/>
+                    <a:cs typeface="メイリオ" panose="020B0604030504040204" pitchFamily="50" charset="-128"/>
+                  </a:rPr>
+                  <a:t>の</a:t>
+                </a:r>
+                <a:r>
                   <a:rPr lang="ja-JP" altLang="en-US" sz="900" b="1" dirty="0" smtClean="0">
                     <a:latin typeface="メイリオ" panose="020B0604030504040204" pitchFamily="50" charset="-128"/>
                     <a:ea typeface="メイリオ" panose="020B0604030504040204" pitchFamily="50" charset="-128"/>
                     <a:cs typeface="メイリオ" panose="020B0604030504040204" pitchFamily="50" charset="-128"/>
                   </a:rPr>
-                  <a:t>の移動コスト</a:t>
+                  <a:t>①の移動</a:t>
+                </a:r>
+                <a:r>
+                  <a:rPr lang="ja-JP" altLang="en-US" sz="900" b="1" dirty="0">
+                    <a:latin typeface="メイリオ" panose="020B0604030504040204" pitchFamily="50" charset="-128"/>
+                    <a:ea typeface="メイリオ" panose="020B0604030504040204" pitchFamily="50" charset="-128"/>
+                    <a:cs typeface="メイリオ" panose="020B0604030504040204" pitchFamily="50" charset="-128"/>
+                  </a:rPr>
+                  <a:t>コスト</a:t>
                 </a:r>
                 <a:endParaRPr lang="en-US" altLang="ja-JP" sz="900" b="1" dirty="0" smtClean="0">
                   <a:latin typeface="メイリオ" panose="020B0604030504040204" pitchFamily="50" charset="-128"/>
@@ -12517,7 +13375,7 @@
                         <m:degHide m:val="on"/>
                         <m:ctrlPr>
                           <a:rPr lang="en-US" altLang="ja-JP" sz="800" b="1" i="1" smtClean="0">
-                            <a:latin typeface="Cambria Math"/>
+                            <a:latin typeface="Cambria Math" panose="02040503050406030204" pitchFamily="18" charset="0"/>
                             <a:ea typeface="Cambria Math"/>
                             <a:cs typeface="メイリオ" panose="020B0604030504040204" pitchFamily="50" charset="-128"/>
                           </a:rPr>
@@ -12678,7 +13536,7 @@
                       <m:fPr>
                         <m:ctrlPr>
                           <a:rPr lang="en-US" altLang="ja-JP" sz="800" b="1" i="1" smtClean="0">
-                            <a:latin typeface="Cambria Math"/>
+                            <a:latin typeface="Cambria Math" panose="02040503050406030204" pitchFamily="18" charset="0"/>
                             <a:ea typeface="Cambria Math"/>
                             <a:cs typeface="メイリオ" panose="020B0604030504040204" pitchFamily="50" charset="-128"/>
                           </a:rPr>
@@ -12691,7 +13549,7 @@
                             <m:endChr m:val="|"/>
                             <m:ctrlPr>
                               <a:rPr lang="en-US" altLang="ja-JP" sz="800" b="1" i="1" smtClean="0">
-                                <a:latin typeface="Cambria Math"/>
+                                <a:latin typeface="Cambria Math" panose="02040503050406030204" pitchFamily="18" charset="0"/>
                                 <a:ea typeface="Cambria Math"/>
                               </a:rPr>
                             </m:ctrlPr>
@@ -12703,23 +13561,15 @@
                                 <a:ea typeface="Cambria Math"/>
                                 <a:cs typeface="メイリオ" panose="020B0604030504040204" pitchFamily="50" charset="-128"/>
                               </a:rPr>
-                              <m:t>−</m:t>
-                            </m:r>
-                            <m:r>
-                              <a:rPr lang="en-US" altLang="ja-JP" sz="800" b="1" i="1">
-                                <a:latin typeface="Cambria Math"/>
-                                <a:ea typeface="Cambria Math"/>
-                                <a:cs typeface="メイリオ" panose="020B0604030504040204" pitchFamily="50" charset="-128"/>
-                              </a:rPr>
                               <m:t>𝟒𝟓</m:t>
                             </m:r>
                             <m:r>
                               <a:rPr lang="en-US" altLang="ja-JP" sz="800" b="1" i="1">
-                                <a:latin typeface="Cambria Math"/>
+                                <a:latin typeface="Cambria Math" panose="02040503050406030204" pitchFamily="18" charset="0"/>
                                 <a:ea typeface="Cambria Math"/>
                                 <a:cs typeface="メイリオ" panose="020B0604030504040204" pitchFamily="50" charset="-128"/>
                               </a:rPr>
-                              <m:t>−</m:t>
+                              <m:t>+</m:t>
                             </m:r>
                             <m:r>
                               <a:rPr lang="en-US" altLang="ja-JP" sz="800" b="1" i="1" smtClean="0">
@@ -12761,7 +13611,7 @@
                         <m:degHide m:val="on"/>
                         <m:ctrlPr>
                           <a:rPr lang="en-US" altLang="ja-JP" sz="800" b="1" i="1">
-                            <a:latin typeface="Cambria Math"/>
+                            <a:latin typeface="Cambria Math" panose="02040503050406030204" pitchFamily="18" charset="0"/>
                             <a:ea typeface="Cambria Math"/>
                             <a:cs typeface="メイリオ" panose="020B0604030504040204" pitchFamily="50" charset="-128"/>
                           </a:rPr>
@@ -12999,15 +13849,15 @@
             <p:spPr>
               <a:xfrm>
                 <a:off x="11560366" y="8643385"/>
-                <a:ext cx="3025788" cy="798104"/>
+                <a:ext cx="3025788" cy="819070"/>
               </a:xfrm>
               <a:prstGeom prst="rect">
                 <a:avLst/>
               </a:prstGeom>
-              <a:blipFill rotWithShape="1">
+              <a:blipFill rotWithShape="0">
                 <a:blip r:embed="rId8"/>
                 <a:stretch>
-                  <a:fillRect b="-1527"/>
+                  <a:fillRect/>
                 </a:stretch>
               </a:blipFill>
             </p:spPr>
@@ -13138,7 +13988,15 @@
                 <a:ea typeface="メイリオ" panose="020B0604030504040204" pitchFamily="50" charset="-128"/>
                 <a:cs typeface="メイリオ" panose="020B0604030504040204" pitchFamily="50" charset="-128"/>
               </a:rPr>
-              <a:t>個持つ（色候補が</a:t>
+              <a:t>個</a:t>
+            </a:r>
+            <a:r>
+              <a:rPr lang="ja-JP" altLang="en-US" sz="1200" dirty="0" smtClean="0">
+                <a:latin typeface="メイリオ" panose="020B0604030504040204" pitchFamily="50" charset="-128"/>
+                <a:ea typeface="メイリオ" panose="020B0604030504040204" pitchFamily="50" charset="-128"/>
+                <a:cs typeface="メイリオ" panose="020B0604030504040204" pitchFamily="50" charset="-128"/>
+              </a:rPr>
+              <a:t>持つ</a:t>
             </a:r>
             <a:r>
               <a:rPr lang="en-US" altLang="ja-JP" sz="1200" dirty="0" smtClean="0">
@@ -13146,6 +14004,30 @@
                 <a:ea typeface="メイリオ" panose="020B0604030504040204" pitchFamily="50" charset="-128"/>
                 <a:cs typeface="メイリオ" panose="020B0604030504040204" pitchFamily="50" charset="-128"/>
               </a:rPr>
+              <a:t>(</a:t>
+            </a:r>
+            <a:r>
+              <a:rPr lang="ja-JP" altLang="en-US" sz="1200" dirty="0" smtClean="0">
+                <a:latin typeface="メイリオ" panose="020B0604030504040204" pitchFamily="50" charset="-128"/>
+                <a:ea typeface="メイリオ" panose="020B0604030504040204" pitchFamily="50" charset="-128"/>
+                <a:cs typeface="メイリオ" panose="020B0604030504040204" pitchFamily="50" charset="-128"/>
+              </a:rPr>
+              <a:t>色</a:t>
+            </a:r>
+            <a:r>
+              <a:rPr lang="ja-JP" altLang="en-US" sz="1200" dirty="0" smtClean="0">
+                <a:latin typeface="メイリオ" panose="020B0604030504040204" pitchFamily="50" charset="-128"/>
+                <a:ea typeface="メイリオ" panose="020B0604030504040204" pitchFamily="50" charset="-128"/>
+                <a:cs typeface="メイリオ" panose="020B0604030504040204" pitchFamily="50" charset="-128"/>
+              </a:rPr>
+              <a:t>候補が</a:t>
+            </a:r>
+            <a:r>
+              <a:rPr lang="en-US" altLang="ja-JP" sz="1200" dirty="0" smtClean="0">
+                <a:latin typeface="メイリオ" panose="020B0604030504040204" pitchFamily="50" charset="-128"/>
+                <a:ea typeface="メイリオ" panose="020B0604030504040204" pitchFamily="50" charset="-128"/>
+                <a:cs typeface="メイリオ" panose="020B0604030504040204" pitchFamily="50" charset="-128"/>
+              </a:rPr>
               <a:t>0</a:t>
             </a:r>
             <a:r>
@@ -13154,7 +14036,39 @@
                 <a:ea typeface="メイリオ" panose="020B0604030504040204" pitchFamily="50" charset="-128"/>
                 <a:cs typeface="メイリオ" panose="020B0604030504040204" pitchFamily="50" charset="-128"/>
               </a:rPr>
-              <a:t>個のサークルはブロックが設置されていない）。ブロックの色が確定、またはブロックが移動される度に抽象マップの情報は更新される。</a:t>
+              <a:t>個のサークルはブロックが設置されて</a:t>
+            </a:r>
+            <a:r>
+              <a:rPr lang="ja-JP" altLang="en-US" sz="1200" dirty="0" smtClean="0">
+                <a:latin typeface="メイリオ" panose="020B0604030504040204" pitchFamily="50" charset="-128"/>
+                <a:ea typeface="メイリオ" panose="020B0604030504040204" pitchFamily="50" charset="-128"/>
+                <a:cs typeface="メイリオ" panose="020B0604030504040204" pitchFamily="50" charset="-128"/>
+              </a:rPr>
+              <a:t>いない</a:t>
+            </a:r>
+            <a:r>
+              <a:rPr lang="en-US" altLang="ja-JP" sz="1200" dirty="0" smtClean="0">
+                <a:latin typeface="メイリオ" panose="020B0604030504040204" pitchFamily="50" charset="-128"/>
+                <a:ea typeface="メイリオ" panose="020B0604030504040204" pitchFamily="50" charset="-128"/>
+                <a:cs typeface="メイリオ" panose="020B0604030504040204" pitchFamily="50" charset="-128"/>
+              </a:rPr>
+              <a:t>)</a:t>
+            </a:r>
+            <a:r>
+              <a:rPr lang="ja-JP" altLang="en-US" sz="1200" dirty="0" err="1" smtClean="0">
+                <a:latin typeface="メイリオ" panose="020B0604030504040204" pitchFamily="50" charset="-128"/>
+                <a:ea typeface="メイリオ" panose="020B0604030504040204" pitchFamily="50" charset="-128"/>
+                <a:cs typeface="メイリオ" panose="020B0604030504040204" pitchFamily="50" charset="-128"/>
+              </a:rPr>
+              <a:t>。</a:t>
+            </a:r>
+            <a:r>
+              <a:rPr lang="ja-JP" altLang="en-US" sz="1200" dirty="0" smtClean="0">
+                <a:latin typeface="メイリオ" panose="020B0604030504040204" pitchFamily="50" charset="-128"/>
+                <a:ea typeface="メイリオ" panose="020B0604030504040204" pitchFamily="50" charset="-128"/>
+                <a:cs typeface="メイリオ" panose="020B0604030504040204" pitchFamily="50" charset="-128"/>
+              </a:rPr>
+              <a:t>ブロックの色が確定、またはブロックが移動される度に抽象マップの情報は更新される。</a:t>
             </a:r>
             <a:endParaRPr lang="en-US" altLang="ja-JP" sz="1200" dirty="0" smtClean="0">
               <a:latin typeface="メイリオ" panose="020B0604030504040204" pitchFamily="50" charset="-128"/>
@@ -13381,7 +14295,7 @@
         <p:spPr>
           <a:xfrm>
             <a:off x="392103" y="6066709"/>
-            <a:ext cx="2174522" cy="1569660"/>
+            <a:ext cx="2174522" cy="1384995"/>
           </a:xfrm>
           <a:prstGeom prst="rect">
             <a:avLst/>
@@ -13423,7 +14337,53 @@
                 <a:ea typeface="メイリオ" panose="020B0604030504040204" pitchFamily="50" charset="-128"/>
                 <a:cs typeface="メイリオ" panose="020B0604030504040204" pitchFamily="50" charset="-128"/>
               </a:rPr>
-              <a:t>で定義したモデルを用いてゲームを攻略するための手順を示す。抽象マップから実際の座標系への変換および走行体の各種動作については、制御技術および設計で述べる。</a:t>
+              <a:t>で定義したモデルを用いてゲームを攻略するための手順を示す。抽象マップから実際の座標系への変換および走行体の各種動作については</a:t>
+            </a:r>
+            <a:r>
+              <a:rPr lang="ja-JP" altLang="en-US" sz="1200" dirty="0" smtClean="0">
+                <a:latin typeface="メイリオ" panose="020B0604030504040204" pitchFamily="50" charset="-128"/>
+                <a:ea typeface="メイリオ" panose="020B0604030504040204" pitchFamily="50" charset="-128"/>
+                <a:cs typeface="メイリオ" panose="020B0604030504040204" pitchFamily="50" charset="-128"/>
+              </a:rPr>
+              <a:t>、</a:t>
+            </a:r>
+            <a:r>
+              <a:rPr lang="en-US" altLang="ja-JP" sz="1200" b="1" dirty="0" smtClean="0">
+                <a:solidFill>
+                  <a:srgbClr val="D24726"/>
+                </a:solidFill>
+                <a:latin typeface="メイリオ" panose="020B0604030504040204" pitchFamily="50" charset="-128"/>
+                <a:ea typeface="メイリオ" panose="020B0604030504040204" pitchFamily="50" charset="-128"/>
+                <a:cs typeface="メイリオ" panose="020B0604030504040204" pitchFamily="50" charset="-128"/>
+              </a:rPr>
+              <a:t>3.</a:t>
+            </a:r>
+            <a:r>
+              <a:rPr lang="ja-JP" altLang="en-US" sz="1200" b="1" dirty="0" smtClean="0">
+                <a:solidFill>
+                  <a:srgbClr val="D24726"/>
+                </a:solidFill>
+                <a:latin typeface="メイリオ" panose="020B0604030504040204" pitchFamily="50" charset="-128"/>
+                <a:ea typeface="メイリオ" panose="020B0604030504040204" pitchFamily="50" charset="-128"/>
+                <a:cs typeface="メイリオ" panose="020B0604030504040204" pitchFamily="50" charset="-128"/>
+              </a:rPr>
+              <a:t> 制御</a:t>
+            </a:r>
+            <a:r>
+              <a:rPr lang="ja-JP" altLang="en-US" sz="1200" dirty="0" smtClean="0">
+                <a:latin typeface="メイリオ" panose="020B0604030504040204" pitchFamily="50" charset="-128"/>
+                <a:ea typeface="メイリオ" panose="020B0604030504040204" pitchFamily="50" charset="-128"/>
+                <a:cs typeface="メイリオ" panose="020B0604030504040204" pitchFamily="50" charset="-128"/>
+              </a:rPr>
+              <a:t> で</a:t>
+            </a:r>
+            <a:r>
+              <a:rPr lang="ja-JP" altLang="en-US" sz="1200" dirty="0" smtClean="0">
+                <a:latin typeface="メイリオ" panose="020B0604030504040204" pitchFamily="50" charset="-128"/>
+                <a:ea typeface="メイリオ" panose="020B0604030504040204" pitchFamily="50" charset="-128"/>
+                <a:cs typeface="メイリオ" panose="020B0604030504040204" pitchFamily="50" charset="-128"/>
+              </a:rPr>
+              <a:t>述べる。</a:t>
             </a:r>
             <a:endParaRPr lang="en-US" altLang="ja-JP" sz="1200" dirty="0" smtClean="0">
               <a:latin typeface="メイリオ" panose="020B0604030504040204" pitchFamily="50" charset="-128"/>
@@ -13715,7 +14675,7 @@
   <a:extraClrSchemeLst/>
   <a:extLst>
     <a:ext uri="{05A4C25C-085E-4340-85A3-A5531E510DB2}">
-      <thm15:themeFamily xmlns:thm15="http://schemas.microsoft.com/office/thememl/2012/main" xmlns="" name="Office Theme" id="{62F939B6-93AF-4DB8-9C6B-D6C7DFDC589F}" vid="{4A3C46E8-61CC-4603-A589-7422A47A8E4A}"/>
+      <thm15:themeFamily xmlns:thm15="http://schemas.microsoft.com/office/thememl/2012/main" name="Office Theme" id="{62F939B6-93AF-4DB8-9C6B-D6C7DFDC589F}" vid="{4A3C46E8-61CC-4603-A589-7422A47A8E4A}"/>
     </a:ext>
   </a:extLst>
 </a:theme>
@@ -13976,7 +14936,7 @@
   <a:extraClrSchemeLst/>
   <a:extLst>
     <a:ext uri="{05A4C25C-085E-4340-85A3-A5531E510DB2}">
-      <thm15:themeFamily xmlns:thm15="http://schemas.microsoft.com/office/thememl/2012/main" xmlns="" name="Office Theme" id="{62F939B6-93AF-4DB8-9C6B-D6C7DFDC589F}" vid="{4A3C46E8-61CC-4603-A589-7422A47A8E4A}"/>
+      <thm15:themeFamily xmlns:thm15="http://schemas.microsoft.com/office/thememl/2012/main" name="Office Theme" id="{62F939B6-93AF-4DB8-9C6B-D6C7DFDC589F}" vid="{4A3C46E8-61CC-4603-A589-7422A47A8E4A}"/>
     </a:ext>
   </a:extLst>
 </a:theme>

</xml_diff>